<commit_message>
Presentation & README updates.
</commit_message>
<xml_diff>
--- a/presentations/01_intro_to_python.pptx
+++ b/presentations/01_intro_to_python.pptx
@@ -5,16 +5,15 @@
     <p:sldMasterId id="2147483648" r:id="rId1"/>
   </p:sldMasterIdLst>
   <p:notesMasterIdLst>
-    <p:notesMasterId r:id="rId9"/>
+    <p:notesMasterId r:id="rId8"/>
   </p:notesMasterIdLst>
   <p:sldIdLst>
     <p:sldId id="324" r:id="rId2"/>
     <p:sldId id="266" r:id="rId3"/>
-    <p:sldId id="326" r:id="rId4"/>
-    <p:sldId id="304" r:id="rId5"/>
-    <p:sldId id="327" r:id="rId6"/>
+    <p:sldId id="304" r:id="rId4"/>
+    <p:sldId id="327" r:id="rId5"/>
+    <p:sldId id="323" r:id="rId6"/>
     <p:sldId id="328" r:id="rId7"/>
-    <p:sldId id="323" r:id="rId8"/>
   </p:sldIdLst>
   <p:sldSz cx="12192000" cy="6858000"/>
   <p:notesSz cx="6858000" cy="9144000"/>
@@ -214,7 +213,7 @@
           <a:p>
             <a:fld id="{FD93C9B2-20F6-4DB1-B471-224337D0AC79}" type="datetimeFigureOut">
               <a:rPr lang="en-US" smtClean="0"/>
-              <a:t>11/18/2022</a:t>
+              <a:t>1/10/2023</a:t>
             </a:fld>
             <a:endParaRPr lang="en-US"/>
           </a:p>
@@ -706,6 +705,945 @@
           <a:bodyPr/>
           <a:lstStyle/>
           <a:p>
+            <a:pPr marL="342900" marR="0" lvl="0" indent="-342900" algn="l" defTabSz="914400" rtl="0" eaLnBrk="1" fontAlgn="auto" latinLnBrk="0" hangingPunct="1">
+              <a:lnSpc>
+                <a:spcPct val="100000"/>
+              </a:lnSpc>
+              <a:spcBef>
+                <a:spcPts val="0"/>
+              </a:spcBef>
+              <a:spcAft>
+                <a:spcPts val="0"/>
+              </a:spcAft>
+              <a:buClrTx/>
+              <a:buSzTx/>
+              <a:buFontTx/>
+              <a:buAutoNum type="arabicPeriod"/>
+              <a:tabLst/>
+              <a:defRPr/>
+            </a:pPr>
+            <a:r>
+              <a:rPr lang="en-US" sz="1100" b="1" dirty="0">
+                <a:solidFill>
+                  <a:srgbClr val="24292F"/>
+                </a:solidFill>
+                <a:effectLst>
+                  <a:outerShdw blurRad="38100" dist="38100" dir="2700000" algn="tl">
+                    <a:srgbClr val="000000">
+                      <a:alpha val="43137"/>
+                    </a:srgbClr>
+                  </a:outerShdw>
+                </a:effectLst>
+                <a:latin typeface="+mn-lt"/>
+                <a:ea typeface="Times New Roman" panose="02020603050405020304" pitchFamily="18" charset="0"/>
+              </a:rPr>
+              <a:t>Focus</a:t>
+            </a:r>
+          </a:p>
+          <a:p>
+            <a:pPr marL="800100" marR="0" lvl="1" indent="-342900" algn="l" defTabSz="914400" rtl="0" eaLnBrk="1" fontAlgn="auto" latinLnBrk="0" hangingPunct="1">
+              <a:lnSpc>
+                <a:spcPct val="100000"/>
+              </a:lnSpc>
+              <a:spcBef>
+                <a:spcPts val="0"/>
+              </a:spcBef>
+              <a:spcAft>
+                <a:spcPts val="0"/>
+              </a:spcAft>
+              <a:buClrTx/>
+              <a:buSzTx/>
+              <a:buFont typeface="Courier New" panose="02070309020205020404" pitchFamily="49" charset="0"/>
+              <a:buChar char="o"/>
+              <a:tabLst/>
+              <a:defRPr/>
+            </a:pPr>
+            <a:r>
+              <a:rPr lang="en-US" sz="1100" dirty="0">
+                <a:solidFill>
+                  <a:srgbClr val="24292F"/>
+                </a:solidFill>
+                <a:effectLst/>
+                <a:latin typeface="+mn-lt"/>
+                <a:ea typeface="Times New Roman" panose="02020603050405020304" pitchFamily="18" charset="0"/>
+              </a:rPr>
+              <a:t>So often, students think they can learn AI programming while multi-tasking on Facebook or texting friends on their cell phone. After programming for 30 years, I've learned one thing. You'll learn AI much faster if you can devote focused, uninterrupted time to practice.</a:t>
+            </a:r>
+          </a:p>
+          <a:p>
+            <a:pPr marL="342900" marR="0" lvl="0" indent="-342900" algn="l" defTabSz="914400" rtl="0" eaLnBrk="1" fontAlgn="auto" latinLnBrk="0" hangingPunct="1">
+              <a:lnSpc>
+                <a:spcPct val="100000"/>
+              </a:lnSpc>
+              <a:spcBef>
+                <a:spcPts val="0"/>
+              </a:spcBef>
+              <a:spcAft>
+                <a:spcPts val="0"/>
+              </a:spcAft>
+              <a:buClrTx/>
+              <a:buSzTx/>
+              <a:buFontTx/>
+              <a:buAutoNum type="arabicPeriod"/>
+              <a:tabLst/>
+              <a:defRPr/>
+            </a:pPr>
+            <a:r>
+              <a:rPr lang="en-US" sz="1100" b="1" dirty="0">
+                <a:effectLst/>
+                <a:latin typeface="+mn-lt"/>
+                <a:ea typeface="Calibri" panose="020F0502020204030204" pitchFamily="34" charset="0"/>
+                <a:cs typeface="LMRoman12-Bold"/>
+              </a:rPr>
+              <a:t>Avoid the “copy and paste” approach to writing code</a:t>
+            </a:r>
+          </a:p>
+          <a:p>
+            <a:pPr marL="800100" marR="0" lvl="1" indent="-342900" algn="l" defTabSz="914400" rtl="0" eaLnBrk="1" fontAlgn="auto" latinLnBrk="0" hangingPunct="1">
+              <a:lnSpc>
+                <a:spcPct val="100000"/>
+              </a:lnSpc>
+              <a:spcBef>
+                <a:spcPts val="0"/>
+              </a:spcBef>
+              <a:spcAft>
+                <a:spcPts val="0"/>
+              </a:spcAft>
+              <a:buClrTx/>
+              <a:buSzTx/>
+              <a:buFont typeface="Courier New" panose="02070309020205020404" pitchFamily="49" charset="0"/>
+              <a:buChar char="o"/>
+              <a:tabLst/>
+              <a:defRPr/>
+            </a:pPr>
+            <a:r>
+              <a:rPr lang="en-US" sz="1100" dirty="0">
+                <a:effectLst/>
+                <a:latin typeface="+mn-lt"/>
+                <a:ea typeface="Calibri" panose="020F0502020204030204" pitchFamily="34" charset="0"/>
+                <a:cs typeface="LMRoman10-Regular"/>
+              </a:rPr>
+              <a:t>Although copying and pasting may help you to avoid typing errors, it can also interfere with your learning</a:t>
+            </a:r>
+            <a:r>
+              <a:rPr lang="en-US" sz="1100" dirty="0">
+                <a:effectLst/>
+                <a:latin typeface="+mn-lt"/>
+                <a:ea typeface="Calibri" panose="020F0502020204030204" pitchFamily="34" charset="0"/>
+                <a:cs typeface="Times New Roman" panose="02020603050405020304" pitchFamily="18" charset="0"/>
+              </a:rPr>
+              <a:t> </a:t>
+            </a:r>
+            <a:r>
+              <a:rPr lang="en-US" sz="1100" dirty="0">
+                <a:effectLst/>
+                <a:latin typeface="+mn-lt"/>
+                <a:ea typeface="Calibri" panose="020F0502020204030204" pitchFamily="34" charset="0"/>
+                <a:cs typeface="LMRoman10-Regular"/>
+              </a:rPr>
+              <a:t>process for two reasons:</a:t>
+            </a:r>
+          </a:p>
+          <a:p>
+            <a:pPr marL="1257300" marR="0" lvl="2" indent="-342900" algn="l" defTabSz="914400" rtl="0" eaLnBrk="1" fontAlgn="auto" latinLnBrk="0" hangingPunct="1">
+              <a:lnSpc>
+                <a:spcPct val="100000"/>
+              </a:lnSpc>
+              <a:spcBef>
+                <a:spcPts val="0"/>
+              </a:spcBef>
+              <a:spcAft>
+                <a:spcPts val="0"/>
+              </a:spcAft>
+              <a:buClrTx/>
+              <a:buSzTx/>
+              <a:buFont typeface="Courier New" panose="02070309020205020404" pitchFamily="49" charset="0"/>
+              <a:buChar char="o"/>
+              <a:tabLst/>
+              <a:defRPr/>
+            </a:pPr>
+            <a:r>
+              <a:rPr lang="en-US" sz="1100" dirty="0">
+                <a:effectLst/>
+                <a:latin typeface="+mn-lt"/>
+                <a:ea typeface="Calibri" panose="020F0502020204030204" pitchFamily="34" charset="0"/>
+                <a:cs typeface="Times New Roman" panose="02020603050405020304" pitchFamily="18" charset="0"/>
+              </a:rPr>
+              <a:t>Typing </a:t>
+            </a:r>
+            <a:r>
+              <a:rPr lang="en-US" sz="1100" dirty="0">
+                <a:effectLst/>
+                <a:latin typeface="+mn-lt"/>
+                <a:ea typeface="Calibri" panose="020F0502020204030204" pitchFamily="34" charset="0"/>
+                <a:cs typeface="LMRoman10-Regular"/>
+              </a:rPr>
+              <a:t>errors can help you gain experience in writing code it provides informative feedback when you</a:t>
+            </a:r>
+            <a:r>
+              <a:rPr lang="en-US" sz="1100" dirty="0">
+                <a:effectLst/>
+                <a:latin typeface="+mn-lt"/>
+                <a:ea typeface="Calibri" panose="020F0502020204030204" pitchFamily="34" charset="0"/>
+                <a:cs typeface="Times New Roman" panose="02020603050405020304" pitchFamily="18" charset="0"/>
+              </a:rPr>
+              <a:t> </a:t>
+            </a:r>
+            <a:r>
+              <a:rPr lang="en-US" sz="1100" dirty="0">
+                <a:effectLst/>
+                <a:latin typeface="+mn-lt"/>
+                <a:ea typeface="Calibri" panose="020F0502020204030204" pitchFamily="34" charset="0"/>
+                <a:cs typeface="LMRoman10-Regular"/>
+              </a:rPr>
+              <a:t>make mistakes. Making and correcting typing errors is an important skill to develop, particularly</a:t>
+            </a:r>
+            <a:r>
+              <a:rPr lang="en-US" sz="1100" dirty="0">
+                <a:effectLst/>
+                <a:latin typeface="+mn-lt"/>
+                <a:ea typeface="Calibri" panose="020F0502020204030204" pitchFamily="34" charset="0"/>
+                <a:cs typeface="Times New Roman" panose="02020603050405020304" pitchFamily="18" charset="0"/>
+              </a:rPr>
+              <a:t> </a:t>
+            </a:r>
+            <a:r>
+              <a:rPr lang="en-US" sz="1100" dirty="0">
+                <a:effectLst/>
+                <a:latin typeface="+mn-lt"/>
+                <a:ea typeface="Calibri" panose="020F0502020204030204" pitchFamily="34" charset="0"/>
+                <a:cs typeface="LMRoman10-Regular"/>
+              </a:rPr>
+              <a:t>when you are typing a lot of code for your own data analysis.</a:t>
+            </a:r>
+          </a:p>
+          <a:p>
+            <a:pPr marL="1257300" marR="0" lvl="2" indent="-342900" algn="l" defTabSz="914400" rtl="0" eaLnBrk="1" fontAlgn="auto" latinLnBrk="0" hangingPunct="1">
+              <a:lnSpc>
+                <a:spcPct val="100000"/>
+              </a:lnSpc>
+              <a:spcBef>
+                <a:spcPts val="0"/>
+              </a:spcBef>
+              <a:spcAft>
+                <a:spcPts val="0"/>
+              </a:spcAft>
+              <a:buClrTx/>
+              <a:buSzTx/>
+              <a:buFont typeface="Courier New" panose="02070309020205020404" pitchFamily="49" charset="0"/>
+              <a:buChar char="o"/>
+              <a:tabLst/>
+              <a:defRPr/>
+            </a:pPr>
+            <a:r>
+              <a:rPr lang="en-US" sz="1100" dirty="0">
+                <a:effectLst/>
+                <a:latin typeface="+mn-lt"/>
+                <a:ea typeface="Calibri" panose="020F0502020204030204" pitchFamily="34" charset="0"/>
+                <a:cs typeface="Times New Roman" panose="02020603050405020304" pitchFamily="18" charset="0"/>
+              </a:rPr>
+              <a:t>Copying </a:t>
+            </a:r>
+            <a:r>
+              <a:rPr lang="en-US" sz="1100" dirty="0">
+                <a:effectLst/>
+                <a:latin typeface="+mn-lt"/>
+                <a:ea typeface="Calibri" panose="020F0502020204030204" pitchFamily="34" charset="0"/>
+                <a:cs typeface="LMRoman10-Regular"/>
+              </a:rPr>
+              <a:t>and pasting code may give you the impression that you know what you are doing when – in reality – you probably do not fully understand what the individual blocks of code are actually doing.</a:t>
+            </a:r>
+            <a:r>
+              <a:rPr lang="en-US" sz="1100" dirty="0">
+                <a:effectLst/>
+                <a:latin typeface="+mn-lt"/>
+                <a:ea typeface="Calibri" panose="020F0502020204030204" pitchFamily="34" charset="0"/>
+                <a:cs typeface="Times New Roman" panose="02020603050405020304" pitchFamily="18" charset="0"/>
+              </a:rPr>
+              <a:t> </a:t>
+            </a:r>
+            <a:r>
+              <a:rPr lang="en-US" sz="1100" dirty="0">
+                <a:effectLst/>
+                <a:latin typeface="+mn-lt"/>
+                <a:ea typeface="Calibri" panose="020F0502020204030204" pitchFamily="34" charset="0"/>
+                <a:cs typeface="LMRoman10-Regular"/>
+              </a:rPr>
+              <a:t>Furthermore, this problem will just get worse as you deal with increasingly longer and more complicated</a:t>
+            </a:r>
+            <a:r>
+              <a:rPr lang="en-US" sz="1100" dirty="0">
+                <a:effectLst/>
+                <a:latin typeface="+mn-lt"/>
+                <a:ea typeface="Calibri" panose="020F0502020204030204" pitchFamily="34" charset="0"/>
+                <a:cs typeface="Times New Roman" panose="02020603050405020304" pitchFamily="18" charset="0"/>
+              </a:rPr>
+              <a:t> s</a:t>
+            </a:r>
+            <a:r>
+              <a:rPr lang="en-US" sz="1100" dirty="0">
+                <a:effectLst/>
+                <a:latin typeface="+mn-lt"/>
+                <a:ea typeface="Calibri" panose="020F0502020204030204" pitchFamily="34" charset="0"/>
+                <a:cs typeface="LMRoman10-Regular"/>
+              </a:rPr>
+              <a:t>cripts.</a:t>
+            </a:r>
+          </a:p>
+          <a:p>
+            <a:pPr marL="342900" marR="0" lvl="0" indent="-342900" algn="l" defTabSz="914400" rtl="0" eaLnBrk="1" fontAlgn="auto" latinLnBrk="0" hangingPunct="1">
+              <a:lnSpc>
+                <a:spcPct val="100000"/>
+              </a:lnSpc>
+              <a:spcBef>
+                <a:spcPts val="0"/>
+              </a:spcBef>
+              <a:spcAft>
+                <a:spcPts val="0"/>
+              </a:spcAft>
+              <a:buClrTx/>
+              <a:buSzTx/>
+              <a:buFont typeface="+mj-lt"/>
+              <a:buAutoNum type="arabicPeriod"/>
+              <a:tabLst/>
+              <a:defRPr/>
+            </a:pPr>
+            <a:r>
+              <a:rPr lang="en-US" sz="1100" b="1" dirty="0">
+                <a:effectLst/>
+                <a:latin typeface="+mn-lt"/>
+                <a:ea typeface="Calibri" panose="020F0502020204030204" pitchFamily="34" charset="0"/>
+                <a:cs typeface="LMRoman12-Bold"/>
+              </a:rPr>
+              <a:t>Study code block-by-block, line-by-line</a:t>
+            </a:r>
+          </a:p>
+          <a:p>
+            <a:pPr marL="800100" marR="0" lvl="1" indent="-342900" algn="l" defTabSz="914400" rtl="0" eaLnBrk="1" fontAlgn="auto" latinLnBrk="0" hangingPunct="1">
+              <a:lnSpc>
+                <a:spcPct val="100000"/>
+              </a:lnSpc>
+              <a:spcBef>
+                <a:spcPts val="0"/>
+              </a:spcBef>
+              <a:spcAft>
+                <a:spcPts val="0"/>
+              </a:spcAft>
+              <a:buClrTx/>
+              <a:buSzTx/>
+              <a:buFont typeface="Courier New" panose="02070309020205020404" pitchFamily="49" charset="0"/>
+              <a:buChar char="o"/>
+              <a:tabLst/>
+              <a:defRPr/>
+            </a:pPr>
+            <a:r>
+              <a:rPr lang="en-US" sz="1100" dirty="0">
+                <a:effectLst/>
+                <a:latin typeface="+mn-lt"/>
+                <a:ea typeface="Calibri" panose="020F0502020204030204" pitchFamily="34" charset="0"/>
+                <a:cs typeface="LMRoman10-Regular"/>
+              </a:rPr>
+              <a:t>This means running one block of code at a time and making sure that you understand why the output is what</a:t>
+            </a:r>
+            <a:r>
+              <a:rPr lang="en-US" sz="1100" dirty="0">
+                <a:effectLst/>
+                <a:latin typeface="+mn-lt"/>
+                <a:ea typeface="Calibri" panose="020F0502020204030204" pitchFamily="34" charset="0"/>
+                <a:cs typeface="Times New Roman" panose="02020603050405020304" pitchFamily="18" charset="0"/>
+              </a:rPr>
+              <a:t> </a:t>
+            </a:r>
+            <a:r>
+              <a:rPr lang="en-US" sz="1100" dirty="0">
+                <a:effectLst/>
+                <a:latin typeface="+mn-lt"/>
+                <a:ea typeface="Calibri" panose="020F0502020204030204" pitchFamily="34" charset="0"/>
+                <a:cs typeface="LMRoman10-Regular"/>
+              </a:rPr>
+              <a:t>it is. If things are not clear, it is important to spend more time with that piece of the code. Here are some</a:t>
+            </a:r>
+            <a:r>
+              <a:rPr lang="en-US" sz="1100" dirty="0">
+                <a:effectLst/>
+                <a:latin typeface="+mn-lt"/>
+                <a:ea typeface="Calibri" panose="020F0502020204030204" pitchFamily="34" charset="0"/>
+                <a:cs typeface="Times New Roman" panose="02020603050405020304" pitchFamily="18" charset="0"/>
+              </a:rPr>
+              <a:t> </a:t>
+            </a:r>
+            <a:r>
+              <a:rPr lang="en-US" sz="1100" dirty="0">
+                <a:effectLst/>
+                <a:latin typeface="+mn-lt"/>
+                <a:ea typeface="Calibri" panose="020F0502020204030204" pitchFamily="34" charset="0"/>
+                <a:cs typeface="LMRoman10-Regular"/>
+              </a:rPr>
+              <a:t>tricks that are often helpful to understand a particular piece of code:</a:t>
+            </a:r>
+          </a:p>
+          <a:p>
+            <a:pPr marL="1257300" marR="0" lvl="2" indent="-342900" algn="l" defTabSz="914400" rtl="0" eaLnBrk="1" fontAlgn="auto" latinLnBrk="0" hangingPunct="1">
+              <a:lnSpc>
+                <a:spcPct val="100000"/>
+              </a:lnSpc>
+              <a:spcBef>
+                <a:spcPts val="0"/>
+              </a:spcBef>
+              <a:spcAft>
+                <a:spcPts val="0"/>
+              </a:spcAft>
+              <a:buClrTx/>
+              <a:buSzTx/>
+              <a:buFont typeface="Courier New" panose="02070309020205020404" pitchFamily="49" charset="0"/>
+              <a:buChar char="o"/>
+              <a:tabLst/>
+              <a:defRPr/>
+            </a:pPr>
+            <a:r>
+              <a:rPr lang="en-US" sz="1100" dirty="0">
+                <a:effectLst/>
+                <a:latin typeface="+mn-lt"/>
+                <a:ea typeface="Calibri" panose="020F0502020204030204" pitchFamily="34" charset="0"/>
+                <a:cs typeface="LMRoman10-Regular"/>
+              </a:rPr>
+              <a:t>Break a line of code into its components and try to understand the individual pieces.  Sometimes functions are nested within functions.</a:t>
+            </a:r>
+            <a:endParaRPr lang="en-US" sz="1100" dirty="0">
+              <a:effectLst/>
+              <a:latin typeface="+mn-lt"/>
+              <a:ea typeface="Calibri" panose="020F0502020204030204" pitchFamily="34" charset="0"/>
+              <a:cs typeface="Times New Roman" panose="02020603050405020304" pitchFamily="18" charset="0"/>
+            </a:endParaRPr>
+          </a:p>
+          <a:p>
+            <a:pPr marL="1257300" marR="0" lvl="2" indent="-342900" algn="l" defTabSz="914400" rtl="0" eaLnBrk="1" fontAlgn="auto" latinLnBrk="0" hangingPunct="1">
+              <a:lnSpc>
+                <a:spcPct val="100000"/>
+              </a:lnSpc>
+              <a:spcBef>
+                <a:spcPts val="0"/>
+              </a:spcBef>
+              <a:spcAft>
+                <a:spcPts val="0"/>
+              </a:spcAft>
+              <a:buClrTx/>
+              <a:buSzTx/>
+              <a:buFont typeface="Courier New" panose="02070309020205020404" pitchFamily="49" charset="0"/>
+              <a:buChar char="o"/>
+              <a:tabLst/>
+              <a:defRPr/>
+            </a:pPr>
+            <a:r>
+              <a:rPr lang="en-US" sz="1100" dirty="0">
+                <a:effectLst/>
+                <a:latin typeface="+mn-lt"/>
+                <a:ea typeface="Calibri" panose="020F0502020204030204" pitchFamily="34" charset="0"/>
+                <a:cs typeface="LMRoman10-Regular"/>
+              </a:rPr>
+              <a:t>Document what each block is doing. Clear documentation is critical as you may not remember what you did when you come back to a piece of code at some point in the future. As a wise programmer once said, “Write code for the future you.” Documentation is also useful when you want to adapt or reuse code in some other way. In situations like this, you will immediately know what a specific chunk of code does because it has been clearly documented.  </a:t>
+            </a:r>
+            <a:r>
+              <a:rPr lang="en-US" sz="1100" b="1" dirty="0">
+                <a:solidFill>
+                  <a:schemeClr val="tx1">
+                    <a:lumMod val="75000"/>
+                    <a:lumOff val="25000"/>
+                  </a:schemeClr>
+                </a:solidFill>
+                <a:effectLst/>
+                <a:latin typeface="+mn-lt"/>
+                <a:ea typeface="Calibri" panose="020F0502020204030204" pitchFamily="34" charset="0"/>
+                <a:cs typeface="LMRoman10-Regular"/>
+              </a:rPr>
+              <a:t>Donald Knuth </a:t>
+            </a:r>
+            <a:r>
+              <a:rPr lang="en-US" sz="1100" dirty="0">
+                <a:effectLst/>
+                <a:latin typeface="+mn-lt"/>
+                <a:ea typeface="Calibri" panose="020F0502020204030204" pitchFamily="34" charset="0"/>
+                <a:cs typeface="LMRoman10-Regular"/>
+              </a:rPr>
+              <a:t>– Literate Programming</a:t>
+            </a:r>
+            <a:endParaRPr lang="en-US" sz="1100" dirty="0">
+              <a:effectLst/>
+              <a:latin typeface="+mn-lt"/>
+              <a:ea typeface="Calibri" panose="020F0502020204030204" pitchFamily="34" charset="0"/>
+              <a:cs typeface="Times New Roman" panose="02020603050405020304" pitchFamily="18" charset="0"/>
+            </a:endParaRPr>
+          </a:p>
+          <a:p>
+            <a:pPr marL="1257300" marR="0" lvl="2" indent="-342900" algn="l" defTabSz="914400" rtl="0" eaLnBrk="1" fontAlgn="auto" latinLnBrk="0" hangingPunct="1">
+              <a:lnSpc>
+                <a:spcPct val="100000"/>
+              </a:lnSpc>
+              <a:spcBef>
+                <a:spcPts val="0"/>
+              </a:spcBef>
+              <a:spcAft>
+                <a:spcPts val="0"/>
+              </a:spcAft>
+              <a:buClrTx/>
+              <a:buSzTx/>
+              <a:buFont typeface="Courier New" panose="02070309020205020404" pitchFamily="49" charset="0"/>
+              <a:buChar char="o"/>
+              <a:tabLst/>
+              <a:defRPr/>
+            </a:pPr>
+            <a:r>
+              <a:rPr lang="en-US" sz="1100" dirty="0">
+                <a:effectLst/>
+                <a:latin typeface="+mn-lt"/>
+                <a:ea typeface="Calibri" panose="020F0502020204030204" pitchFamily="34" charset="0"/>
+                <a:cs typeface="LMRoman10-Regular"/>
+              </a:rPr>
+              <a:t>Perform mini experiments: create a simpler example in which you can tinker with the code and see what happens to the output.</a:t>
+            </a:r>
+            <a:endParaRPr lang="en-US" sz="1100" dirty="0">
+              <a:effectLst/>
+              <a:latin typeface="+mn-lt"/>
+              <a:ea typeface="Calibri" panose="020F0502020204030204" pitchFamily="34" charset="0"/>
+              <a:cs typeface="Times New Roman" panose="02020603050405020304" pitchFamily="18" charset="0"/>
+            </a:endParaRPr>
+          </a:p>
+          <a:p>
+            <a:pPr marL="342900" marR="0" lvl="0" indent="-342900" algn="l" defTabSz="914400" rtl="0" eaLnBrk="1" fontAlgn="auto" latinLnBrk="0" hangingPunct="1">
+              <a:lnSpc>
+                <a:spcPct val="100000"/>
+              </a:lnSpc>
+              <a:spcBef>
+                <a:spcPts val="0"/>
+              </a:spcBef>
+              <a:spcAft>
+                <a:spcPts val="0"/>
+              </a:spcAft>
+              <a:buClrTx/>
+              <a:buSzTx/>
+              <a:buFont typeface="+mj-lt"/>
+              <a:buAutoNum type="arabicPeriod"/>
+              <a:tabLst/>
+              <a:defRPr/>
+            </a:pPr>
+            <a:r>
+              <a:rPr lang="en-US" sz="1100" b="1" dirty="0">
+                <a:effectLst/>
+                <a:latin typeface="+mn-lt"/>
+                <a:ea typeface="Calibri" panose="020F0502020204030204" pitchFamily="34" charset="0"/>
+                <a:cs typeface="LMRoman12-Bold"/>
+              </a:rPr>
+              <a:t>Use the internet to find answers</a:t>
+            </a:r>
+          </a:p>
+          <a:p>
+            <a:pPr marL="800100" marR="0" lvl="1" indent="-342900" algn="l" defTabSz="914400" rtl="0" eaLnBrk="1" fontAlgn="auto" latinLnBrk="0" hangingPunct="1">
+              <a:lnSpc>
+                <a:spcPct val="100000"/>
+              </a:lnSpc>
+              <a:spcBef>
+                <a:spcPts val="0"/>
+              </a:spcBef>
+              <a:spcAft>
+                <a:spcPts val="0"/>
+              </a:spcAft>
+              <a:buClrTx/>
+              <a:buSzTx/>
+              <a:buFont typeface="Courier New" panose="02070309020205020404" pitchFamily="49" charset="0"/>
+              <a:buChar char="o"/>
+              <a:tabLst/>
+              <a:defRPr/>
+            </a:pPr>
+            <a:r>
+              <a:rPr lang="en-US" sz="1100" dirty="0">
+                <a:effectLst/>
+                <a:latin typeface="+mn-lt"/>
+                <a:ea typeface="Calibri" panose="020F0502020204030204" pitchFamily="34" charset="0"/>
+                <a:cs typeface="LMRoman10-Regular"/>
+              </a:rPr>
+              <a:t>Everybody (from novice to more experienced users) relies on the internet when they don’t understand</a:t>
+            </a:r>
+            <a:r>
+              <a:rPr lang="en-US" sz="1100" dirty="0">
+                <a:effectLst/>
+                <a:latin typeface="+mn-lt"/>
+                <a:ea typeface="Calibri" panose="020F0502020204030204" pitchFamily="34" charset="0"/>
+                <a:cs typeface="Times New Roman" panose="02020603050405020304" pitchFamily="18" charset="0"/>
+              </a:rPr>
+              <a:t> </a:t>
+            </a:r>
+            <a:r>
+              <a:rPr lang="en-US" sz="1100" dirty="0">
+                <a:effectLst/>
+                <a:latin typeface="+mn-lt"/>
+                <a:ea typeface="Calibri" panose="020F0502020204030204" pitchFamily="34" charset="0"/>
+                <a:cs typeface="LMRoman10-Regular"/>
+              </a:rPr>
+              <a:t>something. It is likely that other people have already asked (and received useful answers) for the problem</a:t>
+            </a:r>
+            <a:r>
+              <a:rPr lang="en-US" sz="1100" dirty="0">
+                <a:effectLst/>
+                <a:latin typeface="+mn-lt"/>
+                <a:ea typeface="Calibri" panose="020F0502020204030204" pitchFamily="34" charset="0"/>
+                <a:cs typeface="Times New Roman" panose="02020603050405020304" pitchFamily="18" charset="0"/>
+              </a:rPr>
+              <a:t> </a:t>
+            </a:r>
+            <a:r>
+              <a:rPr lang="en-US" sz="1100" dirty="0">
+                <a:effectLst/>
+                <a:latin typeface="+mn-lt"/>
+                <a:ea typeface="Calibri" panose="020F0502020204030204" pitchFamily="34" charset="0"/>
+                <a:cs typeface="LMRoman10-Regular"/>
+              </a:rPr>
+              <a:t>that you are facing. However, finding the exact piece of information that you need might be hard, especially</a:t>
+            </a:r>
+            <a:r>
+              <a:rPr lang="en-US" sz="1100" dirty="0">
+                <a:effectLst/>
+                <a:latin typeface="+mn-lt"/>
+                <a:ea typeface="Calibri" panose="020F0502020204030204" pitchFamily="34" charset="0"/>
+                <a:cs typeface="Times New Roman" panose="02020603050405020304" pitchFamily="18" charset="0"/>
+              </a:rPr>
+              <a:t> </a:t>
+            </a:r>
+            <a:r>
+              <a:rPr lang="en-US" sz="1100" dirty="0">
+                <a:effectLst/>
+                <a:latin typeface="+mn-lt"/>
+                <a:ea typeface="Calibri" panose="020F0502020204030204" pitchFamily="34" charset="0"/>
+                <a:cs typeface="LMRoman10-Regular"/>
+              </a:rPr>
+              <a:t>if you don’t use the correct terms/key words. Learning how to search for the information that you need is</a:t>
+            </a:r>
+            <a:r>
+              <a:rPr lang="en-US" sz="1100" dirty="0">
+                <a:effectLst/>
+                <a:latin typeface="+mn-lt"/>
+                <a:ea typeface="Calibri" panose="020F0502020204030204" pitchFamily="34" charset="0"/>
+                <a:cs typeface="Times New Roman" panose="02020603050405020304" pitchFamily="18" charset="0"/>
+              </a:rPr>
+              <a:t> </a:t>
+            </a:r>
+            <a:r>
+              <a:rPr lang="en-US" sz="1100" dirty="0">
+                <a:effectLst/>
+                <a:latin typeface="+mn-lt"/>
+                <a:ea typeface="Calibri" panose="020F0502020204030204" pitchFamily="34" charset="0"/>
+                <a:cs typeface="LMRoman10-Regular"/>
+              </a:rPr>
+              <a:t>a skill that also takes practice. “</a:t>
+            </a:r>
+            <a:r>
+              <a:rPr lang="en-US" sz="1100" dirty="0" err="1">
+                <a:effectLst/>
+                <a:latin typeface="+mn-lt"/>
+                <a:ea typeface="Calibri" panose="020F0502020204030204" pitchFamily="34" charset="0"/>
+                <a:cs typeface="LMRoman10-Regular"/>
+              </a:rPr>
+              <a:t>Stackoverflow</a:t>
+            </a:r>
+            <a:r>
+              <a:rPr lang="en-US" sz="1100" dirty="0">
+                <a:effectLst/>
+                <a:latin typeface="+mn-lt"/>
+                <a:ea typeface="Calibri" panose="020F0502020204030204" pitchFamily="34" charset="0"/>
+                <a:cs typeface="LMRoman10-Regular"/>
+              </a:rPr>
+              <a:t>” and existing </a:t>
+            </a:r>
+            <a:r>
+              <a:rPr lang="en-US" sz="1100" dirty="0" err="1">
+                <a:effectLst/>
+                <a:latin typeface="+mn-lt"/>
+                <a:ea typeface="Calibri" panose="020F0502020204030204" pitchFamily="34" charset="0"/>
+                <a:cs typeface="LMRoman10-Regular"/>
+              </a:rPr>
+              <a:t>cheatsheets</a:t>
+            </a:r>
+            <a:r>
+              <a:rPr lang="en-US" sz="1100" dirty="0">
+                <a:effectLst/>
+                <a:latin typeface="+mn-lt"/>
+                <a:ea typeface="Calibri" panose="020F0502020204030204" pitchFamily="34" charset="0"/>
+                <a:cs typeface="LMRoman10-Regular"/>
+              </a:rPr>
+              <a:t> can be very helpful.</a:t>
+            </a:r>
+          </a:p>
+          <a:p>
+            <a:pPr marL="342900" marR="0" lvl="0" indent="-342900" algn="l" defTabSz="914400" rtl="0" eaLnBrk="1" fontAlgn="auto" latinLnBrk="0" hangingPunct="1">
+              <a:lnSpc>
+                <a:spcPct val="100000"/>
+              </a:lnSpc>
+              <a:spcBef>
+                <a:spcPts val="0"/>
+              </a:spcBef>
+              <a:spcAft>
+                <a:spcPts val="0"/>
+              </a:spcAft>
+              <a:buClrTx/>
+              <a:buSzTx/>
+              <a:buFont typeface="+mj-lt"/>
+              <a:buAutoNum type="arabicPeriod"/>
+              <a:tabLst/>
+              <a:defRPr/>
+            </a:pPr>
+            <a:r>
+              <a:rPr lang="en-US" sz="1100" b="1" dirty="0">
+                <a:effectLst/>
+                <a:latin typeface="+mn-lt"/>
+                <a:ea typeface="Calibri" panose="020F0502020204030204" pitchFamily="34" charset="0"/>
+                <a:cs typeface="LMRoman10-Regular"/>
+              </a:rPr>
+              <a:t>Ask for Help</a:t>
+            </a:r>
+          </a:p>
+          <a:p>
+            <a:pPr marL="800100" marR="0" lvl="1" indent="-342900" algn="l" defTabSz="914400" rtl="0" eaLnBrk="1" fontAlgn="auto" latinLnBrk="0" hangingPunct="1">
+              <a:lnSpc>
+                <a:spcPct val="100000"/>
+              </a:lnSpc>
+              <a:spcBef>
+                <a:spcPts val="0"/>
+              </a:spcBef>
+              <a:spcAft>
+                <a:spcPts val="0"/>
+              </a:spcAft>
+              <a:buClrTx/>
+              <a:buSzTx/>
+              <a:buFont typeface="Courier New" panose="02070309020205020404" pitchFamily="49" charset="0"/>
+              <a:buChar char="o"/>
+              <a:tabLst/>
+              <a:defRPr/>
+            </a:pPr>
+            <a:r>
+              <a:rPr lang="en-US" sz="1100" b="0" dirty="0">
+                <a:effectLst/>
+                <a:latin typeface="+mn-lt"/>
+                <a:ea typeface="Calibri" panose="020F0502020204030204" pitchFamily="34" charset="0"/>
+                <a:cs typeface="LMRoman10-Regular"/>
+              </a:rPr>
+              <a:t>We’re all learning.  And some days, I feel like I’m the one who has the most to learn.  Alcoa story.</a:t>
+            </a:r>
+          </a:p>
+          <a:p>
+            <a:pPr marL="342900" marR="0" lvl="0" indent="-342900" algn="l" defTabSz="914400" rtl="0" eaLnBrk="1" fontAlgn="auto" latinLnBrk="0" hangingPunct="1">
+              <a:lnSpc>
+                <a:spcPct val="100000"/>
+              </a:lnSpc>
+              <a:spcBef>
+                <a:spcPts val="0"/>
+              </a:spcBef>
+              <a:spcAft>
+                <a:spcPts val="0"/>
+              </a:spcAft>
+              <a:buClrTx/>
+              <a:buSzTx/>
+              <a:buFont typeface="+mj-lt"/>
+              <a:buAutoNum type="arabicPeriod"/>
+              <a:tabLst/>
+              <a:defRPr/>
+            </a:pPr>
+            <a:r>
+              <a:rPr lang="en-US" sz="1100" b="1" dirty="0">
+                <a:effectLst/>
+                <a:latin typeface="+mn-lt"/>
+                <a:ea typeface="Calibri" panose="020F0502020204030204" pitchFamily="34" charset="0"/>
+                <a:cs typeface="LMRoman12-Bold"/>
+              </a:rPr>
+              <a:t>Take your time</a:t>
+            </a:r>
+          </a:p>
+          <a:p>
+            <a:pPr marL="800100" marR="0" lvl="1" indent="-342900" algn="l" defTabSz="914400" rtl="0" eaLnBrk="1" fontAlgn="auto" latinLnBrk="0" hangingPunct="1">
+              <a:lnSpc>
+                <a:spcPct val="100000"/>
+              </a:lnSpc>
+              <a:spcBef>
+                <a:spcPts val="0"/>
+              </a:spcBef>
+              <a:spcAft>
+                <a:spcPts val="0"/>
+              </a:spcAft>
+              <a:buClrTx/>
+              <a:buSzTx/>
+              <a:buFont typeface="Courier New" panose="02070309020205020404" pitchFamily="49" charset="0"/>
+              <a:buChar char="o"/>
+              <a:tabLst/>
+              <a:defRPr/>
+            </a:pPr>
+            <a:r>
+              <a:rPr lang="en-US" sz="1100" dirty="0">
+                <a:effectLst/>
+                <a:latin typeface="+mn-lt"/>
+                <a:ea typeface="Calibri" panose="020F0502020204030204" pitchFamily="34" charset="0"/>
+                <a:cs typeface="LMRoman10-Regular"/>
+              </a:rPr>
+              <a:t>It is important to realize that it takes time to learn AI. What this implies is that you should not</a:t>
+            </a:r>
+            <a:r>
+              <a:rPr lang="en-US" sz="1100" dirty="0">
+                <a:effectLst/>
+                <a:latin typeface="+mn-lt"/>
+                <a:ea typeface="Calibri" panose="020F0502020204030204" pitchFamily="34" charset="0"/>
+                <a:cs typeface="Times New Roman" panose="02020603050405020304" pitchFamily="18" charset="0"/>
+              </a:rPr>
+              <a:t> </a:t>
+            </a:r>
+            <a:r>
+              <a:rPr lang="en-US" sz="1100" dirty="0">
+                <a:effectLst/>
+                <a:latin typeface="+mn-lt"/>
+                <a:ea typeface="Calibri" panose="020F0502020204030204" pitchFamily="34" charset="0"/>
+                <a:cs typeface="LMRoman10-Regular"/>
+              </a:rPr>
+              <a:t>rush to get things done if you want to master this skill. In particular, everybody goes through some level of</a:t>
+            </a:r>
+            <a:r>
+              <a:rPr lang="en-US" sz="1100" dirty="0">
+                <a:effectLst/>
+                <a:latin typeface="+mn-lt"/>
+                <a:ea typeface="Calibri" panose="020F0502020204030204" pitchFamily="34" charset="0"/>
+                <a:cs typeface="Times New Roman" panose="02020603050405020304" pitchFamily="18" charset="0"/>
+              </a:rPr>
+              <a:t> </a:t>
+            </a:r>
+            <a:r>
+              <a:rPr lang="en-US" sz="1100" dirty="0">
+                <a:effectLst/>
+                <a:latin typeface="+mn-lt"/>
+                <a:ea typeface="Calibri" panose="020F0502020204030204" pitchFamily="34" charset="0"/>
+                <a:cs typeface="LMRoman10-Regular"/>
+              </a:rPr>
+              <a:t>struggle and frustration when learning AI. However, once you have mastered it, you will be amazed</a:t>
+            </a:r>
+            <a:r>
+              <a:rPr lang="en-US" sz="1100" dirty="0">
+                <a:effectLst/>
+                <a:latin typeface="+mn-lt"/>
+                <a:ea typeface="Calibri" panose="020F0502020204030204" pitchFamily="34" charset="0"/>
+                <a:cs typeface="Times New Roman" panose="02020603050405020304" pitchFamily="18" charset="0"/>
+              </a:rPr>
+              <a:t> </a:t>
+            </a:r>
+            <a:r>
+              <a:rPr lang="en-US" sz="1100" dirty="0">
+                <a:effectLst/>
+                <a:latin typeface="+mn-lt"/>
+                <a:ea typeface="Calibri" panose="020F0502020204030204" pitchFamily="34" charset="0"/>
+                <a:cs typeface="LMRoman10-Regular"/>
+              </a:rPr>
+              <a:t>by what this skill can do for you.</a:t>
+            </a:r>
+            <a:endParaRPr lang="en-US" sz="1100" dirty="0">
+              <a:effectLst/>
+              <a:latin typeface="+mn-lt"/>
+              <a:ea typeface="Calibri" panose="020F0502020204030204" pitchFamily="34" charset="0"/>
+              <a:cs typeface="Times New Roman" panose="02020603050405020304" pitchFamily="18" charset="0"/>
+            </a:endParaRPr>
+          </a:p>
+          <a:p>
+            <a:pPr marL="342900" marR="0" lvl="0" indent="-342900" algn="l" defTabSz="914400" rtl="0" eaLnBrk="1" fontAlgn="auto" latinLnBrk="0" hangingPunct="1">
+              <a:lnSpc>
+                <a:spcPct val="100000"/>
+              </a:lnSpc>
+              <a:spcBef>
+                <a:spcPts val="0"/>
+              </a:spcBef>
+              <a:spcAft>
+                <a:spcPts val="0"/>
+              </a:spcAft>
+              <a:buClrTx/>
+              <a:buSzTx/>
+              <a:buFont typeface="+mj-lt"/>
+              <a:buAutoNum type="arabicPeriod"/>
+              <a:tabLst/>
+              <a:defRPr/>
+            </a:pPr>
+            <a:endParaRPr lang="en-US" sz="1800" dirty="0">
+              <a:effectLst/>
+              <a:latin typeface="Calibri" panose="020F0502020204030204" pitchFamily="34" charset="0"/>
+              <a:ea typeface="Calibri" panose="020F0502020204030204" pitchFamily="34" charset="0"/>
+              <a:cs typeface="Times New Roman" panose="02020603050405020304" pitchFamily="18" charset="0"/>
+            </a:endParaRPr>
+          </a:p>
+          <a:p>
+            <a:pPr marL="800100" marR="0" lvl="1" indent="-342900" algn="l" defTabSz="914400" rtl="0" eaLnBrk="1" fontAlgn="auto" latinLnBrk="0" hangingPunct="1">
+              <a:lnSpc>
+                <a:spcPct val="100000"/>
+              </a:lnSpc>
+              <a:spcBef>
+                <a:spcPts val="0"/>
+              </a:spcBef>
+              <a:spcAft>
+                <a:spcPts val="0"/>
+              </a:spcAft>
+              <a:buClrTx/>
+              <a:buSzTx/>
+              <a:buFont typeface="Courier New" panose="02070309020205020404" pitchFamily="49" charset="0"/>
+              <a:buChar char="o"/>
+              <a:tabLst/>
+              <a:defRPr/>
+            </a:pPr>
+            <a:endParaRPr lang="en-US" sz="1800" dirty="0">
+              <a:effectLst/>
+              <a:latin typeface="Calibri" panose="020F0502020204030204" pitchFamily="34" charset="0"/>
+              <a:ea typeface="Calibri" panose="020F0502020204030204" pitchFamily="34" charset="0"/>
+              <a:cs typeface="Times New Roman" panose="02020603050405020304" pitchFamily="18" charset="0"/>
+            </a:endParaRPr>
+          </a:p>
+          <a:p>
+            <a:pPr marL="800100" marR="0" lvl="1" indent="-342900" algn="l" defTabSz="914400" rtl="0" eaLnBrk="1" fontAlgn="auto" latinLnBrk="0" hangingPunct="1">
+              <a:lnSpc>
+                <a:spcPct val="100000"/>
+              </a:lnSpc>
+              <a:spcBef>
+                <a:spcPts val="0"/>
+              </a:spcBef>
+              <a:spcAft>
+                <a:spcPts val="0"/>
+              </a:spcAft>
+              <a:buClrTx/>
+              <a:buSzTx/>
+              <a:buFont typeface="+mj-lt"/>
+              <a:buAutoNum type="arabicPeriod"/>
+              <a:tabLst/>
+              <a:defRPr/>
+            </a:pPr>
+            <a:endParaRPr lang="en-US" sz="1800" dirty="0">
+              <a:effectLst/>
+              <a:latin typeface="Calibri" panose="020F0502020204030204" pitchFamily="34" charset="0"/>
+              <a:ea typeface="Calibri" panose="020F0502020204030204" pitchFamily="34" charset="0"/>
+              <a:cs typeface="Times New Roman" panose="02020603050405020304" pitchFamily="18" charset="0"/>
+            </a:endParaRPr>
+          </a:p>
+          <a:p>
+            <a:pPr marL="800100" marR="0" lvl="1" indent="-342900" algn="l" defTabSz="914400" rtl="0" eaLnBrk="1" fontAlgn="auto" latinLnBrk="0" hangingPunct="1">
+              <a:lnSpc>
+                <a:spcPct val="100000"/>
+              </a:lnSpc>
+              <a:spcBef>
+                <a:spcPts val="0"/>
+              </a:spcBef>
+              <a:spcAft>
+                <a:spcPts val="0"/>
+              </a:spcAft>
+              <a:buClrTx/>
+              <a:buSzTx/>
+              <a:buFont typeface="Courier New" panose="02070309020205020404" pitchFamily="49" charset="0"/>
+              <a:buChar char="o"/>
+              <a:tabLst/>
+              <a:defRPr/>
+            </a:pPr>
+            <a:endParaRPr lang="en-US" sz="1800" dirty="0">
+              <a:effectLst/>
+              <a:latin typeface="Times New Roman" panose="02020603050405020304" pitchFamily="18" charset="0"/>
+              <a:ea typeface="Times New Roman" panose="02020603050405020304" pitchFamily="18" charset="0"/>
+            </a:endParaRPr>
+          </a:p>
+          <a:p>
             <a:endParaRPr lang="en-US" dirty="0"/>
           </a:p>
         </p:txBody>
@@ -736,7 +1674,7 @@
     </p:spTree>
     <p:extLst>
       <p:ext uri="{BB962C8B-B14F-4D97-AF65-F5344CB8AC3E}">
-        <p14:creationId xmlns:p14="http://schemas.microsoft.com/office/powerpoint/2010/main" val="1218542571"/>
+        <p14:creationId xmlns:p14="http://schemas.microsoft.com/office/powerpoint/2010/main" val="1955762856"/>
       </p:ext>
     </p:extLst>
   </p:cSld>
@@ -790,942 +1728,16 @@
           <a:bodyPr/>
           <a:lstStyle/>
           <a:p>
-            <a:pPr marL="342900" marR="0" lvl="0" indent="-342900" algn="l" defTabSz="914400" rtl="0" eaLnBrk="1" fontAlgn="auto" latinLnBrk="0" hangingPunct="1">
-              <a:lnSpc>
-                <a:spcPct val="100000"/>
-              </a:lnSpc>
-              <a:spcBef>
-                <a:spcPts val="0"/>
-              </a:spcBef>
-              <a:spcAft>
-                <a:spcPts val="0"/>
-              </a:spcAft>
-              <a:buClrTx/>
-              <a:buSzTx/>
-              <a:buFontTx/>
-              <a:buAutoNum type="arabicPeriod"/>
-              <a:tabLst/>
-              <a:defRPr/>
-            </a:pPr>
-            <a:r>
-              <a:rPr lang="en-US" sz="1100" b="1" dirty="0">
-                <a:solidFill>
-                  <a:srgbClr val="24292F"/>
-                </a:solidFill>
-                <a:effectLst>
-                  <a:outerShdw blurRad="38100" dist="38100" dir="2700000" algn="tl">
-                    <a:srgbClr val="000000">
-                      <a:alpha val="43137"/>
-                    </a:srgbClr>
-                  </a:outerShdw>
-                </a:effectLst>
-                <a:latin typeface="+mn-lt"/>
-                <a:ea typeface="Times New Roman" panose="02020603050405020304" pitchFamily="18" charset="0"/>
-              </a:rPr>
-              <a:t>Focus</a:t>
-            </a:r>
-          </a:p>
-          <a:p>
-            <a:pPr marL="800100" marR="0" lvl="1" indent="-342900" algn="l" defTabSz="914400" rtl="0" eaLnBrk="1" fontAlgn="auto" latinLnBrk="0" hangingPunct="1">
-              <a:lnSpc>
-                <a:spcPct val="100000"/>
-              </a:lnSpc>
-              <a:spcBef>
-                <a:spcPts val="0"/>
-              </a:spcBef>
-              <a:spcAft>
-                <a:spcPts val="0"/>
-              </a:spcAft>
-              <a:buClrTx/>
-              <a:buSzTx/>
-              <a:buFont typeface="Courier New" panose="02070309020205020404" pitchFamily="49" charset="0"/>
-              <a:buChar char="o"/>
-              <a:tabLst/>
-              <a:defRPr/>
-            </a:pPr>
-            <a:r>
-              <a:rPr lang="en-US" sz="1100" dirty="0">
-                <a:solidFill>
-                  <a:srgbClr val="24292F"/>
-                </a:solidFill>
-                <a:effectLst/>
-                <a:latin typeface="+mn-lt"/>
-                <a:ea typeface="Times New Roman" panose="02020603050405020304" pitchFamily="18" charset="0"/>
-              </a:rPr>
-              <a:t>So often, students think they can learn AI programming while multi-tasking on Facebook or texting friends on their cell phone. After programming for 30 years, I've learned one thing. You'll learn AI much faster if you can devote focused, uninterrupted time to practice.</a:t>
-            </a:r>
-          </a:p>
-          <a:p>
-            <a:pPr marL="342900" marR="0" lvl="0" indent="-342900" algn="l" defTabSz="914400" rtl="0" eaLnBrk="1" fontAlgn="auto" latinLnBrk="0" hangingPunct="1">
-              <a:lnSpc>
-                <a:spcPct val="100000"/>
-              </a:lnSpc>
-              <a:spcBef>
-                <a:spcPts val="0"/>
-              </a:spcBef>
-              <a:spcAft>
-                <a:spcPts val="0"/>
-              </a:spcAft>
-              <a:buClrTx/>
-              <a:buSzTx/>
-              <a:buFontTx/>
-              <a:buAutoNum type="arabicPeriod"/>
-              <a:tabLst/>
-              <a:defRPr/>
-            </a:pPr>
-            <a:r>
-              <a:rPr lang="en-US" sz="1100" b="1" dirty="0">
-                <a:effectLst/>
-                <a:latin typeface="+mn-lt"/>
-                <a:ea typeface="Calibri" panose="020F0502020204030204" pitchFamily="34" charset="0"/>
-                <a:cs typeface="LMRoman12-Bold"/>
-              </a:rPr>
-              <a:t>Avoid the “copy and paste” approach to writing code</a:t>
-            </a:r>
-          </a:p>
-          <a:p>
-            <a:pPr marL="800100" marR="0" lvl="1" indent="-342900" algn="l" defTabSz="914400" rtl="0" eaLnBrk="1" fontAlgn="auto" latinLnBrk="0" hangingPunct="1">
-              <a:lnSpc>
-                <a:spcPct val="100000"/>
-              </a:lnSpc>
-              <a:spcBef>
-                <a:spcPts val="0"/>
-              </a:spcBef>
-              <a:spcAft>
-                <a:spcPts val="0"/>
-              </a:spcAft>
-              <a:buClrTx/>
-              <a:buSzTx/>
-              <a:buFont typeface="Courier New" panose="02070309020205020404" pitchFamily="49" charset="0"/>
-              <a:buChar char="o"/>
-              <a:tabLst/>
-              <a:defRPr/>
-            </a:pPr>
-            <a:r>
-              <a:rPr lang="en-US" sz="1100" dirty="0">
-                <a:effectLst/>
-                <a:latin typeface="+mn-lt"/>
-                <a:ea typeface="Calibri" panose="020F0502020204030204" pitchFamily="34" charset="0"/>
-                <a:cs typeface="LMRoman10-Regular"/>
-              </a:rPr>
-              <a:t>Although copying and pasting may help you to avoid typing errors, it can also interfere with your learning</a:t>
-            </a:r>
-            <a:r>
-              <a:rPr lang="en-US" sz="1100" dirty="0">
-                <a:effectLst/>
-                <a:latin typeface="+mn-lt"/>
-                <a:ea typeface="Calibri" panose="020F0502020204030204" pitchFamily="34" charset="0"/>
-                <a:cs typeface="Times New Roman" panose="02020603050405020304" pitchFamily="18" charset="0"/>
-              </a:rPr>
-              <a:t> </a:t>
-            </a:r>
-            <a:r>
-              <a:rPr lang="en-US" sz="1100" dirty="0">
-                <a:effectLst/>
-                <a:latin typeface="+mn-lt"/>
-                <a:ea typeface="Calibri" panose="020F0502020204030204" pitchFamily="34" charset="0"/>
-                <a:cs typeface="LMRoman10-Regular"/>
-              </a:rPr>
-              <a:t>process for two reasons:</a:t>
-            </a:r>
-          </a:p>
-          <a:p>
-            <a:pPr marL="1257300" marR="0" lvl="2" indent="-342900" algn="l" defTabSz="914400" rtl="0" eaLnBrk="1" fontAlgn="auto" latinLnBrk="0" hangingPunct="1">
-              <a:lnSpc>
-                <a:spcPct val="100000"/>
-              </a:lnSpc>
-              <a:spcBef>
-                <a:spcPts val="0"/>
-              </a:spcBef>
-              <a:spcAft>
-                <a:spcPts val="0"/>
-              </a:spcAft>
-              <a:buClrTx/>
-              <a:buSzTx/>
-              <a:buFont typeface="Courier New" panose="02070309020205020404" pitchFamily="49" charset="0"/>
-              <a:buChar char="o"/>
-              <a:tabLst/>
-              <a:defRPr/>
-            </a:pPr>
-            <a:r>
-              <a:rPr lang="en-US" sz="1100" dirty="0">
-                <a:effectLst/>
-                <a:latin typeface="+mn-lt"/>
-                <a:ea typeface="Calibri" panose="020F0502020204030204" pitchFamily="34" charset="0"/>
-                <a:cs typeface="Times New Roman" panose="02020603050405020304" pitchFamily="18" charset="0"/>
-              </a:rPr>
-              <a:t>Typing </a:t>
-            </a:r>
-            <a:r>
-              <a:rPr lang="en-US" sz="1100" dirty="0">
-                <a:effectLst/>
-                <a:latin typeface="+mn-lt"/>
-                <a:ea typeface="Calibri" panose="020F0502020204030204" pitchFamily="34" charset="0"/>
-                <a:cs typeface="LMRoman10-Regular"/>
-              </a:rPr>
-              <a:t>errors can help you gain experience in writing code it provides informative feedback when you</a:t>
-            </a:r>
-            <a:r>
-              <a:rPr lang="en-US" sz="1100" dirty="0">
-                <a:effectLst/>
-                <a:latin typeface="+mn-lt"/>
-                <a:ea typeface="Calibri" panose="020F0502020204030204" pitchFamily="34" charset="0"/>
-                <a:cs typeface="Times New Roman" panose="02020603050405020304" pitchFamily="18" charset="0"/>
-              </a:rPr>
-              <a:t> </a:t>
-            </a:r>
-            <a:r>
-              <a:rPr lang="en-US" sz="1100" dirty="0">
-                <a:effectLst/>
-                <a:latin typeface="+mn-lt"/>
-                <a:ea typeface="Calibri" panose="020F0502020204030204" pitchFamily="34" charset="0"/>
-                <a:cs typeface="LMRoman10-Regular"/>
-              </a:rPr>
-              <a:t>make mistakes. Making and correcting typing errors is an important skill to develop, particularly</a:t>
-            </a:r>
-            <a:r>
-              <a:rPr lang="en-US" sz="1100" dirty="0">
-                <a:effectLst/>
-                <a:latin typeface="+mn-lt"/>
-                <a:ea typeface="Calibri" panose="020F0502020204030204" pitchFamily="34" charset="0"/>
-                <a:cs typeface="Times New Roman" panose="02020603050405020304" pitchFamily="18" charset="0"/>
-              </a:rPr>
-              <a:t> </a:t>
-            </a:r>
-            <a:r>
-              <a:rPr lang="en-US" sz="1100" dirty="0">
-                <a:effectLst/>
-                <a:latin typeface="+mn-lt"/>
-                <a:ea typeface="Calibri" panose="020F0502020204030204" pitchFamily="34" charset="0"/>
-                <a:cs typeface="LMRoman10-Regular"/>
-              </a:rPr>
-              <a:t>when you are typing a lot of code for your own data analysis.</a:t>
-            </a:r>
-          </a:p>
-          <a:p>
-            <a:pPr marL="1257300" marR="0" lvl="2" indent="-342900" algn="l" defTabSz="914400" rtl="0" eaLnBrk="1" fontAlgn="auto" latinLnBrk="0" hangingPunct="1">
-              <a:lnSpc>
-                <a:spcPct val="100000"/>
-              </a:lnSpc>
-              <a:spcBef>
-                <a:spcPts val="0"/>
-              </a:spcBef>
-              <a:spcAft>
-                <a:spcPts val="0"/>
-              </a:spcAft>
-              <a:buClrTx/>
-              <a:buSzTx/>
-              <a:buFont typeface="Courier New" panose="02070309020205020404" pitchFamily="49" charset="0"/>
-              <a:buChar char="o"/>
-              <a:tabLst/>
-              <a:defRPr/>
-            </a:pPr>
-            <a:r>
-              <a:rPr lang="en-US" sz="1100" dirty="0">
-                <a:effectLst/>
-                <a:latin typeface="+mn-lt"/>
-                <a:ea typeface="Calibri" panose="020F0502020204030204" pitchFamily="34" charset="0"/>
-                <a:cs typeface="Times New Roman" panose="02020603050405020304" pitchFamily="18" charset="0"/>
-              </a:rPr>
-              <a:t>Copying </a:t>
-            </a:r>
-            <a:r>
-              <a:rPr lang="en-US" sz="1100" dirty="0">
-                <a:effectLst/>
-                <a:latin typeface="+mn-lt"/>
-                <a:ea typeface="Calibri" panose="020F0502020204030204" pitchFamily="34" charset="0"/>
-                <a:cs typeface="LMRoman10-Regular"/>
-              </a:rPr>
-              <a:t>and pasting code may give you the impression that you know what you are doing when – in reality – you probably do not fully understand what the individual blocks of code are actually doing.</a:t>
-            </a:r>
-            <a:r>
-              <a:rPr lang="en-US" sz="1100" dirty="0">
-                <a:effectLst/>
-                <a:latin typeface="+mn-lt"/>
-                <a:ea typeface="Calibri" panose="020F0502020204030204" pitchFamily="34" charset="0"/>
-                <a:cs typeface="Times New Roman" panose="02020603050405020304" pitchFamily="18" charset="0"/>
-              </a:rPr>
-              <a:t> </a:t>
-            </a:r>
-            <a:r>
-              <a:rPr lang="en-US" sz="1100" dirty="0">
-                <a:effectLst/>
-                <a:latin typeface="+mn-lt"/>
-                <a:ea typeface="Calibri" panose="020F0502020204030204" pitchFamily="34" charset="0"/>
-                <a:cs typeface="LMRoman10-Regular"/>
-              </a:rPr>
-              <a:t>Furthermore, this problem will just get worse as you deal with increasingly longer and more complicated</a:t>
-            </a:r>
-            <a:r>
-              <a:rPr lang="en-US" sz="1100" dirty="0">
-                <a:effectLst/>
-                <a:latin typeface="+mn-lt"/>
-                <a:ea typeface="Calibri" panose="020F0502020204030204" pitchFamily="34" charset="0"/>
-                <a:cs typeface="Times New Roman" panose="02020603050405020304" pitchFamily="18" charset="0"/>
-              </a:rPr>
-              <a:t> s</a:t>
-            </a:r>
-            <a:r>
-              <a:rPr lang="en-US" sz="1100" dirty="0">
-                <a:effectLst/>
-                <a:latin typeface="+mn-lt"/>
-                <a:ea typeface="Calibri" panose="020F0502020204030204" pitchFamily="34" charset="0"/>
-                <a:cs typeface="LMRoman10-Regular"/>
-              </a:rPr>
-              <a:t>cripts.</a:t>
-            </a:r>
-          </a:p>
-          <a:p>
-            <a:pPr marL="342900" marR="0" lvl="0" indent="-342900" algn="l" defTabSz="914400" rtl="0" eaLnBrk="1" fontAlgn="auto" latinLnBrk="0" hangingPunct="1">
-              <a:lnSpc>
-                <a:spcPct val="100000"/>
-              </a:lnSpc>
-              <a:spcBef>
-                <a:spcPts val="0"/>
-              </a:spcBef>
-              <a:spcAft>
-                <a:spcPts val="0"/>
-              </a:spcAft>
-              <a:buClrTx/>
-              <a:buSzTx/>
-              <a:buFont typeface="+mj-lt"/>
-              <a:buAutoNum type="arabicPeriod"/>
-              <a:tabLst/>
-              <a:defRPr/>
-            </a:pPr>
-            <a:r>
-              <a:rPr lang="en-US" sz="1100" b="1" dirty="0">
-                <a:effectLst/>
-                <a:latin typeface="+mn-lt"/>
-                <a:ea typeface="Calibri" panose="020F0502020204030204" pitchFamily="34" charset="0"/>
-                <a:cs typeface="LMRoman12-Bold"/>
-              </a:rPr>
-              <a:t>Study code block-by-block, line-by-line</a:t>
-            </a:r>
-          </a:p>
-          <a:p>
-            <a:pPr marL="800100" marR="0" lvl="1" indent="-342900" algn="l" defTabSz="914400" rtl="0" eaLnBrk="1" fontAlgn="auto" latinLnBrk="0" hangingPunct="1">
-              <a:lnSpc>
-                <a:spcPct val="100000"/>
-              </a:lnSpc>
-              <a:spcBef>
-                <a:spcPts val="0"/>
-              </a:spcBef>
-              <a:spcAft>
-                <a:spcPts val="0"/>
-              </a:spcAft>
-              <a:buClrTx/>
-              <a:buSzTx/>
-              <a:buFont typeface="Courier New" panose="02070309020205020404" pitchFamily="49" charset="0"/>
-              <a:buChar char="o"/>
-              <a:tabLst/>
-              <a:defRPr/>
-            </a:pPr>
-            <a:r>
-              <a:rPr lang="en-US" sz="1100" dirty="0">
-                <a:effectLst/>
-                <a:latin typeface="+mn-lt"/>
-                <a:ea typeface="Calibri" panose="020F0502020204030204" pitchFamily="34" charset="0"/>
-                <a:cs typeface="LMRoman10-Regular"/>
-              </a:rPr>
-              <a:t>This means running one block of code at a time and making sure that you understand why the output is what</a:t>
-            </a:r>
-            <a:r>
-              <a:rPr lang="en-US" sz="1100" dirty="0">
-                <a:effectLst/>
-                <a:latin typeface="+mn-lt"/>
-                <a:ea typeface="Calibri" panose="020F0502020204030204" pitchFamily="34" charset="0"/>
-                <a:cs typeface="Times New Roman" panose="02020603050405020304" pitchFamily="18" charset="0"/>
-              </a:rPr>
-              <a:t> </a:t>
-            </a:r>
-            <a:r>
-              <a:rPr lang="en-US" sz="1100" dirty="0">
-                <a:effectLst/>
-                <a:latin typeface="+mn-lt"/>
-                <a:ea typeface="Calibri" panose="020F0502020204030204" pitchFamily="34" charset="0"/>
-                <a:cs typeface="LMRoman10-Regular"/>
-              </a:rPr>
-              <a:t>it is. If things are not clear, it is important to spend more time with that piece of the code. Here are some</a:t>
-            </a:r>
-            <a:r>
-              <a:rPr lang="en-US" sz="1100" dirty="0">
-                <a:effectLst/>
-                <a:latin typeface="+mn-lt"/>
-                <a:ea typeface="Calibri" panose="020F0502020204030204" pitchFamily="34" charset="0"/>
-                <a:cs typeface="Times New Roman" panose="02020603050405020304" pitchFamily="18" charset="0"/>
-              </a:rPr>
-              <a:t> </a:t>
-            </a:r>
-            <a:r>
-              <a:rPr lang="en-US" sz="1100" dirty="0">
-                <a:effectLst/>
-                <a:latin typeface="+mn-lt"/>
-                <a:ea typeface="Calibri" panose="020F0502020204030204" pitchFamily="34" charset="0"/>
-                <a:cs typeface="LMRoman10-Regular"/>
-              </a:rPr>
-              <a:t>tricks that are often helpful to understand a particular piece of code:</a:t>
-            </a:r>
-          </a:p>
-          <a:p>
-            <a:pPr marL="1257300" marR="0" lvl="2" indent="-342900" algn="l" defTabSz="914400" rtl="0" eaLnBrk="1" fontAlgn="auto" latinLnBrk="0" hangingPunct="1">
-              <a:lnSpc>
-                <a:spcPct val="100000"/>
-              </a:lnSpc>
-              <a:spcBef>
-                <a:spcPts val="0"/>
-              </a:spcBef>
-              <a:spcAft>
-                <a:spcPts val="0"/>
-              </a:spcAft>
-              <a:buClrTx/>
-              <a:buSzTx/>
-              <a:buFont typeface="Courier New" panose="02070309020205020404" pitchFamily="49" charset="0"/>
-              <a:buChar char="o"/>
-              <a:tabLst/>
-              <a:defRPr/>
-            </a:pPr>
-            <a:r>
-              <a:rPr lang="en-US" sz="1100" dirty="0">
-                <a:effectLst/>
-                <a:latin typeface="+mn-lt"/>
-                <a:ea typeface="Calibri" panose="020F0502020204030204" pitchFamily="34" charset="0"/>
-                <a:cs typeface="LMRoman10-Regular"/>
-              </a:rPr>
-              <a:t>Break a line of code into its components and try to understand the individual pieces.  Sometimes functions are nested within functions.</a:t>
-            </a:r>
-            <a:endParaRPr lang="en-US" sz="1100" dirty="0">
+            <a:r>
+              <a:rPr lang="en-US" dirty="0"/>
+              <a:t>We often highlight additional resources in the Optional Content / Additional Resources sections of the README file of each workshop series.  Although this series focuses exclusively on the acquisition of a technical skill, it’s always good to see the bigger picture.  These three books will help you do that.</a:t>
+            </a:r>
+            <a:endParaRPr lang="en-US" b="1" i="0" dirty="0">
+              <a:solidFill>
+                <a:srgbClr val="24292F"/>
+              </a:solidFill>
               <a:effectLst/>
-              <a:latin typeface="+mn-lt"/>
-              <a:ea typeface="Calibri" panose="020F0502020204030204" pitchFamily="34" charset="0"/>
-              <a:cs typeface="Times New Roman" panose="02020603050405020304" pitchFamily="18" charset="0"/>
-            </a:endParaRPr>
-          </a:p>
-          <a:p>
-            <a:pPr marL="1257300" marR="0" lvl="2" indent="-342900" algn="l" defTabSz="914400" rtl="0" eaLnBrk="1" fontAlgn="auto" latinLnBrk="0" hangingPunct="1">
-              <a:lnSpc>
-                <a:spcPct val="100000"/>
-              </a:lnSpc>
-              <a:spcBef>
-                <a:spcPts val="0"/>
-              </a:spcBef>
-              <a:spcAft>
-                <a:spcPts val="0"/>
-              </a:spcAft>
-              <a:buClrTx/>
-              <a:buSzTx/>
-              <a:buFont typeface="Courier New" panose="02070309020205020404" pitchFamily="49" charset="0"/>
-              <a:buChar char="o"/>
-              <a:tabLst/>
-              <a:defRPr/>
-            </a:pPr>
-            <a:r>
-              <a:rPr lang="en-US" sz="1100" dirty="0">
-                <a:effectLst/>
-                <a:latin typeface="+mn-lt"/>
-                <a:ea typeface="Calibri" panose="020F0502020204030204" pitchFamily="34" charset="0"/>
-                <a:cs typeface="LMRoman10-Regular"/>
-              </a:rPr>
-              <a:t>Document what each block is doing. Clear documentation is critical as you may not remember what you did when you come back to a piece of code at some point in the future. As a wise programmer once said, “Write code for the future you.” Documentation is also useful when you want to adapt or reuse code in some other way. In situations like this, you will immediately know what a specific chunk of code does because it has been clearly documented.  </a:t>
-            </a:r>
-            <a:r>
-              <a:rPr lang="en-US" sz="1100" b="1" dirty="0">
-                <a:solidFill>
-                  <a:schemeClr val="tx1">
-                    <a:lumMod val="75000"/>
-                    <a:lumOff val="25000"/>
-                  </a:schemeClr>
-                </a:solidFill>
-                <a:effectLst/>
-                <a:latin typeface="+mn-lt"/>
-                <a:ea typeface="Calibri" panose="020F0502020204030204" pitchFamily="34" charset="0"/>
-                <a:cs typeface="LMRoman10-Regular"/>
-              </a:rPr>
-              <a:t>Donald Knuth </a:t>
-            </a:r>
-            <a:r>
-              <a:rPr lang="en-US" sz="1100" dirty="0">
-                <a:effectLst/>
-                <a:latin typeface="+mn-lt"/>
-                <a:ea typeface="Calibri" panose="020F0502020204030204" pitchFamily="34" charset="0"/>
-                <a:cs typeface="LMRoman10-Regular"/>
-              </a:rPr>
-              <a:t>– Literate Programming</a:t>
-            </a:r>
-            <a:endParaRPr lang="en-US" sz="1100" dirty="0">
-              <a:effectLst/>
-              <a:latin typeface="+mn-lt"/>
-              <a:ea typeface="Calibri" panose="020F0502020204030204" pitchFamily="34" charset="0"/>
-              <a:cs typeface="Times New Roman" panose="02020603050405020304" pitchFamily="18" charset="0"/>
-            </a:endParaRPr>
-          </a:p>
-          <a:p>
-            <a:pPr marL="1257300" marR="0" lvl="2" indent="-342900" algn="l" defTabSz="914400" rtl="0" eaLnBrk="1" fontAlgn="auto" latinLnBrk="0" hangingPunct="1">
-              <a:lnSpc>
-                <a:spcPct val="100000"/>
-              </a:lnSpc>
-              <a:spcBef>
-                <a:spcPts val="0"/>
-              </a:spcBef>
-              <a:spcAft>
-                <a:spcPts val="0"/>
-              </a:spcAft>
-              <a:buClrTx/>
-              <a:buSzTx/>
-              <a:buFont typeface="Courier New" panose="02070309020205020404" pitchFamily="49" charset="0"/>
-              <a:buChar char="o"/>
-              <a:tabLst/>
-              <a:defRPr/>
-            </a:pPr>
-            <a:r>
-              <a:rPr lang="en-US" sz="1100" dirty="0">
-                <a:effectLst/>
-                <a:latin typeface="+mn-lt"/>
-                <a:ea typeface="Calibri" panose="020F0502020204030204" pitchFamily="34" charset="0"/>
-                <a:cs typeface="LMRoman10-Regular"/>
-              </a:rPr>
-              <a:t>Perform mini experiments: create a simpler example in which you can tinker with the code and see what happens to the output.</a:t>
-            </a:r>
-            <a:endParaRPr lang="en-US" sz="1100" dirty="0">
-              <a:effectLst/>
-              <a:latin typeface="+mn-lt"/>
-              <a:ea typeface="Calibri" panose="020F0502020204030204" pitchFamily="34" charset="0"/>
-              <a:cs typeface="Times New Roman" panose="02020603050405020304" pitchFamily="18" charset="0"/>
-            </a:endParaRPr>
-          </a:p>
-          <a:p>
-            <a:pPr marL="342900" marR="0" lvl="0" indent="-342900" algn="l" defTabSz="914400" rtl="0" eaLnBrk="1" fontAlgn="auto" latinLnBrk="0" hangingPunct="1">
-              <a:lnSpc>
-                <a:spcPct val="100000"/>
-              </a:lnSpc>
-              <a:spcBef>
-                <a:spcPts val="0"/>
-              </a:spcBef>
-              <a:spcAft>
-                <a:spcPts val="0"/>
-              </a:spcAft>
-              <a:buClrTx/>
-              <a:buSzTx/>
-              <a:buFont typeface="+mj-lt"/>
-              <a:buAutoNum type="arabicPeriod"/>
-              <a:tabLst/>
-              <a:defRPr/>
-            </a:pPr>
-            <a:r>
-              <a:rPr lang="en-US" sz="1100" b="1" dirty="0">
-                <a:effectLst/>
-                <a:latin typeface="+mn-lt"/>
-                <a:ea typeface="Calibri" panose="020F0502020204030204" pitchFamily="34" charset="0"/>
-                <a:cs typeface="LMRoman12-Bold"/>
-              </a:rPr>
-              <a:t>Use the internet to find answers</a:t>
-            </a:r>
-          </a:p>
-          <a:p>
-            <a:pPr marL="800100" marR="0" lvl="1" indent="-342900" algn="l" defTabSz="914400" rtl="0" eaLnBrk="1" fontAlgn="auto" latinLnBrk="0" hangingPunct="1">
-              <a:lnSpc>
-                <a:spcPct val="100000"/>
-              </a:lnSpc>
-              <a:spcBef>
-                <a:spcPts val="0"/>
-              </a:spcBef>
-              <a:spcAft>
-                <a:spcPts val="0"/>
-              </a:spcAft>
-              <a:buClrTx/>
-              <a:buSzTx/>
-              <a:buFont typeface="Courier New" panose="02070309020205020404" pitchFamily="49" charset="0"/>
-              <a:buChar char="o"/>
-              <a:tabLst/>
-              <a:defRPr/>
-            </a:pPr>
-            <a:r>
-              <a:rPr lang="en-US" sz="1100" dirty="0">
-                <a:effectLst/>
-                <a:latin typeface="+mn-lt"/>
-                <a:ea typeface="Calibri" panose="020F0502020204030204" pitchFamily="34" charset="0"/>
-                <a:cs typeface="LMRoman10-Regular"/>
-              </a:rPr>
-              <a:t>Everybody (from novice to more experienced users) relies on the internet when they don’t understand</a:t>
-            </a:r>
-            <a:r>
-              <a:rPr lang="en-US" sz="1100" dirty="0">
-                <a:effectLst/>
-                <a:latin typeface="+mn-lt"/>
-                <a:ea typeface="Calibri" panose="020F0502020204030204" pitchFamily="34" charset="0"/>
-                <a:cs typeface="Times New Roman" panose="02020603050405020304" pitchFamily="18" charset="0"/>
-              </a:rPr>
-              <a:t> </a:t>
-            </a:r>
-            <a:r>
-              <a:rPr lang="en-US" sz="1100" dirty="0">
-                <a:effectLst/>
-                <a:latin typeface="+mn-lt"/>
-                <a:ea typeface="Calibri" panose="020F0502020204030204" pitchFamily="34" charset="0"/>
-                <a:cs typeface="LMRoman10-Regular"/>
-              </a:rPr>
-              <a:t>something. It is likely that other people have already asked (and received useful answers) for the problem</a:t>
-            </a:r>
-            <a:r>
-              <a:rPr lang="en-US" sz="1100" dirty="0">
-                <a:effectLst/>
-                <a:latin typeface="+mn-lt"/>
-                <a:ea typeface="Calibri" panose="020F0502020204030204" pitchFamily="34" charset="0"/>
-                <a:cs typeface="Times New Roman" panose="02020603050405020304" pitchFamily="18" charset="0"/>
-              </a:rPr>
-              <a:t> </a:t>
-            </a:r>
-            <a:r>
-              <a:rPr lang="en-US" sz="1100" dirty="0">
-                <a:effectLst/>
-                <a:latin typeface="+mn-lt"/>
-                <a:ea typeface="Calibri" panose="020F0502020204030204" pitchFamily="34" charset="0"/>
-                <a:cs typeface="LMRoman10-Regular"/>
-              </a:rPr>
-              <a:t>that you are facing. However, finding the exact piece of information that you need might be hard, especially</a:t>
-            </a:r>
-            <a:r>
-              <a:rPr lang="en-US" sz="1100" dirty="0">
-                <a:effectLst/>
-                <a:latin typeface="+mn-lt"/>
-                <a:ea typeface="Calibri" panose="020F0502020204030204" pitchFamily="34" charset="0"/>
-                <a:cs typeface="Times New Roman" panose="02020603050405020304" pitchFamily="18" charset="0"/>
-              </a:rPr>
-              <a:t> </a:t>
-            </a:r>
-            <a:r>
-              <a:rPr lang="en-US" sz="1100" dirty="0">
-                <a:effectLst/>
-                <a:latin typeface="+mn-lt"/>
-                <a:ea typeface="Calibri" panose="020F0502020204030204" pitchFamily="34" charset="0"/>
-                <a:cs typeface="LMRoman10-Regular"/>
-              </a:rPr>
-              <a:t>if you don’t use the correct terms/key words. Learning how to search for the information that you need is</a:t>
-            </a:r>
-            <a:r>
-              <a:rPr lang="en-US" sz="1100" dirty="0">
-                <a:effectLst/>
-                <a:latin typeface="+mn-lt"/>
-                <a:ea typeface="Calibri" panose="020F0502020204030204" pitchFamily="34" charset="0"/>
-                <a:cs typeface="Times New Roman" panose="02020603050405020304" pitchFamily="18" charset="0"/>
-              </a:rPr>
-              <a:t> </a:t>
-            </a:r>
-            <a:r>
-              <a:rPr lang="en-US" sz="1100" dirty="0">
-                <a:effectLst/>
-                <a:latin typeface="+mn-lt"/>
-                <a:ea typeface="Calibri" panose="020F0502020204030204" pitchFamily="34" charset="0"/>
-                <a:cs typeface="LMRoman10-Regular"/>
-              </a:rPr>
-              <a:t>a skill that also takes practice. “</a:t>
-            </a:r>
-            <a:r>
-              <a:rPr lang="en-US" sz="1100" dirty="0" err="1">
-                <a:effectLst/>
-                <a:latin typeface="+mn-lt"/>
-                <a:ea typeface="Calibri" panose="020F0502020204030204" pitchFamily="34" charset="0"/>
-                <a:cs typeface="LMRoman10-Regular"/>
-              </a:rPr>
-              <a:t>Stackoverflow</a:t>
-            </a:r>
-            <a:r>
-              <a:rPr lang="en-US" sz="1100" dirty="0">
-                <a:effectLst/>
-                <a:latin typeface="+mn-lt"/>
-                <a:ea typeface="Calibri" panose="020F0502020204030204" pitchFamily="34" charset="0"/>
-                <a:cs typeface="LMRoman10-Regular"/>
-              </a:rPr>
-              <a:t>” and existing </a:t>
-            </a:r>
-            <a:r>
-              <a:rPr lang="en-US" sz="1100" dirty="0" err="1">
-                <a:effectLst/>
-                <a:latin typeface="+mn-lt"/>
-                <a:ea typeface="Calibri" panose="020F0502020204030204" pitchFamily="34" charset="0"/>
-                <a:cs typeface="LMRoman10-Regular"/>
-              </a:rPr>
-              <a:t>cheatsheets</a:t>
-            </a:r>
-            <a:r>
-              <a:rPr lang="en-US" sz="1100" dirty="0">
-                <a:effectLst/>
-                <a:latin typeface="+mn-lt"/>
-                <a:ea typeface="Calibri" panose="020F0502020204030204" pitchFamily="34" charset="0"/>
-                <a:cs typeface="LMRoman10-Regular"/>
-              </a:rPr>
-              <a:t> can be very helpful.</a:t>
-            </a:r>
-          </a:p>
-          <a:p>
-            <a:pPr marL="342900" marR="0" lvl="0" indent="-342900" algn="l" defTabSz="914400" rtl="0" eaLnBrk="1" fontAlgn="auto" latinLnBrk="0" hangingPunct="1">
-              <a:lnSpc>
-                <a:spcPct val="100000"/>
-              </a:lnSpc>
-              <a:spcBef>
-                <a:spcPts val="0"/>
-              </a:spcBef>
-              <a:spcAft>
-                <a:spcPts val="0"/>
-              </a:spcAft>
-              <a:buClrTx/>
-              <a:buSzTx/>
-              <a:buFont typeface="+mj-lt"/>
-              <a:buAutoNum type="arabicPeriod"/>
-              <a:tabLst/>
-              <a:defRPr/>
-            </a:pPr>
-            <a:r>
-              <a:rPr lang="en-US" sz="1100" b="1" dirty="0">
-                <a:effectLst/>
-                <a:latin typeface="+mn-lt"/>
-                <a:ea typeface="Calibri" panose="020F0502020204030204" pitchFamily="34" charset="0"/>
-                <a:cs typeface="LMRoman10-Regular"/>
-              </a:rPr>
-              <a:t>Ask for Help</a:t>
-            </a:r>
-          </a:p>
-          <a:p>
-            <a:pPr marL="800100" marR="0" lvl="1" indent="-342900" algn="l" defTabSz="914400" rtl="0" eaLnBrk="1" fontAlgn="auto" latinLnBrk="0" hangingPunct="1">
-              <a:lnSpc>
-                <a:spcPct val="100000"/>
-              </a:lnSpc>
-              <a:spcBef>
-                <a:spcPts val="0"/>
-              </a:spcBef>
-              <a:spcAft>
-                <a:spcPts val="0"/>
-              </a:spcAft>
-              <a:buClrTx/>
-              <a:buSzTx/>
-              <a:buFont typeface="Courier New" panose="02070309020205020404" pitchFamily="49" charset="0"/>
-              <a:buChar char="o"/>
-              <a:tabLst/>
-              <a:defRPr/>
-            </a:pPr>
-            <a:r>
-              <a:rPr lang="en-US" sz="1100" b="0" dirty="0">
-                <a:effectLst/>
-                <a:latin typeface="+mn-lt"/>
-                <a:ea typeface="Calibri" panose="020F0502020204030204" pitchFamily="34" charset="0"/>
-                <a:cs typeface="LMRoman10-Regular"/>
-              </a:rPr>
-              <a:t>We’re all learning.  And some days, I feel like I’m the one who has the most to learn.  Alcoa story.</a:t>
-            </a:r>
-          </a:p>
-          <a:p>
-            <a:pPr marL="342900" marR="0" lvl="0" indent="-342900" algn="l" defTabSz="914400" rtl="0" eaLnBrk="1" fontAlgn="auto" latinLnBrk="0" hangingPunct="1">
-              <a:lnSpc>
-                <a:spcPct val="100000"/>
-              </a:lnSpc>
-              <a:spcBef>
-                <a:spcPts val="0"/>
-              </a:spcBef>
-              <a:spcAft>
-                <a:spcPts val="0"/>
-              </a:spcAft>
-              <a:buClrTx/>
-              <a:buSzTx/>
-              <a:buFont typeface="+mj-lt"/>
-              <a:buAutoNum type="arabicPeriod"/>
-              <a:tabLst/>
-              <a:defRPr/>
-            </a:pPr>
-            <a:r>
-              <a:rPr lang="en-US" sz="1100" b="1" dirty="0">
-                <a:effectLst/>
-                <a:latin typeface="+mn-lt"/>
-                <a:ea typeface="Calibri" panose="020F0502020204030204" pitchFamily="34" charset="0"/>
-                <a:cs typeface="LMRoman12-Bold"/>
-              </a:rPr>
-              <a:t>Take your time</a:t>
-            </a:r>
-          </a:p>
-          <a:p>
-            <a:pPr marL="800100" marR="0" lvl="1" indent="-342900" algn="l" defTabSz="914400" rtl="0" eaLnBrk="1" fontAlgn="auto" latinLnBrk="0" hangingPunct="1">
-              <a:lnSpc>
-                <a:spcPct val="100000"/>
-              </a:lnSpc>
-              <a:spcBef>
-                <a:spcPts val="0"/>
-              </a:spcBef>
-              <a:spcAft>
-                <a:spcPts val="0"/>
-              </a:spcAft>
-              <a:buClrTx/>
-              <a:buSzTx/>
-              <a:buFont typeface="Courier New" panose="02070309020205020404" pitchFamily="49" charset="0"/>
-              <a:buChar char="o"/>
-              <a:tabLst/>
-              <a:defRPr/>
-            </a:pPr>
-            <a:r>
-              <a:rPr lang="en-US" sz="1100" dirty="0">
-                <a:effectLst/>
-                <a:latin typeface="+mn-lt"/>
-                <a:ea typeface="Calibri" panose="020F0502020204030204" pitchFamily="34" charset="0"/>
-                <a:cs typeface="LMRoman10-Regular"/>
-              </a:rPr>
-              <a:t>It is important to realize that it takes time to learn AI. What this implies is that you should not</a:t>
-            </a:r>
-            <a:r>
-              <a:rPr lang="en-US" sz="1100" dirty="0">
-                <a:effectLst/>
-                <a:latin typeface="+mn-lt"/>
-                <a:ea typeface="Calibri" panose="020F0502020204030204" pitchFamily="34" charset="0"/>
-                <a:cs typeface="Times New Roman" panose="02020603050405020304" pitchFamily="18" charset="0"/>
-              </a:rPr>
-              <a:t> </a:t>
-            </a:r>
-            <a:r>
-              <a:rPr lang="en-US" sz="1100" dirty="0">
-                <a:effectLst/>
-                <a:latin typeface="+mn-lt"/>
-                <a:ea typeface="Calibri" panose="020F0502020204030204" pitchFamily="34" charset="0"/>
-                <a:cs typeface="LMRoman10-Regular"/>
-              </a:rPr>
-              <a:t>rush to get things done if you want to master this skill. In particular, everybody goes through some level of</a:t>
-            </a:r>
-            <a:r>
-              <a:rPr lang="en-US" sz="1100" dirty="0">
-                <a:effectLst/>
-                <a:latin typeface="+mn-lt"/>
-                <a:ea typeface="Calibri" panose="020F0502020204030204" pitchFamily="34" charset="0"/>
-                <a:cs typeface="Times New Roman" panose="02020603050405020304" pitchFamily="18" charset="0"/>
-              </a:rPr>
-              <a:t> </a:t>
-            </a:r>
-            <a:r>
-              <a:rPr lang="en-US" sz="1100" dirty="0">
-                <a:effectLst/>
-                <a:latin typeface="+mn-lt"/>
-                <a:ea typeface="Calibri" panose="020F0502020204030204" pitchFamily="34" charset="0"/>
-                <a:cs typeface="LMRoman10-Regular"/>
-              </a:rPr>
-              <a:t>struggle and frustration when learning AI. However, once you have mastered it, you will be amazed</a:t>
-            </a:r>
-            <a:r>
-              <a:rPr lang="en-US" sz="1100" dirty="0">
-                <a:effectLst/>
-                <a:latin typeface="+mn-lt"/>
-                <a:ea typeface="Calibri" panose="020F0502020204030204" pitchFamily="34" charset="0"/>
-                <a:cs typeface="Times New Roman" panose="02020603050405020304" pitchFamily="18" charset="0"/>
-              </a:rPr>
-              <a:t> </a:t>
-            </a:r>
-            <a:r>
-              <a:rPr lang="en-US" sz="1100" dirty="0">
-                <a:effectLst/>
-                <a:latin typeface="+mn-lt"/>
-                <a:ea typeface="Calibri" panose="020F0502020204030204" pitchFamily="34" charset="0"/>
-                <a:cs typeface="LMRoman10-Regular"/>
-              </a:rPr>
-              <a:t>by what this skill can do for you.</a:t>
-            </a:r>
-            <a:endParaRPr lang="en-US" sz="1100" dirty="0">
-              <a:effectLst/>
-              <a:latin typeface="+mn-lt"/>
-              <a:ea typeface="Calibri" panose="020F0502020204030204" pitchFamily="34" charset="0"/>
-              <a:cs typeface="Times New Roman" panose="02020603050405020304" pitchFamily="18" charset="0"/>
-            </a:endParaRPr>
-          </a:p>
-          <a:p>
-            <a:pPr marL="342900" marR="0" lvl="0" indent="-342900" algn="l" defTabSz="914400" rtl="0" eaLnBrk="1" fontAlgn="auto" latinLnBrk="0" hangingPunct="1">
-              <a:lnSpc>
-                <a:spcPct val="100000"/>
-              </a:lnSpc>
-              <a:spcBef>
-                <a:spcPts val="0"/>
-              </a:spcBef>
-              <a:spcAft>
-                <a:spcPts val="0"/>
-              </a:spcAft>
-              <a:buClrTx/>
-              <a:buSzTx/>
-              <a:buFont typeface="+mj-lt"/>
-              <a:buAutoNum type="arabicPeriod"/>
-              <a:tabLst/>
-              <a:defRPr/>
-            </a:pPr>
-            <a:endParaRPr lang="en-US" sz="1800" dirty="0">
-              <a:effectLst/>
-              <a:latin typeface="Calibri" panose="020F0502020204030204" pitchFamily="34" charset="0"/>
-              <a:ea typeface="Calibri" panose="020F0502020204030204" pitchFamily="34" charset="0"/>
-              <a:cs typeface="Times New Roman" panose="02020603050405020304" pitchFamily="18" charset="0"/>
-            </a:endParaRPr>
-          </a:p>
-          <a:p>
-            <a:pPr marL="800100" marR="0" lvl="1" indent="-342900" algn="l" defTabSz="914400" rtl="0" eaLnBrk="1" fontAlgn="auto" latinLnBrk="0" hangingPunct="1">
-              <a:lnSpc>
-                <a:spcPct val="100000"/>
-              </a:lnSpc>
-              <a:spcBef>
-                <a:spcPts val="0"/>
-              </a:spcBef>
-              <a:spcAft>
-                <a:spcPts val="0"/>
-              </a:spcAft>
-              <a:buClrTx/>
-              <a:buSzTx/>
-              <a:buFont typeface="Courier New" panose="02070309020205020404" pitchFamily="49" charset="0"/>
-              <a:buChar char="o"/>
-              <a:tabLst/>
-              <a:defRPr/>
-            </a:pPr>
-            <a:endParaRPr lang="en-US" sz="1800" dirty="0">
-              <a:effectLst/>
-              <a:latin typeface="Calibri" panose="020F0502020204030204" pitchFamily="34" charset="0"/>
-              <a:ea typeface="Calibri" panose="020F0502020204030204" pitchFamily="34" charset="0"/>
-              <a:cs typeface="Times New Roman" panose="02020603050405020304" pitchFamily="18" charset="0"/>
-            </a:endParaRPr>
-          </a:p>
-          <a:p>
-            <a:pPr marL="800100" marR="0" lvl="1" indent="-342900" algn="l" defTabSz="914400" rtl="0" eaLnBrk="1" fontAlgn="auto" latinLnBrk="0" hangingPunct="1">
-              <a:lnSpc>
-                <a:spcPct val="100000"/>
-              </a:lnSpc>
-              <a:spcBef>
-                <a:spcPts val="0"/>
-              </a:spcBef>
-              <a:spcAft>
-                <a:spcPts val="0"/>
-              </a:spcAft>
-              <a:buClrTx/>
-              <a:buSzTx/>
-              <a:buFont typeface="+mj-lt"/>
-              <a:buAutoNum type="arabicPeriod"/>
-              <a:tabLst/>
-              <a:defRPr/>
-            </a:pPr>
-            <a:endParaRPr lang="en-US" sz="1800" dirty="0">
-              <a:effectLst/>
-              <a:latin typeface="Calibri" panose="020F0502020204030204" pitchFamily="34" charset="0"/>
-              <a:ea typeface="Calibri" panose="020F0502020204030204" pitchFamily="34" charset="0"/>
-              <a:cs typeface="Times New Roman" panose="02020603050405020304" pitchFamily="18" charset="0"/>
-            </a:endParaRPr>
-          </a:p>
-          <a:p>
-            <a:pPr marL="800100" marR="0" lvl="1" indent="-342900" algn="l" defTabSz="914400" rtl="0" eaLnBrk="1" fontAlgn="auto" latinLnBrk="0" hangingPunct="1">
-              <a:lnSpc>
-                <a:spcPct val="100000"/>
-              </a:lnSpc>
-              <a:spcBef>
-                <a:spcPts val="0"/>
-              </a:spcBef>
-              <a:spcAft>
-                <a:spcPts val="0"/>
-              </a:spcAft>
-              <a:buClrTx/>
-              <a:buSzTx/>
-              <a:buFont typeface="Courier New" panose="02070309020205020404" pitchFamily="49" charset="0"/>
-              <a:buChar char="o"/>
-              <a:tabLst/>
-              <a:defRPr/>
-            </a:pPr>
-            <a:endParaRPr lang="en-US" sz="1800" dirty="0">
-              <a:effectLst/>
-              <a:latin typeface="Times New Roman" panose="02020603050405020304" pitchFamily="18" charset="0"/>
-              <a:ea typeface="Times New Roman" panose="02020603050405020304" pitchFamily="18" charset="0"/>
+              <a:latin typeface="-apple-system"/>
             </a:endParaRPr>
           </a:p>
           <a:p>
@@ -1759,7 +1771,7 @@
     </p:spTree>
     <p:extLst>
       <p:ext uri="{BB962C8B-B14F-4D97-AF65-F5344CB8AC3E}">
-        <p14:creationId xmlns:p14="http://schemas.microsoft.com/office/powerpoint/2010/main" val="1955762856"/>
+        <p14:creationId xmlns:p14="http://schemas.microsoft.com/office/powerpoint/2010/main" val="771029687"/>
       </p:ext>
     </p:extLst>
   </p:cSld>
@@ -1813,90 +1825,6 @@
           <a:bodyPr/>
           <a:lstStyle/>
           <a:p>
-            <a:endParaRPr lang="en-US" dirty="0"/>
-          </a:p>
-        </p:txBody>
-      </p:sp>
-      <p:sp>
-        <p:nvSpPr>
-          <p:cNvPr id="4" name="Slide Number Placeholder 3"/>
-          <p:cNvSpPr>
-            <a:spLocks noGrp="1"/>
-          </p:cNvSpPr>
-          <p:nvPr>
-            <p:ph type="sldNum" sz="quarter" idx="5"/>
-          </p:nvPr>
-        </p:nvSpPr>
-        <p:spPr/>
-        <p:txBody>
-          <a:bodyPr/>
-          <a:lstStyle/>
-          <a:p>
-            <a:fld id="{3148858F-F1DB-4027-9C85-CCA6849540DD}" type="slidenum">
-              <a:rPr lang="en-US" smtClean="0"/>
-              <a:t>5</a:t>
-            </a:fld>
-            <a:endParaRPr lang="en-US"/>
-          </a:p>
-        </p:txBody>
-      </p:sp>
-    </p:spTree>
-    <p:extLst>
-      <p:ext uri="{BB962C8B-B14F-4D97-AF65-F5344CB8AC3E}">
-        <p14:creationId xmlns:p14="http://schemas.microsoft.com/office/powerpoint/2010/main" val="771029687"/>
-      </p:ext>
-    </p:extLst>
-  </p:cSld>
-  <p:clrMapOvr>
-    <a:masterClrMapping/>
-  </p:clrMapOvr>
-</p:notes>
-</file>
-
-<file path=ppt/notesSlides/notesSlide6.xml><?xml version="1.0" encoding="utf-8"?>
-<p:notes xmlns:a="http://schemas.openxmlformats.org/drawingml/2006/main" xmlns:r="http://schemas.openxmlformats.org/officeDocument/2006/relationships" xmlns:p="http://schemas.openxmlformats.org/presentationml/2006/main">
-  <p:cSld>
-    <p:spTree>
-      <p:nvGrpSpPr>
-        <p:cNvPr id="1" name=""/>
-        <p:cNvGrpSpPr/>
-        <p:nvPr/>
-      </p:nvGrpSpPr>
-      <p:grpSpPr>
-        <a:xfrm>
-          <a:off x="0" y="0"/>
-          <a:ext cx="0" cy="0"/>
-          <a:chOff x="0" y="0"/>
-          <a:chExt cx="0" cy="0"/>
-        </a:xfrm>
-      </p:grpSpPr>
-      <p:sp>
-        <p:nvSpPr>
-          <p:cNvPr id="2" name="Slide Image Placeholder 1"/>
-          <p:cNvSpPr>
-            <a:spLocks noGrp="1" noRot="1" noChangeAspect="1"/>
-          </p:cNvSpPr>
-          <p:nvPr>
-            <p:ph type="sldImg"/>
-          </p:nvPr>
-        </p:nvSpPr>
-        <p:spPr/>
-      </p:sp>
-      <p:sp>
-        <p:nvSpPr>
-          <p:cNvPr id="3" name="Notes Placeholder 2"/>
-          <p:cNvSpPr>
-            <a:spLocks noGrp="1"/>
-          </p:cNvSpPr>
-          <p:nvPr>
-            <p:ph type="body" idx="1"/>
-          </p:nvPr>
-        </p:nvSpPr>
-        <p:spPr/>
-        <p:txBody>
-          <a:bodyPr/>
-          <a:lstStyle/>
-          <a:p>
             <a:pPr marL="0" marR="0" lvl="0" indent="0" algn="l" defTabSz="914400" rtl="0" eaLnBrk="1" fontAlgn="auto" latinLnBrk="0" hangingPunct="1">
               <a:lnSpc>
                 <a:spcPct val="100000"/>
@@ -1938,7 +1866,7 @@
           <a:p>
             <a:fld id="{3148858F-F1DB-4027-9C85-CCA6849540DD}" type="slidenum">
               <a:rPr lang="en-US" smtClean="0"/>
-              <a:t>7</a:t>
+              <a:t>5</a:t>
             </a:fld>
             <a:endParaRPr lang="en-US"/>
           </a:p>
@@ -2104,7 +2032,7 @@
           <a:p>
             <a:fld id="{C3F78080-8D0A-4BE8-A5B4-CB115102D524}" type="datetimeFigureOut">
               <a:rPr lang="en-US" smtClean="0"/>
-              <a:t>11/18/2022</a:t>
+              <a:t>1/10/2023</a:t>
             </a:fld>
             <a:endParaRPr lang="en-US"/>
           </a:p>
@@ -2302,7 +2230,7 @@
           <a:p>
             <a:fld id="{C3F78080-8D0A-4BE8-A5B4-CB115102D524}" type="datetimeFigureOut">
               <a:rPr lang="en-US" smtClean="0"/>
-              <a:t>11/18/2022</a:t>
+              <a:t>1/10/2023</a:t>
             </a:fld>
             <a:endParaRPr lang="en-US"/>
           </a:p>
@@ -2510,7 +2438,7 @@
           <a:p>
             <a:fld id="{C3F78080-8D0A-4BE8-A5B4-CB115102D524}" type="datetimeFigureOut">
               <a:rPr lang="en-US" smtClean="0"/>
-              <a:t>11/18/2022</a:t>
+              <a:t>1/10/2023</a:t>
             </a:fld>
             <a:endParaRPr lang="en-US"/>
           </a:p>
@@ -2708,7 +2636,7 @@
           <a:p>
             <a:fld id="{C3F78080-8D0A-4BE8-A5B4-CB115102D524}" type="datetimeFigureOut">
               <a:rPr lang="en-US" smtClean="0"/>
-              <a:t>11/18/2022</a:t>
+              <a:t>1/10/2023</a:t>
             </a:fld>
             <a:endParaRPr lang="en-US"/>
           </a:p>
@@ -2983,7 +2911,7 @@
           <a:p>
             <a:fld id="{C3F78080-8D0A-4BE8-A5B4-CB115102D524}" type="datetimeFigureOut">
               <a:rPr lang="en-US" smtClean="0"/>
-              <a:t>11/18/2022</a:t>
+              <a:t>1/10/2023</a:t>
             </a:fld>
             <a:endParaRPr lang="en-US"/>
           </a:p>
@@ -3248,7 +3176,7 @@
           <a:p>
             <a:fld id="{C3F78080-8D0A-4BE8-A5B4-CB115102D524}" type="datetimeFigureOut">
               <a:rPr lang="en-US" smtClean="0"/>
-              <a:t>11/18/2022</a:t>
+              <a:t>1/10/2023</a:t>
             </a:fld>
             <a:endParaRPr lang="en-US"/>
           </a:p>
@@ -3660,7 +3588,7 @@
           <a:p>
             <a:fld id="{C3F78080-8D0A-4BE8-A5B4-CB115102D524}" type="datetimeFigureOut">
               <a:rPr lang="en-US" smtClean="0"/>
-              <a:t>11/18/2022</a:t>
+              <a:t>1/10/2023</a:t>
             </a:fld>
             <a:endParaRPr lang="en-US"/>
           </a:p>
@@ -3801,7 +3729,7 @@
           <a:p>
             <a:fld id="{C3F78080-8D0A-4BE8-A5B4-CB115102D524}" type="datetimeFigureOut">
               <a:rPr lang="en-US" smtClean="0"/>
-              <a:t>11/18/2022</a:t>
+              <a:t>1/10/2023</a:t>
             </a:fld>
             <a:endParaRPr lang="en-US"/>
           </a:p>
@@ -3914,7 +3842,7 @@
           <a:p>
             <a:fld id="{C3F78080-8D0A-4BE8-A5B4-CB115102D524}" type="datetimeFigureOut">
               <a:rPr lang="en-US" smtClean="0"/>
-              <a:t>11/18/2022</a:t>
+              <a:t>1/10/2023</a:t>
             </a:fld>
             <a:endParaRPr lang="en-US"/>
           </a:p>
@@ -4225,7 +4153,7 @@
           <a:p>
             <a:fld id="{C3F78080-8D0A-4BE8-A5B4-CB115102D524}" type="datetimeFigureOut">
               <a:rPr lang="en-US" smtClean="0"/>
-              <a:t>11/18/2022</a:t>
+              <a:t>1/10/2023</a:t>
             </a:fld>
             <a:endParaRPr lang="en-US"/>
           </a:p>
@@ -4513,7 +4441,7 @@
           <a:p>
             <a:fld id="{C3F78080-8D0A-4BE8-A5B4-CB115102D524}" type="datetimeFigureOut">
               <a:rPr lang="en-US" smtClean="0"/>
-              <a:t>11/18/2022</a:t>
+              <a:t>1/10/2023</a:t>
             </a:fld>
             <a:endParaRPr lang="en-US"/>
           </a:p>
@@ -4754,7 +4682,7 @@
           <a:p>
             <a:fld id="{C3F78080-8D0A-4BE8-A5B4-CB115102D524}" type="datetimeFigureOut">
               <a:rPr lang="en-US" smtClean="0"/>
-              <a:t>11/18/2022</a:t>
+              <a:t>1/10/2023</a:t>
             </a:fld>
             <a:endParaRPr lang="en-US"/>
           </a:p>
@@ -5189,17 +5117,19 @@
         </p:nvSpPr>
         <p:spPr>
           <a:xfrm>
-            <a:off x="844550" y="5105707"/>
+            <a:off x="983094" y="5150691"/>
             <a:ext cx="10515600" cy="670560"/>
           </a:xfrm>
         </p:spPr>
         <p:txBody>
-          <a:bodyPr/>
+          <a:bodyPr>
+            <a:normAutofit/>
+          </a:bodyPr>
           <a:lstStyle/>
           <a:p>
             <a:r>
-              <a:rPr lang="en-US" dirty="0">
-                <a:latin typeface="Palatino Linotype" panose="02040502050505030304" pitchFamily="18" charset="0"/>
+              <a:rPr lang="en-US" sz="2800" dirty="0">
+                <a:latin typeface="Avenir" panose="02000503020000020003" pitchFamily="2" charset="0"/>
                 <a:cs typeface="Segoe UI" panose="020B0502040204020203" pitchFamily="34" charset="0"/>
               </a:rPr>
               <a:t>Introduction to Python</a:t>
@@ -5209,10 +5139,10 @@
       </p:sp>
       <p:pic>
         <p:nvPicPr>
-          <p:cNvPr id="7" name="Picture 6" descr="A picture containing text, clipart&#10;&#10;Description automatically generated">
-            <a:extLst>
-              <a:ext uri="{FF2B5EF4-FFF2-40B4-BE49-F238E27FC236}">
-                <a16:creationId xmlns:a16="http://schemas.microsoft.com/office/drawing/2014/main" id="{77FCCB67-39FD-4BE1-9A26-C0B1DF410887}"/>
+          <p:cNvPr id="5" name="Graphic 4">
+            <a:extLst>
+              <a:ext uri="{FF2B5EF4-FFF2-40B4-BE49-F238E27FC236}">
+                <a16:creationId xmlns:a16="http://schemas.microsoft.com/office/drawing/2014/main" id="{DF27BAC9-5A6D-3E11-357C-BAB7C3DD4FB8}"/>
               </a:ext>
             </a:extLst>
           </p:cNvPr>
@@ -5227,6 +5157,9 @@
               <a:ext uri="{28A0092B-C50C-407E-A947-70E740481C1C}">
                 <a14:useLocalDpi xmlns:a14="http://schemas.microsoft.com/office/drawing/2010/main" val="0"/>
               </a:ext>
+              <a:ext uri="{96DAC541-7B7A-43D3-8B79-37D633B846F1}">
+                <asvg:svgBlip xmlns:asvg="http://schemas.microsoft.com/office/drawing/2016/SVG/main" r:embed="rId4"/>
+              </a:ext>
             </a:extLst>
           </a:blip>
           <a:stretch>
@@ -5235,8 +5168,44 @@
         </p:blipFill>
         <p:spPr>
           <a:xfrm>
-            <a:off x="844551" y="3633112"/>
-            <a:ext cx="6154487" cy="1268482"/>
+            <a:off x="11200705" y="5821251"/>
+            <a:ext cx="864635" cy="864635"/>
+          </a:xfrm>
+          <a:prstGeom prst="rect">
+            <a:avLst/>
+          </a:prstGeom>
+        </p:spPr>
+      </p:pic>
+      <p:pic>
+        <p:nvPicPr>
+          <p:cNvPr id="2" name="Picture 1" descr="Logo&#10;&#10;Description automatically generated">
+            <a:extLst>
+              <a:ext uri="{FF2B5EF4-FFF2-40B4-BE49-F238E27FC236}">
+                <a16:creationId xmlns:a16="http://schemas.microsoft.com/office/drawing/2014/main" id="{892659E9-3D8B-3B83-8D4A-7A89613C0D45}"/>
+              </a:ext>
+            </a:extLst>
+          </p:cNvPr>
+          <p:cNvPicPr>
+            <a:picLocks noChangeAspect="1"/>
+          </p:cNvPicPr>
+          <p:nvPr/>
+        </p:nvPicPr>
+        <p:blipFill>
+          <a:blip r:embed="rId5">
+            <a:extLst>
+              <a:ext uri="{28A0092B-C50C-407E-A947-70E740481C1C}">
+                <a14:useLocalDpi xmlns:a14="http://schemas.microsoft.com/office/drawing/2010/main" val="0"/>
+              </a:ext>
+            </a:extLst>
+          </a:blip>
+          <a:stretch>
+            <a:fillRect/>
+          </a:stretch>
+        </p:blipFill>
+        <p:spPr>
+          <a:xfrm>
+            <a:off x="147918" y="3159872"/>
+            <a:ext cx="7772400" cy="2109073"/>
           </a:xfrm>
           <a:prstGeom prst="rect">
             <a:avLst/>
@@ -5303,7 +5272,7 @@
         </p:nvSpPr>
         <p:spPr>
           <a:xfrm>
-            <a:off x="0" y="365127"/>
+            <a:off x="0" y="434400"/>
             <a:ext cx="12191999" cy="827416"/>
           </a:xfrm>
         </p:spPr>
@@ -5315,14 +5284,14 @@
           <a:p>
             <a:pPr algn="ctr"/>
             <a:r>
-              <a:rPr lang="en-US" sz="4000" dirty="0">
+              <a:rPr lang="en-US" sz="3600" b="1" dirty="0">
                 <a:solidFill>
                   <a:schemeClr val="tx1">
                     <a:lumMod val="75000"/>
                     <a:lumOff val="25000"/>
                   </a:schemeClr>
                 </a:solidFill>
-                <a:latin typeface="Palatino Linotype" panose="02040502050505030304" pitchFamily="18" charset="0"/>
+                <a:latin typeface="Avenir Black" panose="02000503020000020003" pitchFamily="2" charset="0"/>
                 <a:cs typeface="Segoe UI Light" panose="020B0502040204020203" pitchFamily="34" charset="0"/>
               </a:rPr>
               <a:t>Python Workshop Series</a:t>
@@ -5346,7 +5315,12 @@
             <p:ph idx="1"/>
           </p:nvPr>
         </p:nvSpPr>
-        <p:spPr/>
+        <p:spPr>
+          <a:xfrm>
+            <a:off x="838199" y="1548535"/>
+            <a:ext cx="10515600" cy="4351338"/>
+          </a:xfrm>
+        </p:spPr>
         <p:txBody>
           <a:bodyPr>
             <a:normAutofit/>
@@ -5368,7 +5342,7 @@
                     <a:lumOff val="25000"/>
                   </a:schemeClr>
                 </a:solidFill>
-                <a:latin typeface="Palatino Linotype" panose="02040502050505030304" pitchFamily="18" charset="0"/>
+                <a:latin typeface="Avenir" panose="02000503020000020003" pitchFamily="2" charset="0"/>
               </a:rPr>
               <a:t>Python Intro (Part I)</a:t>
             </a:r>
@@ -5389,19 +5363,10 @@
                     <a:lumOff val="25000"/>
                   </a:schemeClr>
                 </a:solidFill>
-                <a:latin typeface="Palatino Linotype" panose="02040502050505030304" pitchFamily="18" charset="0"/>
+                <a:latin typeface="Avenir" panose="02000503020000020003" pitchFamily="2" charset="0"/>
               </a:rPr>
               <a:t>Python Intro (Part II) &amp; Libraries</a:t>
             </a:r>
-            <a:endParaRPr lang="en-US" sz="4000" dirty="0">
-              <a:solidFill>
-                <a:schemeClr val="tx1">
-                  <a:lumMod val="75000"/>
-                  <a:lumOff val="25000"/>
-                </a:schemeClr>
-              </a:solidFill>
-              <a:latin typeface="Palatino Linotype" panose="02040502050505030304" pitchFamily="18" charset="0"/>
-            </a:endParaRPr>
           </a:p>
           <a:p>
             <a:pPr marL="514350" indent="-514350">
@@ -5419,7 +5384,7 @@
                     <a:lumOff val="25000"/>
                   </a:schemeClr>
                 </a:solidFill>
-                <a:latin typeface="Palatino Linotype" panose="02040502050505030304" pitchFamily="18" charset="0"/>
+                <a:latin typeface="Avenir" panose="02000503020000020003" pitchFamily="2" charset="0"/>
               </a:rPr>
               <a:t>Loops, Conditionals, Functions</a:t>
             </a:r>
@@ -5440,13 +5405,49 @@
                     <a:lumOff val="25000"/>
                   </a:schemeClr>
                 </a:solidFill>
-                <a:latin typeface="Palatino Linotype" panose="02040502050505030304" pitchFamily="18" charset="0"/>
+                <a:latin typeface="Avenir" panose="02000503020000020003" pitchFamily="2" charset="0"/>
               </a:rPr>
               <a:t>Data Wrangling</a:t>
             </a:r>
           </a:p>
         </p:txBody>
       </p:sp>
+      <p:pic>
+        <p:nvPicPr>
+          <p:cNvPr id="5" name="Picture 4" descr="A picture containing dark, gauge&#10;&#10;Description automatically generated">
+            <a:extLst>
+              <a:ext uri="{FF2B5EF4-FFF2-40B4-BE49-F238E27FC236}">
+                <a16:creationId xmlns:a16="http://schemas.microsoft.com/office/drawing/2014/main" id="{D8E6060C-1B45-5B40-59EC-374B080840B8}"/>
+              </a:ext>
+            </a:extLst>
+          </p:cNvPr>
+          <p:cNvPicPr>
+            <a:picLocks noChangeAspect="1"/>
+          </p:cNvPicPr>
+          <p:nvPr/>
+        </p:nvPicPr>
+        <p:blipFill>
+          <a:blip r:embed="rId3">
+            <a:extLst>
+              <a:ext uri="{28A0092B-C50C-407E-A947-70E740481C1C}">
+                <a14:useLocalDpi xmlns:a14="http://schemas.microsoft.com/office/drawing/2010/main" val="0"/>
+              </a:ext>
+            </a:extLst>
+          </a:blip>
+          <a:stretch>
+            <a:fillRect/>
+          </a:stretch>
+        </p:blipFill>
+        <p:spPr>
+          <a:xfrm>
+            <a:off x="11378037" y="6045200"/>
+            <a:ext cx="800100" cy="812800"/>
+          </a:xfrm>
+          <a:prstGeom prst="rect">
+            <a:avLst/>
+          </a:prstGeom>
+        </p:spPr>
+      </p:pic>
     </p:spTree>
     <p:extLst>
       <p:ext uri="{BB962C8B-B14F-4D97-AF65-F5344CB8AC3E}">
@@ -5491,10 +5492,10 @@
       </p:grpSpPr>
       <p:sp>
         <p:nvSpPr>
-          <p:cNvPr id="2" name="Title 1">
-            <a:extLst>
-              <a:ext uri="{FF2B5EF4-FFF2-40B4-BE49-F238E27FC236}">
-                <a16:creationId xmlns:a16="http://schemas.microsoft.com/office/drawing/2014/main" id="{8306FF31-301F-43F0-8202-A782726E446A}"/>
+          <p:cNvPr id="5" name="Title 4">
+            <a:extLst>
+              <a:ext uri="{FF2B5EF4-FFF2-40B4-BE49-F238E27FC236}">
+                <a16:creationId xmlns:a16="http://schemas.microsoft.com/office/drawing/2014/main" id="{99E17A22-518F-48AE-8AA1-8DFB9FA5D388}"/>
               </a:ext>
             </a:extLst>
           </p:cNvPr>
@@ -5507,8 +5508,8 @@
         </p:nvSpPr>
         <p:spPr>
           <a:xfrm>
-            <a:off x="0" y="365127"/>
-            <a:ext cx="12191999" cy="827416"/>
+            <a:off x="0" y="365126"/>
+            <a:ext cx="12192000" cy="920749"/>
           </a:xfrm>
         </p:spPr>
         <p:txBody>
@@ -5519,217 +5520,14 @@
           <a:p>
             <a:pPr algn="ctr"/>
             <a:r>
-              <a:rPr lang="en-US" sz="4000" dirty="0">
+              <a:rPr lang="en-US" sz="3600" b="1" dirty="0">
                 <a:solidFill>
                   <a:schemeClr val="tx1">
                     <a:lumMod val="75000"/>
                     <a:lumOff val="25000"/>
                   </a:schemeClr>
                 </a:solidFill>
-                <a:latin typeface="Palatino Linotype" panose="02040502050505030304" pitchFamily="18" charset="0"/>
-                <a:cs typeface="Segoe UI Light" panose="020B0502040204020203" pitchFamily="34" charset="0"/>
-              </a:rPr>
-              <a:t>Audience</a:t>
-            </a:r>
-          </a:p>
-        </p:txBody>
-      </p:sp>
-      <p:pic>
-        <p:nvPicPr>
-          <p:cNvPr id="1026" name="Picture 2" descr="Movie Audience Wearing 3d Glasses Print Cinema Spectators | Etsy in 2022 |  3d glasses, Glasses print, Photo art">
-            <a:extLst>
-              <a:ext uri="{FF2B5EF4-FFF2-40B4-BE49-F238E27FC236}">
-                <a16:creationId xmlns:a16="http://schemas.microsoft.com/office/drawing/2014/main" id="{A97A21E1-767D-44BC-B0AD-D57A183ECFB7}"/>
-              </a:ext>
-            </a:extLst>
-          </p:cNvPr>
-          <p:cNvPicPr>
-            <a:picLocks noChangeAspect="1" noChangeArrowheads="1"/>
-          </p:cNvPicPr>
-          <p:nvPr/>
-        </p:nvPicPr>
-        <p:blipFill>
-          <a:blip r:embed="rId3">
-            <a:extLst>
-              <a:ext uri="{28A0092B-C50C-407E-A947-70E740481C1C}">
-                <a14:useLocalDpi xmlns:a14="http://schemas.microsoft.com/office/drawing/2010/main" val="0"/>
-              </a:ext>
-            </a:extLst>
-          </a:blip>
-          <a:srcRect/>
-          <a:stretch>
-            <a:fillRect/>
-          </a:stretch>
-        </p:blipFill>
-        <p:spPr bwMode="auto">
-          <a:xfrm>
-            <a:off x="4424989" y="1628362"/>
-            <a:ext cx="3342022" cy="4177527"/>
-          </a:xfrm>
-          <a:prstGeom prst="rect">
-            <a:avLst/>
-          </a:prstGeom>
-          <a:noFill/>
-          <a:effectLst>
-            <a:outerShdw blurRad="50800" dist="38100" dir="2700000" algn="tl" rotWithShape="0">
-              <a:prstClr val="black">
-                <a:alpha val="40000"/>
-              </a:prstClr>
-            </a:outerShdw>
-          </a:effectLst>
-          <a:extLst>
-            <a:ext uri="{909E8E84-426E-40DD-AFC4-6F175D3DCCD1}">
-              <a14:hiddenFill xmlns:a14="http://schemas.microsoft.com/office/drawing/2010/main">
-                <a:solidFill>
-                  <a:srgbClr val="FFFFFF"/>
-                </a:solidFill>
-              </a14:hiddenFill>
-            </a:ext>
-          </a:extLst>
-        </p:spPr>
-      </p:pic>
-      <p:sp>
-        <p:nvSpPr>
-          <p:cNvPr id="4" name="TextBox 3">
-            <a:extLst>
-              <a:ext uri="{FF2B5EF4-FFF2-40B4-BE49-F238E27FC236}">
-                <a16:creationId xmlns:a16="http://schemas.microsoft.com/office/drawing/2014/main" id="{D9374C58-4DB1-4DF7-A3B9-688B76E7FA7B}"/>
-              </a:ext>
-            </a:extLst>
-          </p:cNvPr>
-          <p:cNvSpPr txBox="1"/>
-          <p:nvPr/>
-        </p:nvSpPr>
-        <p:spPr>
-          <a:xfrm>
-            <a:off x="0" y="6550223"/>
-            <a:ext cx="12192000" cy="523220"/>
-          </a:xfrm>
-          <a:prstGeom prst="rect">
-            <a:avLst/>
-          </a:prstGeom>
-          <a:noFill/>
-        </p:spPr>
-        <p:txBody>
-          <a:bodyPr wrap="square" rtlCol="0">
-            <a:spAutoFit/>
-          </a:bodyPr>
-          <a:lstStyle/>
-          <a:p>
-            <a:r>
-              <a:rPr lang="en-US" sz="1400" dirty="0">
-                <a:solidFill>
-                  <a:schemeClr val="tx1">
-                    <a:lumMod val="65000"/>
-                    <a:lumOff val="35000"/>
-                  </a:schemeClr>
-                </a:solidFill>
-                <a:latin typeface="+mj-lt"/>
-                <a:ea typeface="Verdana" panose="020B0604030504040204" pitchFamily="34" charset="0"/>
-              </a:rPr>
-              <a:t>Image Credit: </a:t>
-            </a:r>
-            <a:r>
-              <a:rPr lang="en-US" sz="1400" dirty="0">
-                <a:latin typeface="+mj-lt"/>
-              </a:rPr>
-              <a:t>https://www.pinterest.com/pin/movie-audience-wearing-3d-glasses-print-cinema-spectators--1125829606821478194/</a:t>
-            </a:r>
-          </a:p>
-          <a:p>
-            <a:endParaRPr lang="en-US" sz="1400" dirty="0">
-              <a:solidFill>
-                <a:schemeClr val="tx1">
-                  <a:lumMod val="65000"/>
-                  <a:lumOff val="35000"/>
-                </a:schemeClr>
-              </a:solidFill>
-              <a:latin typeface="+mj-lt"/>
-              <a:ea typeface="Verdana" panose="020B0604030504040204" pitchFamily="34" charset="0"/>
-            </a:endParaRPr>
-          </a:p>
-        </p:txBody>
-      </p:sp>
-    </p:spTree>
-    <p:extLst>
-      <p:ext uri="{BB962C8B-B14F-4D97-AF65-F5344CB8AC3E}">
-        <p14:creationId xmlns:p14="http://schemas.microsoft.com/office/powerpoint/2010/main" val="2037991049"/>
-      </p:ext>
-    </p:extLst>
-  </p:cSld>
-  <p:clrMapOvr>
-    <a:masterClrMapping/>
-  </p:clrMapOvr>
-  <mc:AlternateContent xmlns:mc="http://schemas.openxmlformats.org/markup-compatibility/2006" xmlns:p14="http://schemas.microsoft.com/office/powerpoint/2010/main">
-    <mc:Choice Requires="p14">
-      <p:transition spd="med" p14:dur="700">
-        <p:fade/>
-      </p:transition>
-    </mc:Choice>
-    <mc:Fallback xmlns="">
-      <p:transition spd="med">
-        <p:fade/>
-      </p:transition>
-    </mc:Fallback>
-  </mc:AlternateContent>
-</p:sld>
-</file>
-
-<file path=ppt/slides/slide4.xml><?xml version="1.0" encoding="utf-8"?>
-<p:sld xmlns:a="http://schemas.openxmlformats.org/drawingml/2006/main" xmlns:r="http://schemas.openxmlformats.org/officeDocument/2006/relationships" xmlns:p="http://schemas.openxmlformats.org/presentationml/2006/main">
-  <p:cSld>
-    <p:spTree>
-      <p:nvGrpSpPr>
-        <p:cNvPr id="1" name=""/>
-        <p:cNvGrpSpPr/>
-        <p:nvPr/>
-      </p:nvGrpSpPr>
-      <p:grpSpPr>
-        <a:xfrm>
-          <a:off x="0" y="0"/>
-          <a:ext cx="0" cy="0"/>
-          <a:chOff x="0" y="0"/>
-          <a:chExt cx="0" cy="0"/>
-        </a:xfrm>
-      </p:grpSpPr>
-      <p:sp>
-        <p:nvSpPr>
-          <p:cNvPr id="5" name="Title 4">
-            <a:extLst>
-              <a:ext uri="{FF2B5EF4-FFF2-40B4-BE49-F238E27FC236}">
-                <a16:creationId xmlns:a16="http://schemas.microsoft.com/office/drawing/2014/main" id="{99E17A22-518F-48AE-8AA1-8DFB9FA5D388}"/>
-              </a:ext>
-            </a:extLst>
-          </p:cNvPr>
-          <p:cNvSpPr>
-            <a:spLocks noGrp="1"/>
-          </p:cNvSpPr>
-          <p:nvPr>
-            <p:ph type="title"/>
-          </p:nvPr>
-        </p:nvSpPr>
-        <p:spPr>
-          <a:xfrm>
-            <a:off x="0" y="365126"/>
-            <a:ext cx="12192000" cy="920749"/>
-          </a:xfrm>
-        </p:spPr>
-        <p:txBody>
-          <a:bodyPr>
-            <a:normAutofit/>
-          </a:bodyPr>
-          <a:lstStyle/>
-          <a:p>
-            <a:pPr algn="ctr"/>
-            <a:r>
-              <a:rPr lang="en-US" sz="4800" dirty="0">
-                <a:solidFill>
-                  <a:schemeClr val="tx1">
-                    <a:lumMod val="75000"/>
-                    <a:lumOff val="25000"/>
-                  </a:schemeClr>
-                </a:solidFill>
-                <a:latin typeface="Palatino Linotype" panose="02040502050505030304" pitchFamily="18" charset="0"/>
+                <a:latin typeface="Avenir Black" panose="02000503020000020003" pitchFamily="2" charset="0"/>
               </a:rPr>
               <a:t>Learning Strategies</a:t>
             </a:r>
@@ -5765,8 +5563,8 @@
           <a:lstStyle/>
           <a:p>
             <a:pPr marL="457200" indent="-457200">
-              <a:buFont typeface="Wingdings" panose="05000000000000000000" pitchFamily="2" charset="2"/>
-              <a:buChar char="Ø"/>
+              <a:buFont typeface="Wingdings" pitchFamily="2" charset="2"/>
+              <a:buChar char="§"/>
             </a:pPr>
             <a:r>
               <a:rPr lang="en-US" sz="2800" dirty="0">
@@ -5776,7 +5574,7 @@
                     <a:lumOff val="25000"/>
                   </a:schemeClr>
                 </a:solidFill>
-                <a:latin typeface="Palatino Linotype" panose="02040502050505030304" pitchFamily="18" charset="0"/>
+                <a:latin typeface="Avenir" panose="02000503020000020003" pitchFamily="2" charset="0"/>
               </a:rPr>
               <a:t>Focus</a:t>
             </a:r>
@@ -5812,8 +5610,8 @@
           <a:lstStyle/>
           <a:p>
             <a:pPr marL="457200" indent="-457200">
-              <a:buFont typeface="Wingdings" panose="05000000000000000000" pitchFamily="2" charset="2"/>
-              <a:buChar char="Ø"/>
+              <a:buFont typeface="Wingdings" pitchFamily="2" charset="2"/>
+              <a:buChar char="§"/>
             </a:pPr>
             <a:r>
               <a:rPr lang="en-US" sz="2800" dirty="0">
@@ -5823,7 +5621,7 @@
                     <a:lumOff val="25000"/>
                   </a:schemeClr>
                 </a:solidFill>
-                <a:latin typeface="Palatino Linotype" panose="02040502050505030304" pitchFamily="18" charset="0"/>
+                <a:latin typeface="Avenir" panose="02000503020000020003" pitchFamily="2" charset="0"/>
               </a:rPr>
               <a:t>Avoid “Copy and Paste” </a:t>
             </a:r>
@@ -5859,8 +5657,8 @@
           <a:lstStyle/>
           <a:p>
             <a:pPr marL="457200" indent="-457200">
-              <a:buFont typeface="Wingdings" panose="05000000000000000000" pitchFamily="2" charset="2"/>
-              <a:buChar char="Ø"/>
+              <a:buFont typeface="Wingdings" pitchFamily="2" charset="2"/>
+              <a:buChar char="§"/>
             </a:pPr>
             <a:r>
               <a:rPr lang="en-US" sz="2800" dirty="0">
@@ -5870,7 +5668,7 @@
                     <a:lumOff val="25000"/>
                   </a:schemeClr>
                 </a:solidFill>
-                <a:latin typeface="Palatino Linotype" panose="02040502050505030304" pitchFamily="18" charset="0"/>
+                <a:latin typeface="Avenir" panose="02000503020000020003" pitchFamily="2" charset="0"/>
               </a:rPr>
               <a:t>Study Code Block-by-Block / Line-by-Line</a:t>
             </a:r>
@@ -5906,8 +5704,8 @@
           <a:lstStyle/>
           <a:p>
             <a:pPr marL="457200" indent="-457200">
-              <a:buFont typeface="Wingdings" panose="05000000000000000000" pitchFamily="2" charset="2"/>
-              <a:buChar char="Ø"/>
+              <a:buFont typeface="Wingdings" pitchFamily="2" charset="2"/>
+              <a:buChar char="§"/>
             </a:pPr>
             <a:r>
               <a:rPr lang="en-US" sz="2800" dirty="0">
@@ -5917,7 +5715,7 @@
                     <a:lumOff val="25000"/>
                   </a:schemeClr>
                 </a:solidFill>
-                <a:latin typeface="Palatino Linotype" panose="02040502050505030304" pitchFamily="18" charset="0"/>
+                <a:latin typeface="Avenir" panose="02000503020000020003" pitchFamily="2" charset="0"/>
               </a:rPr>
               <a:t>Use the Internet to Find Answers</a:t>
             </a:r>
@@ -5953,8 +5751,8 @@
           <a:lstStyle/>
           <a:p>
             <a:pPr marL="457200" indent="-457200">
-              <a:buFont typeface="Wingdings" panose="05000000000000000000" pitchFamily="2" charset="2"/>
-              <a:buChar char="Ø"/>
+              <a:buFont typeface="Wingdings" pitchFamily="2" charset="2"/>
+              <a:buChar char="§"/>
             </a:pPr>
             <a:r>
               <a:rPr lang="en-US" sz="2800" dirty="0">
@@ -5964,7 +5762,7 @@
                     <a:lumOff val="25000"/>
                   </a:schemeClr>
                 </a:solidFill>
-                <a:latin typeface="Palatino Linotype" panose="02040502050505030304" pitchFamily="18" charset="0"/>
+                <a:latin typeface="Avenir" panose="02000503020000020003" pitchFamily="2" charset="0"/>
               </a:rPr>
               <a:t>Ask for Help</a:t>
             </a:r>
@@ -6000,8 +5798,8 @@
           <a:lstStyle/>
           <a:p>
             <a:pPr marL="457200" indent="-457200">
-              <a:buFont typeface="Wingdings" panose="05000000000000000000" pitchFamily="2" charset="2"/>
-              <a:buChar char="Ø"/>
+              <a:buFont typeface="Wingdings" pitchFamily="2" charset="2"/>
+              <a:buChar char="§"/>
             </a:pPr>
             <a:r>
               <a:rPr lang="en-US" sz="2800" dirty="0">
@@ -6011,7 +5809,7 @@
                     <a:lumOff val="25000"/>
                   </a:schemeClr>
                 </a:solidFill>
-                <a:latin typeface="Palatino Linotype" panose="02040502050505030304" pitchFamily="18" charset="0"/>
+                <a:latin typeface="Avenir" panose="02000503020000020003" pitchFamily="2" charset="0"/>
               </a:rPr>
               <a:t>Take Your Time</a:t>
             </a:r>
@@ -6086,6 +5884,42 @@
           </a:p>
         </p:txBody>
       </p:sp>
+      <p:pic>
+        <p:nvPicPr>
+          <p:cNvPr id="13" name="Picture 12" descr="A picture containing dark, gauge&#10;&#10;Description automatically generated">
+            <a:extLst>
+              <a:ext uri="{FF2B5EF4-FFF2-40B4-BE49-F238E27FC236}">
+                <a16:creationId xmlns:a16="http://schemas.microsoft.com/office/drawing/2014/main" id="{5167A017-3AA1-BFB9-5E6C-8D7A4DB8ED66}"/>
+              </a:ext>
+            </a:extLst>
+          </p:cNvPr>
+          <p:cNvPicPr>
+            <a:picLocks noChangeAspect="1"/>
+          </p:cNvPicPr>
+          <p:nvPr/>
+        </p:nvPicPr>
+        <p:blipFill>
+          <a:blip r:embed="rId3">
+            <a:extLst>
+              <a:ext uri="{28A0092B-C50C-407E-A947-70E740481C1C}">
+                <a14:useLocalDpi xmlns:a14="http://schemas.microsoft.com/office/drawing/2010/main" val="0"/>
+              </a:ext>
+            </a:extLst>
+          </a:blip>
+          <a:stretch>
+            <a:fillRect/>
+          </a:stretch>
+        </p:blipFill>
+        <p:spPr>
+          <a:xfrm>
+            <a:off x="11378037" y="6045200"/>
+            <a:ext cx="800100" cy="812800"/>
+          </a:xfrm>
+          <a:prstGeom prst="rect">
+            <a:avLst/>
+          </a:prstGeom>
+        </p:spPr>
+      </p:pic>
     </p:spTree>
     <p:extLst>
       <p:ext uri="{BB962C8B-B14F-4D97-AF65-F5344CB8AC3E}">
@@ -6413,7 +6247,7 @@
 </p:sld>
 </file>
 
-<file path=ppt/slides/slide5.xml><?xml version="1.0" encoding="utf-8"?>
+<file path=ppt/slides/slide4.xml><?xml version="1.0" encoding="utf-8"?>
 <p:sld xmlns:a="http://schemas.openxmlformats.org/drawingml/2006/main" xmlns:r="http://schemas.openxmlformats.org/officeDocument/2006/relationships" xmlns:p="http://schemas.openxmlformats.org/presentationml/2006/main">
   <p:cSld>
     <p:spTree>
@@ -6581,10 +6415,171 @@
           </a:extLst>
         </p:spPr>
       </p:pic>
+      <p:pic>
+        <p:nvPicPr>
+          <p:cNvPr id="5" name="Picture 4" descr="A picture containing dark, gauge&#10;&#10;Description automatically generated">
+            <a:extLst>
+              <a:ext uri="{FF2B5EF4-FFF2-40B4-BE49-F238E27FC236}">
+                <a16:creationId xmlns:a16="http://schemas.microsoft.com/office/drawing/2014/main" id="{3C93E1AE-B47F-6FB3-D05A-3B4FA7B5732A}"/>
+              </a:ext>
+            </a:extLst>
+          </p:cNvPr>
+          <p:cNvPicPr>
+            <a:picLocks noChangeAspect="1"/>
+          </p:cNvPicPr>
+          <p:nvPr/>
+        </p:nvPicPr>
+        <p:blipFill>
+          <a:blip r:embed="rId6">
+            <a:extLst>
+              <a:ext uri="{28A0092B-C50C-407E-A947-70E740481C1C}">
+                <a14:useLocalDpi xmlns:a14="http://schemas.microsoft.com/office/drawing/2010/main" val="0"/>
+              </a:ext>
+            </a:extLst>
+          </a:blip>
+          <a:stretch>
+            <a:fillRect/>
+          </a:stretch>
+        </p:blipFill>
+        <p:spPr>
+          <a:xfrm>
+            <a:off x="11378037" y="6045200"/>
+            <a:ext cx="800100" cy="812800"/>
+          </a:xfrm>
+          <a:prstGeom prst="rect">
+            <a:avLst/>
+          </a:prstGeom>
+        </p:spPr>
+      </p:pic>
     </p:spTree>
     <p:extLst>
       <p:ext uri="{BB962C8B-B14F-4D97-AF65-F5344CB8AC3E}">
         <p14:creationId xmlns:p14="http://schemas.microsoft.com/office/powerpoint/2010/main" val="3550115435"/>
+      </p:ext>
+    </p:extLst>
+  </p:cSld>
+  <p:clrMapOvr>
+    <a:masterClrMapping/>
+  </p:clrMapOvr>
+  <mc:AlternateContent xmlns:mc="http://schemas.openxmlformats.org/markup-compatibility/2006" xmlns:p14="http://schemas.microsoft.com/office/powerpoint/2010/main">
+    <mc:Choice Requires="p14">
+      <p:transition spd="med" p14:dur="700">
+        <p:fade/>
+      </p:transition>
+    </mc:Choice>
+    <mc:Fallback xmlns="">
+      <p:transition spd="med">
+        <p:fade/>
+      </p:transition>
+    </mc:Fallback>
+  </mc:AlternateContent>
+</p:sld>
+</file>
+
+<file path=ppt/slides/slide5.xml><?xml version="1.0" encoding="utf-8"?>
+<p:sld xmlns:a="http://schemas.openxmlformats.org/drawingml/2006/main" xmlns:r="http://schemas.openxmlformats.org/officeDocument/2006/relationships" xmlns:p="http://schemas.openxmlformats.org/presentationml/2006/main">
+  <p:cSld>
+    <p:spTree>
+      <p:nvGrpSpPr>
+        <p:cNvPr id="1" name=""/>
+        <p:cNvGrpSpPr/>
+        <p:nvPr/>
+      </p:nvGrpSpPr>
+      <p:grpSpPr>
+        <a:xfrm>
+          <a:off x="0" y="0"/>
+          <a:ext cx="0" cy="0"/>
+          <a:chOff x="0" y="0"/>
+          <a:chExt cx="0" cy="0"/>
+        </a:xfrm>
+      </p:grpSpPr>
+      <p:pic>
+        <p:nvPicPr>
+          <p:cNvPr id="1026" name="Picture 2" descr="Project Jupyter - Wikipedia">
+            <a:extLst>
+              <a:ext uri="{FF2B5EF4-FFF2-40B4-BE49-F238E27FC236}">
+                <a16:creationId xmlns:a16="http://schemas.microsoft.com/office/drawing/2014/main" id="{2E199D10-634D-4257-BA3C-C6BFAF6D0A76}"/>
+              </a:ext>
+            </a:extLst>
+          </p:cNvPr>
+          <p:cNvPicPr>
+            <a:picLocks noChangeAspect="1" noChangeArrowheads="1"/>
+          </p:cNvPicPr>
+          <p:nvPr/>
+        </p:nvPicPr>
+        <p:blipFill>
+          <a:blip r:embed="rId3">
+            <a:extLst>
+              <a:ext uri="{28A0092B-C50C-407E-A947-70E740481C1C}">
+                <a14:useLocalDpi xmlns:a14="http://schemas.microsoft.com/office/drawing/2010/main" val="0"/>
+              </a:ext>
+            </a:extLst>
+          </a:blip>
+          <a:srcRect/>
+          <a:stretch>
+            <a:fillRect/>
+          </a:stretch>
+        </p:blipFill>
+        <p:spPr bwMode="auto">
+          <a:xfrm>
+            <a:off x="4581999" y="1674108"/>
+            <a:ext cx="3028001" cy="3509783"/>
+          </a:xfrm>
+          <a:prstGeom prst="rect">
+            <a:avLst/>
+          </a:prstGeom>
+          <a:noFill/>
+          <a:extLst>
+            <a:ext uri="{909E8E84-426E-40DD-AFC4-6F175D3DCCD1}">
+              <a14:hiddenFill xmlns:a14="http://schemas.microsoft.com/office/drawing/2010/main">
+                <a:solidFill>
+                  <a:srgbClr val="FFFFFF"/>
+                </a:solidFill>
+              </a14:hiddenFill>
+            </a:ext>
+          </a:extLst>
+        </p:spPr>
+      </p:pic>
+      <p:pic>
+        <p:nvPicPr>
+          <p:cNvPr id="3" name="Picture 2" descr="A picture containing dark, gauge&#10;&#10;Description automatically generated">
+            <a:extLst>
+              <a:ext uri="{FF2B5EF4-FFF2-40B4-BE49-F238E27FC236}">
+                <a16:creationId xmlns:a16="http://schemas.microsoft.com/office/drawing/2014/main" id="{72A9A38D-4A89-28B3-5130-307F350F651B}"/>
+              </a:ext>
+            </a:extLst>
+          </p:cNvPr>
+          <p:cNvPicPr>
+            <a:picLocks noChangeAspect="1"/>
+          </p:cNvPicPr>
+          <p:nvPr/>
+        </p:nvPicPr>
+        <p:blipFill>
+          <a:blip r:embed="rId4">
+            <a:extLst>
+              <a:ext uri="{28A0092B-C50C-407E-A947-70E740481C1C}">
+                <a14:useLocalDpi xmlns:a14="http://schemas.microsoft.com/office/drawing/2010/main" val="0"/>
+              </a:ext>
+            </a:extLst>
+          </a:blip>
+          <a:stretch>
+            <a:fillRect/>
+          </a:stretch>
+        </p:blipFill>
+        <p:spPr>
+          <a:xfrm>
+            <a:off x="11378037" y="6045200"/>
+            <a:ext cx="800100" cy="812800"/>
+          </a:xfrm>
+          <a:prstGeom prst="rect">
+            <a:avLst/>
+          </a:prstGeom>
+        </p:spPr>
+      </p:pic>
+    </p:spTree>
+    <p:extLst>
+      <p:ext uri="{BB962C8B-B14F-4D97-AF65-F5344CB8AC3E}">
+        <p14:creationId xmlns:p14="http://schemas.microsoft.com/office/powerpoint/2010/main" val="2383651979"/>
       </p:ext>
     </p:extLst>
   </p:cSld>
@@ -6683,95 +6678,6 @@
   <p:clrMapOvr>
     <a:masterClrMapping/>
   </p:clrMapOvr>
-</p:sld>
-</file>
-
-<file path=ppt/slides/slide7.xml><?xml version="1.0" encoding="utf-8"?>
-<p:sld xmlns:a="http://schemas.openxmlformats.org/drawingml/2006/main" xmlns:r="http://schemas.openxmlformats.org/officeDocument/2006/relationships" xmlns:p="http://schemas.openxmlformats.org/presentationml/2006/main">
-  <p:cSld>
-    <p:spTree>
-      <p:nvGrpSpPr>
-        <p:cNvPr id="1" name=""/>
-        <p:cNvGrpSpPr/>
-        <p:nvPr/>
-      </p:nvGrpSpPr>
-      <p:grpSpPr>
-        <a:xfrm>
-          <a:off x="0" y="0"/>
-          <a:ext cx="0" cy="0"/>
-          <a:chOff x="0" y="0"/>
-          <a:chExt cx="0" cy="0"/>
-        </a:xfrm>
-      </p:grpSpPr>
-      <p:pic>
-        <p:nvPicPr>
-          <p:cNvPr id="1026" name="Picture 2" descr="Project Jupyter - Wikipedia">
-            <a:extLst>
-              <a:ext uri="{FF2B5EF4-FFF2-40B4-BE49-F238E27FC236}">
-                <a16:creationId xmlns:a16="http://schemas.microsoft.com/office/drawing/2014/main" id="{2E199D10-634D-4257-BA3C-C6BFAF6D0A76}"/>
-              </a:ext>
-            </a:extLst>
-          </p:cNvPr>
-          <p:cNvPicPr>
-            <a:picLocks noChangeAspect="1" noChangeArrowheads="1"/>
-          </p:cNvPicPr>
-          <p:nvPr/>
-        </p:nvPicPr>
-        <p:blipFill>
-          <a:blip r:embed="rId3">
-            <a:extLst>
-              <a:ext uri="{28A0092B-C50C-407E-A947-70E740481C1C}">
-                <a14:useLocalDpi xmlns:a14="http://schemas.microsoft.com/office/drawing/2010/main" val="0"/>
-              </a:ext>
-            </a:extLst>
-          </a:blip>
-          <a:srcRect/>
-          <a:stretch>
-            <a:fillRect/>
-          </a:stretch>
-        </p:blipFill>
-        <p:spPr bwMode="auto">
-          <a:xfrm>
-            <a:off x="4581999" y="1674108"/>
-            <a:ext cx="3028001" cy="3509783"/>
-          </a:xfrm>
-          <a:prstGeom prst="rect">
-            <a:avLst/>
-          </a:prstGeom>
-          <a:noFill/>
-          <a:extLst>
-            <a:ext uri="{909E8E84-426E-40DD-AFC4-6F175D3DCCD1}">
-              <a14:hiddenFill xmlns:a14="http://schemas.microsoft.com/office/drawing/2010/main">
-                <a:solidFill>
-                  <a:srgbClr val="FFFFFF"/>
-                </a:solidFill>
-              </a14:hiddenFill>
-            </a:ext>
-          </a:extLst>
-        </p:spPr>
-      </p:pic>
-    </p:spTree>
-    <p:extLst>
-      <p:ext uri="{BB962C8B-B14F-4D97-AF65-F5344CB8AC3E}">
-        <p14:creationId xmlns:p14="http://schemas.microsoft.com/office/powerpoint/2010/main" val="2383651979"/>
-      </p:ext>
-    </p:extLst>
-  </p:cSld>
-  <p:clrMapOvr>
-    <a:masterClrMapping/>
-  </p:clrMapOvr>
-  <mc:AlternateContent xmlns:mc="http://schemas.openxmlformats.org/markup-compatibility/2006" xmlns:p14="http://schemas.microsoft.com/office/powerpoint/2010/main">
-    <mc:Choice Requires="p14">
-      <p:transition spd="med" p14:dur="700">
-        <p:fade/>
-      </p:transition>
-    </mc:Choice>
-    <mc:Fallback xmlns="">
-      <p:transition spd="med">
-        <p:fade/>
-      </p:transition>
-    </mc:Fallback>
-  </mc:AlternateContent>
 </p:sld>
 </file>
 

</xml_diff>

<commit_message>
Updated presentations for 01.18.23 studio presentation.
</commit_message>
<xml_diff>
--- a/presentations/01_intro_to_python.pptx
+++ b/presentations/01_intro_to_python.pptx
@@ -12,8 +12,8 @@
     <p:sldId id="266" r:id="rId6"/>
     <p:sldId id="304" r:id="rId7"/>
     <p:sldId id="327" r:id="rId8"/>
-    <p:sldId id="323" r:id="rId9"/>
-    <p:sldId id="328" r:id="rId10"/>
+    <p:sldId id="328" r:id="rId9"/>
+    <p:sldId id="323" r:id="rId10"/>
   </p:sldIdLst>
   <p:sldSz cx="12192000" cy="6858000"/>
   <p:notesSz cx="6858000" cy="9144000"/>
@@ -275,7 +275,7 @@
           <a:p>
             <a:fld id="{FD93C9B2-20F6-4DB1-B471-224337D0AC79}" type="datetimeFigureOut">
               <a:rPr lang="en-US" smtClean="0"/>
-              <a:t>1/11/2023</a:t>
+              <a:t>1/13/2023</a:t>
             </a:fld>
             <a:endParaRPr lang="en-US"/>
           </a:p>
@@ -586,12 +586,37 @@
           <a:bodyPr/>
           <a:lstStyle/>
           <a:p>
-            <a:endParaRPr lang="en-US">
+            <a:pPr marL="0" marR="0" lvl="0" indent="0" algn="l" defTabSz="914400" rtl="0" eaLnBrk="1" fontAlgn="auto" latinLnBrk="0" hangingPunct="1">
+              <a:lnSpc>
+                <a:spcPct val="100000"/>
+              </a:lnSpc>
+              <a:spcBef>
+                <a:spcPts val="0"/>
+              </a:spcBef>
+              <a:spcAft>
+                <a:spcPts val="0"/>
+              </a:spcAft>
+              <a:buClrTx/>
+              <a:buSzTx/>
+              <a:buFontTx/>
+              <a:buNone/>
+              <a:tabLst/>
+              <a:defRPr/>
+            </a:pPr>
+            <a:r>
+              <a:rPr lang="en-US" dirty="0">
+                <a:latin typeface="Palatino Linotype" panose="02040502050505030304" pitchFamily="18" charset="0"/>
+              </a:rPr>
+              <a:t>Hello and welcome to the Practicum Introduction to Python workshop series.  I’m Dan Maxwell, and I’ll act as your guide and mentor for this learning experience.  I currently work as an AI Trainer / Consultant in the Research Computing Department at the University of Florida.</a:t>
+            </a:r>
+          </a:p>
+          <a:p>
+            <a:endParaRPr lang="en-US" dirty="0">
               <a:latin typeface="Palatino Linotype" panose="02040502050505030304" pitchFamily="18" charset="0"/>
             </a:endParaRPr>
           </a:p>
           <a:p>
-            <a:endParaRPr lang="en-US">
+            <a:endParaRPr lang="en-US" dirty="0">
               <a:latin typeface="Palatino Linotype" panose="02040502050505030304" pitchFamily="18" charset="0"/>
             </a:endParaRPr>
           </a:p>
@@ -678,12 +703,27 @@
           <a:lstStyle/>
           <a:p>
             <a:r>
-              <a:rPr lang="en-US"/>
+              <a:rPr lang="en-US" dirty="0"/>
+              <a:t>Let’s start with a high-level look at this workshop.  Our Python series has four modules.  (Read List)   Keep in mind that this series is not equivalent to a full-semester, for-credit class.  Our goal here is to teach the basic Python skills you need to execute a deep learning project.</a:t>
+            </a:r>
+          </a:p>
+          <a:p>
+            <a:endParaRPr lang="en-US" dirty="0"/>
+          </a:p>
+          <a:p>
+            <a:r>
+              <a:rPr lang="en-US" dirty="0"/>
+              <a:t>=====</a:t>
+            </a:r>
+          </a:p>
+          <a:p>
+            <a:r>
+              <a:rPr lang="en-US" dirty="0"/>
               <a:t>The learning objectives for each Python session can be found here: https://github.com/PracticumAI/python</a:t>
             </a:r>
           </a:p>
           <a:p>
-            <a:endParaRPr lang="en-US"/>
+            <a:endParaRPr lang="en-US" dirty="0"/>
           </a:p>
         </p:txBody>
       </p:sp>
@@ -1905,8 +1945,8 @@
               <a:defRPr/>
             </a:pPr>
             <a:r>
-              <a:rPr lang="en-US"/>
-              <a:t>Setup Instructions…</a:t>
+              <a:rPr lang="en-US" dirty="0"/>
+              <a:t>Follow JupyterLab presentation outline in 01_jupyterlab_presentation.md.</a:t>
             </a:r>
           </a:p>
         </p:txBody>
@@ -1928,7 +1968,7 @@
           <a:p>
             <a:fld id="{3148858F-F1DB-4027-9C85-CCA6849540DD}" type="slidenum">
               <a:rPr lang="en-US" smtClean="0"/>
-              <a:t>5</a:t>
+              <a:t>6</a:t>
             </a:fld>
             <a:endParaRPr lang="en-US"/>
           </a:p>
@@ -2094,7 +2134,7 @@
           <a:p>
             <a:fld id="{C3F78080-8D0A-4BE8-A5B4-CB115102D524}" type="datetimeFigureOut">
               <a:rPr lang="en-US" smtClean="0"/>
-              <a:t>1/11/2023</a:t>
+              <a:t>1/13/2023</a:t>
             </a:fld>
             <a:endParaRPr lang="en-US"/>
           </a:p>
@@ -2292,7 +2332,7 @@
           <a:p>
             <a:fld id="{C3F78080-8D0A-4BE8-A5B4-CB115102D524}" type="datetimeFigureOut">
               <a:rPr lang="en-US" smtClean="0"/>
-              <a:t>1/11/2023</a:t>
+              <a:t>1/13/2023</a:t>
             </a:fld>
             <a:endParaRPr lang="en-US"/>
           </a:p>
@@ -2500,7 +2540,7 @@
           <a:p>
             <a:fld id="{C3F78080-8D0A-4BE8-A5B4-CB115102D524}" type="datetimeFigureOut">
               <a:rPr lang="en-US" smtClean="0"/>
-              <a:t>1/11/2023</a:t>
+              <a:t>1/13/2023</a:t>
             </a:fld>
             <a:endParaRPr lang="en-US"/>
           </a:p>
@@ -2698,7 +2738,7 @@
           <a:p>
             <a:fld id="{C3F78080-8D0A-4BE8-A5B4-CB115102D524}" type="datetimeFigureOut">
               <a:rPr lang="en-US" smtClean="0"/>
-              <a:t>1/11/2023</a:t>
+              <a:t>1/13/2023</a:t>
             </a:fld>
             <a:endParaRPr lang="en-US"/>
           </a:p>
@@ -2973,7 +3013,7 @@
           <a:p>
             <a:fld id="{C3F78080-8D0A-4BE8-A5B4-CB115102D524}" type="datetimeFigureOut">
               <a:rPr lang="en-US" smtClean="0"/>
-              <a:t>1/11/2023</a:t>
+              <a:t>1/13/2023</a:t>
             </a:fld>
             <a:endParaRPr lang="en-US"/>
           </a:p>
@@ -3238,7 +3278,7 @@
           <a:p>
             <a:fld id="{C3F78080-8D0A-4BE8-A5B4-CB115102D524}" type="datetimeFigureOut">
               <a:rPr lang="en-US" smtClean="0"/>
-              <a:t>1/11/2023</a:t>
+              <a:t>1/13/2023</a:t>
             </a:fld>
             <a:endParaRPr lang="en-US"/>
           </a:p>
@@ -3650,7 +3690,7 @@
           <a:p>
             <a:fld id="{C3F78080-8D0A-4BE8-A5B4-CB115102D524}" type="datetimeFigureOut">
               <a:rPr lang="en-US" smtClean="0"/>
-              <a:t>1/11/2023</a:t>
+              <a:t>1/13/2023</a:t>
             </a:fld>
             <a:endParaRPr lang="en-US"/>
           </a:p>
@@ -3791,7 +3831,7 @@
           <a:p>
             <a:fld id="{C3F78080-8D0A-4BE8-A5B4-CB115102D524}" type="datetimeFigureOut">
               <a:rPr lang="en-US" smtClean="0"/>
-              <a:t>1/11/2023</a:t>
+              <a:t>1/13/2023</a:t>
             </a:fld>
             <a:endParaRPr lang="en-US"/>
           </a:p>
@@ -3904,7 +3944,7 @@
           <a:p>
             <a:fld id="{C3F78080-8D0A-4BE8-A5B4-CB115102D524}" type="datetimeFigureOut">
               <a:rPr lang="en-US" smtClean="0"/>
-              <a:t>1/11/2023</a:t>
+              <a:t>1/13/2023</a:t>
             </a:fld>
             <a:endParaRPr lang="en-US"/>
           </a:p>
@@ -4215,7 +4255,7 @@
           <a:p>
             <a:fld id="{C3F78080-8D0A-4BE8-A5B4-CB115102D524}" type="datetimeFigureOut">
               <a:rPr lang="en-US" smtClean="0"/>
-              <a:t>1/11/2023</a:t>
+              <a:t>1/13/2023</a:t>
             </a:fld>
             <a:endParaRPr lang="en-US"/>
           </a:p>
@@ -4503,7 +4543,7 @@
           <a:p>
             <a:fld id="{C3F78080-8D0A-4BE8-A5B4-CB115102D524}" type="datetimeFigureOut">
               <a:rPr lang="en-US" smtClean="0"/>
-              <a:t>1/11/2023</a:t>
+              <a:t>1/13/2023</a:t>
             </a:fld>
             <a:endParaRPr lang="en-US"/>
           </a:p>
@@ -4744,7 +4784,7 @@
           <a:p>
             <a:fld id="{C3F78080-8D0A-4BE8-A5B4-CB115102D524}" type="datetimeFigureOut">
               <a:rPr lang="en-US" smtClean="0"/>
-              <a:t>1/11/2023</a:t>
+              <a:t>1/13/2023</a:t>
             </a:fld>
             <a:endParaRPr lang="en-US"/>
           </a:p>
@@ -5478,7 +5518,7 @@
                 </a:solidFill>
                 <a:latin typeface="Avenir"/>
               </a:rPr>
-              <a:t>Starting Data Wrangling</a:t>
+              <a:t>Introduction to Data Wrangling</a:t>
             </a:r>
           </a:p>
         </p:txBody>
@@ -6564,6 +6604,86 @@
           <a:chExt cx="0" cy="0"/>
         </a:xfrm>
       </p:grpSpPr>
+      <p:sp>
+        <p:nvSpPr>
+          <p:cNvPr id="2" name="Title 1">
+            <a:extLst>
+              <a:ext uri="{FF2B5EF4-FFF2-40B4-BE49-F238E27FC236}">
+                <a16:creationId xmlns:a16="http://schemas.microsoft.com/office/drawing/2014/main" id="{E572A712-B415-4A2E-7599-A6167150739A}"/>
+              </a:ext>
+            </a:extLst>
+          </p:cNvPr>
+          <p:cNvSpPr>
+            <a:spLocks noGrp="1"/>
+          </p:cNvSpPr>
+          <p:nvPr>
+            <p:ph type="title"/>
+          </p:nvPr>
+        </p:nvSpPr>
+        <p:spPr/>
+        <p:txBody>
+          <a:bodyPr/>
+          <a:lstStyle/>
+          <a:p>
+            <a:endParaRPr lang="en-US"/>
+          </a:p>
+        </p:txBody>
+      </p:sp>
+      <p:sp>
+        <p:nvSpPr>
+          <p:cNvPr id="3" name="Content Placeholder 2">
+            <a:extLst>
+              <a:ext uri="{FF2B5EF4-FFF2-40B4-BE49-F238E27FC236}">
+                <a16:creationId xmlns:a16="http://schemas.microsoft.com/office/drawing/2014/main" id="{5B6CACE9-0FC0-9826-3B3C-E9376F8D983A}"/>
+              </a:ext>
+            </a:extLst>
+          </p:cNvPr>
+          <p:cNvSpPr>
+            <a:spLocks noGrp="1"/>
+          </p:cNvSpPr>
+          <p:nvPr>
+            <p:ph idx="1"/>
+          </p:nvPr>
+        </p:nvSpPr>
+        <p:spPr/>
+        <p:txBody>
+          <a:bodyPr/>
+          <a:lstStyle/>
+          <a:p>
+            <a:endParaRPr lang="en-US"/>
+          </a:p>
+        </p:txBody>
+      </p:sp>
+    </p:spTree>
+    <p:extLst>
+      <p:ext uri="{BB962C8B-B14F-4D97-AF65-F5344CB8AC3E}">
+        <p14:creationId xmlns:p14="http://schemas.microsoft.com/office/powerpoint/2010/main" val="2552202046"/>
+      </p:ext>
+    </p:extLst>
+  </p:cSld>
+  <p:clrMapOvr>
+    <a:masterClrMapping/>
+  </p:clrMapOvr>
+</p:sld>
+</file>
+
+<file path=ppt/slides/slide6.xml><?xml version="1.0" encoding="utf-8"?>
+<p:sld xmlns:a="http://schemas.openxmlformats.org/drawingml/2006/main" xmlns:r="http://schemas.openxmlformats.org/officeDocument/2006/relationships" xmlns:p="http://schemas.openxmlformats.org/presentationml/2006/main">
+  <p:cSld>
+    <p:spTree>
+      <p:nvGrpSpPr>
+        <p:cNvPr id="1" name=""/>
+        <p:cNvGrpSpPr/>
+        <p:nvPr/>
+      </p:nvGrpSpPr>
+      <p:grpSpPr>
+        <a:xfrm>
+          <a:off x="0" y="0"/>
+          <a:ext cx="0" cy="0"/>
+          <a:chOff x="0" y="0"/>
+          <a:chExt cx="0" cy="0"/>
+        </a:xfrm>
+      </p:grpSpPr>
       <p:pic>
         <p:nvPicPr>
           <p:cNvPr id="1026" name="Picture 2" descr="Project Jupyter - Wikipedia">
@@ -6669,86 +6789,6 @@
       </p:transition>
     </mc:Fallback>
   </mc:AlternateContent>
-</p:sld>
-</file>
-
-<file path=ppt/slides/slide6.xml><?xml version="1.0" encoding="utf-8"?>
-<p:sld xmlns:a="http://schemas.openxmlformats.org/drawingml/2006/main" xmlns:r="http://schemas.openxmlformats.org/officeDocument/2006/relationships" xmlns:p="http://schemas.openxmlformats.org/presentationml/2006/main">
-  <p:cSld>
-    <p:spTree>
-      <p:nvGrpSpPr>
-        <p:cNvPr id="1" name=""/>
-        <p:cNvGrpSpPr/>
-        <p:nvPr/>
-      </p:nvGrpSpPr>
-      <p:grpSpPr>
-        <a:xfrm>
-          <a:off x="0" y="0"/>
-          <a:ext cx="0" cy="0"/>
-          <a:chOff x="0" y="0"/>
-          <a:chExt cx="0" cy="0"/>
-        </a:xfrm>
-      </p:grpSpPr>
-      <p:sp>
-        <p:nvSpPr>
-          <p:cNvPr id="2" name="Title 1">
-            <a:extLst>
-              <a:ext uri="{FF2B5EF4-FFF2-40B4-BE49-F238E27FC236}">
-                <a16:creationId xmlns:a16="http://schemas.microsoft.com/office/drawing/2014/main" id="{E572A712-B415-4A2E-7599-A6167150739A}"/>
-              </a:ext>
-            </a:extLst>
-          </p:cNvPr>
-          <p:cNvSpPr>
-            <a:spLocks noGrp="1"/>
-          </p:cNvSpPr>
-          <p:nvPr>
-            <p:ph type="title"/>
-          </p:nvPr>
-        </p:nvSpPr>
-        <p:spPr/>
-        <p:txBody>
-          <a:bodyPr/>
-          <a:lstStyle/>
-          <a:p>
-            <a:endParaRPr lang="en-US"/>
-          </a:p>
-        </p:txBody>
-      </p:sp>
-      <p:sp>
-        <p:nvSpPr>
-          <p:cNvPr id="3" name="Content Placeholder 2">
-            <a:extLst>
-              <a:ext uri="{FF2B5EF4-FFF2-40B4-BE49-F238E27FC236}">
-                <a16:creationId xmlns:a16="http://schemas.microsoft.com/office/drawing/2014/main" id="{5B6CACE9-0FC0-9826-3B3C-E9376F8D983A}"/>
-              </a:ext>
-            </a:extLst>
-          </p:cNvPr>
-          <p:cNvSpPr>
-            <a:spLocks noGrp="1"/>
-          </p:cNvSpPr>
-          <p:nvPr>
-            <p:ph idx="1"/>
-          </p:nvPr>
-        </p:nvSpPr>
-        <p:spPr/>
-        <p:txBody>
-          <a:bodyPr/>
-          <a:lstStyle/>
-          <a:p>
-            <a:endParaRPr lang="en-US"/>
-          </a:p>
-        </p:txBody>
-      </p:sp>
-    </p:spTree>
-    <p:extLst>
-      <p:ext uri="{BB962C8B-B14F-4D97-AF65-F5344CB8AC3E}">
-        <p14:creationId xmlns:p14="http://schemas.microsoft.com/office/powerpoint/2010/main" val="2552202046"/>
-      </p:ext>
-    </p:extLst>
-  </p:cSld>
-  <p:clrMapOvr>
-    <a:masterClrMapping/>
-  </p:clrMapOvr>
 </p:sld>
 </file>
 
@@ -7343,6 +7383,15 @@
 </file>
 
 <file path=customXml/item1.xml><?xml version="1.0" encoding="utf-8"?>
+<?mso-contentType ?>
+<FormTemplates xmlns="http://schemas.microsoft.com/sharepoint/v3/contenttype/forms">
+  <Display>DocumentLibraryForm</Display>
+  <Edit>DocumentLibraryForm</Edit>
+  <New>DocumentLibraryForm</New>
+</FormTemplates>
+</file>
+
+<file path=customXml/item2.xml><?xml version="1.0" encoding="utf-8"?>
 <ct:contentTypeSchema xmlns:ct="http://schemas.microsoft.com/office/2006/metadata/contentType" xmlns:ma="http://schemas.microsoft.com/office/2006/metadata/properties/metaAttributes" ct:_="" ma:_="" ma:contentTypeName="Document" ma:contentTypeID="0x0101002673533D22965147974C76FEA4E99B6D" ma:contentTypeVersion="7" ma:contentTypeDescription="Create a new document." ma:contentTypeScope="" ma:versionID="33386593c5eb6e225e5f36b1db4227d2">
   <xsd:schema xmlns:xsd="http://www.w3.org/2001/XMLSchema" xmlns:xs="http://www.w3.org/2001/XMLSchema" xmlns:p="http://schemas.microsoft.com/office/2006/metadata/properties" xmlns:ns2="457672a9-2aae-4e32-9c0c-21a1a727485c" targetNamespace="http://schemas.microsoft.com/office/2006/metadata/properties" ma:root="true" ma:fieldsID="f963ad55d75e1805834ffff233bf5b0c" ns2:_="">
     <xsd:import namespace="457672a9-2aae-4e32-9c0c-21a1a727485c"/>
@@ -7502,15 +7551,6 @@
 </ct:contentTypeSchema>
 </file>
 
-<file path=customXml/item2.xml><?xml version="1.0" encoding="utf-8"?>
-<?mso-contentType ?>
-<FormTemplates xmlns="http://schemas.microsoft.com/sharepoint/v3/contenttype/forms">
-  <Display>DocumentLibraryForm</Display>
-  <Edit>DocumentLibraryForm</Edit>
-  <New>DocumentLibraryForm</New>
-</FormTemplates>
-</file>
-
 <file path=customXml/item3.xml><?xml version="1.0" encoding="utf-8"?>
 <p:properties xmlns:p="http://schemas.microsoft.com/office/2006/metadata/properties" xmlns:xsi="http://www.w3.org/2001/XMLSchema-instance" xmlns:pc="http://schemas.microsoft.com/office/infopath/2007/PartnerControls">
   <documentManagement>
@@ -7522,6 +7562,14 @@
 </file>
 
 <file path=customXml/itemProps1.xml><?xml version="1.0" encoding="utf-8"?>
+<ds:datastoreItem xmlns:ds="http://schemas.openxmlformats.org/officeDocument/2006/customXml" ds:itemID="{D2D8D8CC-BC4B-471B-B2CF-42172936AC34}">
+  <ds:schemaRefs>
+    <ds:schemaRef ds:uri="http://schemas.microsoft.com/sharepoint/v3/contenttype/forms"/>
+  </ds:schemaRefs>
+</ds:datastoreItem>
+</file>
+
+<file path=customXml/itemProps2.xml><?xml version="1.0" encoding="utf-8"?>
 <ds:datastoreItem xmlns:ds="http://schemas.openxmlformats.org/officeDocument/2006/customXml" ds:itemID="{1A69DF91-52FC-4A8A-A88E-6D0CC222FA29}">
   <ds:schemaRefs>
     <ds:schemaRef ds:uri="457672a9-2aae-4e32-9c0c-21a1a727485c"/>
@@ -7539,14 +7587,6 @@
 </ds:datastoreItem>
 </file>
 
-<file path=customXml/itemProps2.xml><?xml version="1.0" encoding="utf-8"?>
-<ds:datastoreItem xmlns:ds="http://schemas.openxmlformats.org/officeDocument/2006/customXml" ds:itemID="{D2D8D8CC-BC4B-471B-B2CF-42172936AC34}">
-  <ds:schemaRefs>
-    <ds:schemaRef ds:uri="http://schemas.microsoft.com/sharepoint/v3/contenttype/forms"/>
-  </ds:schemaRefs>
-</ds:datastoreItem>
-</file>
-
 <file path=customXml/itemProps3.xml><?xml version="1.0" encoding="utf-8"?>
 <ds:datastoreItem xmlns:ds="http://schemas.openxmlformats.org/officeDocument/2006/customXml" ds:itemID="{0B26EFB6-63B6-4D71-9C88-C5CC6E45A9D0}">
   <ds:schemaRefs>

</xml_diff>

<commit_message>
Edits for the 01.25.23 recording session.
</commit_message>
<xml_diff>
--- a/presentations/01_intro_to_python.pptx
+++ b/presentations/01_intro_to_python.pptx
@@ -16,7 +16,7 @@
     <p:sldId id="323" r:id="rId10"/>
   </p:sldIdLst>
   <p:sldSz cx="12192000" cy="6858000"/>
-  <p:notesSz cx="6858000" cy="9144000"/>
+  <p:notesSz cx="7315200" cy="9601200"/>
   <p:defaultTextStyle>
     <a:defPPr>
       <a:defRPr lang="en-US"/>
@@ -228,17 +228,17 @@
         <p:spPr>
           <a:xfrm>
             <a:off x="0" y="0"/>
-            <a:ext cx="2971800" cy="458788"/>
+            <a:ext cx="3169920" cy="481727"/>
           </a:xfrm>
           <a:prstGeom prst="rect">
             <a:avLst/>
           </a:prstGeom>
         </p:spPr>
         <p:txBody>
-          <a:bodyPr vert="horz" lIns="91440" tIns="45720" rIns="91440" bIns="45720" rtlCol="0"/>
+          <a:bodyPr vert="horz" lIns="96661" tIns="48331" rIns="96661" bIns="48331" rtlCol="0"/>
           <a:lstStyle>
             <a:lvl1pPr algn="l">
-              <a:defRPr sz="1200"/>
+              <a:defRPr sz="1300"/>
             </a:lvl1pPr>
           </a:lstStyle>
           <a:p>
@@ -258,24 +258,24 @@
         </p:nvSpPr>
         <p:spPr>
           <a:xfrm>
-            <a:off x="3884613" y="0"/>
-            <a:ext cx="2971800" cy="458788"/>
+            <a:off x="4143587" y="0"/>
+            <a:ext cx="3169920" cy="481727"/>
           </a:xfrm>
           <a:prstGeom prst="rect">
             <a:avLst/>
           </a:prstGeom>
         </p:spPr>
         <p:txBody>
-          <a:bodyPr vert="horz" lIns="91440" tIns="45720" rIns="91440" bIns="45720" rtlCol="0"/>
+          <a:bodyPr vert="horz" lIns="96661" tIns="48331" rIns="96661" bIns="48331" rtlCol="0"/>
           <a:lstStyle>
             <a:lvl1pPr algn="r">
-              <a:defRPr sz="1200"/>
+              <a:defRPr sz="1300"/>
             </a:lvl1pPr>
           </a:lstStyle>
           <a:p>
             <a:fld id="{FD93C9B2-20F6-4DB1-B471-224337D0AC79}" type="datetimeFigureOut">
               <a:rPr lang="en-US" smtClean="0"/>
-              <a:t>1/13/2023</a:t>
+              <a:t>1/20/2023</a:t>
             </a:fld>
             <a:endParaRPr lang="en-US"/>
           </a:p>
@@ -293,8 +293,8 @@
         </p:nvSpPr>
         <p:spPr>
           <a:xfrm>
-            <a:off x="685800" y="1143000"/>
-            <a:ext cx="5486400" cy="3086100"/>
+            <a:off x="777875" y="1200150"/>
+            <a:ext cx="5759450" cy="3240088"/>
           </a:xfrm>
           <a:prstGeom prst="rect">
             <a:avLst/>
@@ -307,7 +307,7 @@
           </a:ln>
         </p:spPr>
         <p:txBody>
-          <a:bodyPr vert="horz" lIns="91440" tIns="45720" rIns="91440" bIns="45720" rtlCol="0" anchor="ctr"/>
+          <a:bodyPr vert="horz" lIns="96661" tIns="48331" rIns="96661" bIns="48331" rtlCol="0" anchor="ctr"/>
           <a:lstStyle/>
           <a:p>
             <a:endParaRPr lang="en-US"/>
@@ -326,15 +326,15 @@
         </p:nvSpPr>
         <p:spPr>
           <a:xfrm>
-            <a:off x="685800" y="4400550"/>
-            <a:ext cx="5486400" cy="3600450"/>
+            <a:off x="731520" y="4620577"/>
+            <a:ext cx="5852160" cy="3780473"/>
           </a:xfrm>
           <a:prstGeom prst="rect">
             <a:avLst/>
           </a:prstGeom>
         </p:spPr>
         <p:txBody>
-          <a:bodyPr vert="horz" lIns="91440" tIns="45720" rIns="91440" bIns="45720" rtlCol="0"/>
+          <a:bodyPr vert="horz" lIns="96661" tIns="48331" rIns="96661" bIns="48331" rtlCol="0"/>
           <a:lstStyle/>
           <a:p>
             <a:pPr lvl="0"/>
@@ -385,18 +385,18 @@
         </p:nvSpPr>
         <p:spPr>
           <a:xfrm>
-            <a:off x="0" y="8685213"/>
-            <a:ext cx="2971800" cy="458787"/>
+            <a:off x="0" y="9119474"/>
+            <a:ext cx="3169920" cy="481726"/>
           </a:xfrm>
           <a:prstGeom prst="rect">
             <a:avLst/>
           </a:prstGeom>
         </p:spPr>
         <p:txBody>
-          <a:bodyPr vert="horz" lIns="91440" tIns="45720" rIns="91440" bIns="45720" rtlCol="0" anchor="b"/>
+          <a:bodyPr vert="horz" lIns="96661" tIns="48331" rIns="96661" bIns="48331" rtlCol="0" anchor="b"/>
           <a:lstStyle>
             <a:lvl1pPr algn="l">
-              <a:defRPr sz="1200"/>
+              <a:defRPr sz="1300"/>
             </a:lvl1pPr>
           </a:lstStyle>
           <a:p>
@@ -416,18 +416,18 @@
         </p:nvSpPr>
         <p:spPr>
           <a:xfrm>
-            <a:off x="3884613" y="8685213"/>
-            <a:ext cx="2971800" cy="458787"/>
+            <a:off x="4143587" y="9119474"/>
+            <a:ext cx="3169920" cy="481726"/>
           </a:xfrm>
           <a:prstGeom prst="rect">
             <a:avLst/>
           </a:prstGeom>
         </p:spPr>
         <p:txBody>
-          <a:bodyPr vert="horz" lIns="91440" tIns="45720" rIns="91440" bIns="45720" rtlCol="0" anchor="b"/>
+          <a:bodyPr vert="horz" lIns="96661" tIns="48331" rIns="96661" bIns="48331" rtlCol="0" anchor="b"/>
           <a:lstStyle>
             <a:lvl1pPr algn="r">
-              <a:defRPr sz="1200"/>
+              <a:defRPr sz="1300"/>
             </a:lvl1pPr>
           </a:lstStyle>
           <a:p>
@@ -586,29 +586,58 @@
           <a:bodyPr/>
           <a:lstStyle/>
           <a:p>
-            <a:pPr marL="0" marR="0" lvl="0" indent="0" algn="l" defTabSz="914400" rtl="0" eaLnBrk="1" fontAlgn="auto" latinLnBrk="0" hangingPunct="1">
-              <a:lnSpc>
-                <a:spcPct val="100000"/>
-              </a:lnSpc>
-              <a:spcBef>
-                <a:spcPts val="0"/>
-              </a:spcBef>
-              <a:spcAft>
-                <a:spcPts val="0"/>
-              </a:spcAft>
-              <a:buClrTx/>
-              <a:buSzTx/>
-              <a:buFontTx/>
-              <a:buNone/>
-              <a:tabLst/>
+            <a:r>
+              <a:rPr lang="en-US" altLang="en-US" dirty="0">
+                <a:ea typeface="ＭＳ Ｐゴシック" charset="-128"/>
+              </a:rPr>
+              <a:t>Hello and welcome to this Practicum AI recording</a:t>
+            </a:r>
+            <a:r>
+              <a:rPr lang="en-US" altLang="en-US" baseline="0" dirty="0">
+                <a:ea typeface="ＭＳ Ｐゴシック" charset="-128"/>
+              </a:rPr>
+              <a:t>.</a:t>
+            </a:r>
+          </a:p>
+          <a:p>
+            <a:endParaRPr lang="en-US" altLang="en-US" dirty="0">
+              <a:ea typeface="ＭＳ Ｐゴシック" charset="-128"/>
+            </a:endParaRPr>
+          </a:p>
+          <a:p>
+            <a:r>
+              <a:rPr lang="en-US" altLang="en-US" dirty="0">
+                <a:ea typeface="ＭＳ Ｐゴシック" charset="-128"/>
+              </a:rPr>
+              <a:t>I’m Dan Maxwell, the AI Trainer / Consultant for Research Computing.</a:t>
+            </a:r>
+          </a:p>
+          <a:p>
+            <a:endParaRPr lang="en-US" altLang="en-US" dirty="0">
+              <a:ea typeface="ＭＳ Ｐゴシック" charset="-128"/>
+            </a:endParaRPr>
+          </a:p>
+          <a:p>
+            <a:r>
+              <a:rPr lang="en-US" baseline="0" dirty="0"/>
+              <a:t>In this briefing, I will introduce you to our Python workshop series.</a:t>
+            </a:r>
+          </a:p>
+          <a:p>
+            <a:endParaRPr lang="en-US" baseline="0" dirty="0"/>
+          </a:p>
+          <a:p>
+            <a:r>
+              <a:rPr lang="en-US" baseline="0" dirty="0"/>
+              <a:t>[NEXT SLIDE]</a:t>
+            </a:r>
+            <a:endParaRPr lang="en-US" dirty="0"/>
+          </a:p>
+          <a:p>
+            <a:pPr defTabSz="966612">
               <a:defRPr/>
             </a:pPr>
-            <a:r>
-              <a:rPr lang="en-US" dirty="0">
-                <a:latin typeface="Palatino Linotype" panose="02040502050505030304" pitchFamily="18" charset="0"/>
-              </a:rPr>
-              <a:t>Hello and welcome to the Practicum Introduction to Python workshop series.  I’m Dan Maxwell, and I’ll act as your guide and mentor for this learning experience.  I currently work as an AI Trainer / Consultant in the Research Computing Department at the University of Florida.</a:t>
-            </a:r>
+            <a:endParaRPr lang="en-US" dirty="0"/>
           </a:p>
           <a:p>
             <a:endParaRPr lang="en-US" dirty="0">
@@ -704,22 +733,64 @@
           <a:p>
             <a:r>
               <a:rPr lang="en-US" dirty="0"/>
-              <a:t>Let’s start with a high-level look at this workshop.  Our Python series has four modules.  (Read List)   Keep in mind that this series is not equivalent to a full-semester, for-credit class.  Our goal here is to teach the basic Python skills you need to execute a deep learning project.</a:t>
+              <a:t>Let’s start with a high-level look at this workshop.  Our Python series has four modules. </a:t>
             </a:r>
           </a:p>
           <a:p>
             <a:endParaRPr lang="en-US" dirty="0"/>
           </a:p>
           <a:p>
+            <a:pPr marL="241653" indent="-241653">
+              <a:buAutoNum type="arabicPeriod"/>
+            </a:pPr>
             <a:r>
               <a:rPr lang="en-US" dirty="0"/>
-              <a:t>=====</a:t>
-            </a:r>
-          </a:p>
-          <a:p>
+              <a:t>Our first session covers the basics – creating and working with variables.  And developing a unique coding style.</a:t>
+            </a:r>
+          </a:p>
+          <a:p>
+            <a:pPr marL="241653" indent="-241653">
+              <a:buAutoNum type="arabicPeriod"/>
+            </a:pPr>
             <a:r>
               <a:rPr lang="en-US" dirty="0"/>
-              <a:t>The learning objectives for each Python session can be found here: https://github.com/PracticumAI/python</a:t>
+              <a:t>We then turn our attention to output, data types, and libraries in session two.</a:t>
+            </a:r>
+          </a:p>
+          <a:p>
+            <a:pPr marL="241653" indent="-241653">
+              <a:buAutoNum type="arabicPeriod"/>
+            </a:pPr>
+            <a:r>
+              <a:rPr lang="en-US" dirty="0"/>
+              <a:t>Loops, conditionals, and functions are featured in session three.</a:t>
+            </a:r>
+          </a:p>
+          <a:p>
+            <a:pPr marL="241653" indent="-241653">
+              <a:buAutoNum type="arabicPeriod"/>
+            </a:pPr>
+            <a:r>
+              <a:rPr lang="en-US" dirty="0"/>
+              <a:t>And finally, we conclude this series with an introduction to data wrangling.</a:t>
+            </a:r>
+          </a:p>
+          <a:p>
+            <a:endParaRPr lang="en-US" dirty="0"/>
+          </a:p>
+          <a:p>
+            <a:r>
+              <a:rPr lang="en-US" dirty="0"/>
+              <a:t>Keep in mind that this series is not equivalent to a full-semester, for-credit class.  Our goal here is to teach the basic Python skills you need to execute a deep learning project.</a:t>
+            </a:r>
+          </a:p>
+          <a:p>
+            <a:endParaRPr lang="en-US" dirty="0"/>
+          </a:p>
+          <a:p>
+            <a:r>
+              <a:rPr lang="en-US" dirty="0"/>
+              <a:t>[NEXT SLIDE]</a:t>
             </a:r>
           </a:p>
           <a:p>
@@ -807,25 +878,13 @@
           <a:bodyPr/>
           <a:lstStyle/>
           <a:p>
-            <a:pPr marL="342900" marR="0" lvl="0" indent="-342900" algn="l" defTabSz="914400" rtl="0" eaLnBrk="1" fontAlgn="auto" latinLnBrk="0" hangingPunct="1">
-              <a:lnSpc>
-                <a:spcPct val="100000"/>
-              </a:lnSpc>
-              <a:spcBef>
-                <a:spcPts val="0"/>
-              </a:spcBef>
-              <a:spcAft>
-                <a:spcPts val="0"/>
-              </a:spcAft>
-              <a:buClrTx/>
-              <a:buSzTx/>
+            <a:pPr marL="362480" indent="-362480" defTabSz="966612">
               <a:buFontTx/>
               <a:buAutoNum type="arabicPeriod"/>
-              <a:tabLst/>
               <a:defRPr/>
             </a:pPr>
             <a:r>
-              <a:rPr lang="en-US" sz="1100" b="1">
+              <a:rPr lang="en-US" sz="1200" b="1" dirty="0">
                 <a:solidFill>
                   <a:srgbClr val="24292F"/>
                 </a:solidFill>
@@ -843,56 +902,30 @@
             </a:r>
           </a:p>
           <a:p>
-            <a:pPr marL="800100" marR="0" lvl="1" indent="-342900" algn="l" defTabSz="914400" rtl="0" eaLnBrk="1" fontAlgn="auto" latinLnBrk="0" hangingPunct="1">
-              <a:lnSpc>
-                <a:spcPct val="100000"/>
-              </a:lnSpc>
-              <a:spcBef>
-                <a:spcPts val="0"/>
-              </a:spcBef>
-              <a:spcAft>
-                <a:spcPts val="0"/>
-              </a:spcAft>
-              <a:buClrTx/>
-              <a:buSzTx/>
-              <a:buFont typeface="Courier New" panose="02070309020205020404" pitchFamily="49" charset="0"/>
-              <a:buChar char="o"/>
-              <a:tabLst/>
+            <a:pPr marL="845786" lvl="1" indent="-362480" defTabSz="966612">
+              <a:buFont typeface="Arial" panose="020B0604020202020204" pitchFamily="34" charset="0"/>
+              <a:buChar char="•"/>
               <a:defRPr/>
             </a:pPr>
             <a:r>
-              <a:rPr lang="en-US" sz="1100">
+              <a:rPr lang="en-US" sz="1200" dirty="0">
                 <a:solidFill>
                   <a:srgbClr val="24292F"/>
                 </a:solidFill>
-                <a:effectLst/>
                 <a:latin typeface="+mn-lt"/>
                 <a:ea typeface="Times New Roman" panose="02020603050405020304" pitchFamily="18" charset="0"/>
               </a:rPr>
-              <a:t>So often, students think they can learn AI programming while multi-tasking on Facebook or texting friends on their cell phone. After programming for 30 years, I've learned one thing. You'll learn AI much faster if you can devote focused, uninterrupted time to practice.</a:t>
-            </a:r>
-          </a:p>
-          <a:p>
-            <a:pPr marL="342900" marR="0" lvl="0" indent="-342900" algn="l" defTabSz="914400" rtl="0" eaLnBrk="1" fontAlgn="auto" latinLnBrk="0" hangingPunct="1">
-              <a:lnSpc>
-                <a:spcPct val="100000"/>
-              </a:lnSpc>
-              <a:spcBef>
-                <a:spcPts val="0"/>
-              </a:spcBef>
-              <a:spcAft>
-                <a:spcPts val="0"/>
-              </a:spcAft>
-              <a:buClrTx/>
-              <a:buSzTx/>
+              <a:t>So often, students think they can learn AI programming while multi-tasking -- posting on Facebook, texting friends or watching TikTok.  If anything, these kinds of activities will slow you down.  Instead, you'll learn Python much faster if you can devote focused time to practice.</a:t>
+            </a:r>
+          </a:p>
+          <a:p>
+            <a:pPr marL="362480" indent="-362480" defTabSz="966612">
               <a:buFontTx/>
               <a:buAutoNum type="arabicPeriod"/>
-              <a:tabLst/>
               <a:defRPr/>
             </a:pPr>
             <a:r>
-              <a:rPr lang="en-US" sz="1100" b="1">
-                <a:effectLst/>
+              <a:rPr lang="en-US" sz="1200" b="1" dirty="0">
                 <a:latin typeface="+mn-lt"/>
                 <a:ea typeface="Calibri" panose="020F0502020204030204" pitchFamily="34" charset="0"/>
                 <a:cs typeface="LMRoman12-Bold"/>
@@ -901,35 +934,21 @@
             </a:r>
           </a:p>
           <a:p>
-            <a:pPr marL="800100" marR="0" lvl="1" indent="-342900" algn="l" defTabSz="914400" rtl="0" eaLnBrk="1" fontAlgn="auto" latinLnBrk="0" hangingPunct="1">
-              <a:lnSpc>
-                <a:spcPct val="100000"/>
-              </a:lnSpc>
-              <a:spcBef>
-                <a:spcPts val="0"/>
-              </a:spcBef>
-              <a:spcAft>
-                <a:spcPts val="0"/>
-              </a:spcAft>
-              <a:buClrTx/>
-              <a:buSzTx/>
-              <a:buFont typeface="Courier New" panose="02070309020205020404" pitchFamily="49" charset="0"/>
-              <a:buChar char="o"/>
-              <a:tabLst/>
+            <a:pPr marL="845786" lvl="1" indent="-362480" defTabSz="966612">
+              <a:buFont typeface="Arial" panose="020B0604020202020204" pitchFamily="34" charset="0"/>
+              <a:buChar char="•"/>
               <a:defRPr/>
             </a:pPr>
             <a:r>
-              <a:rPr lang="en-US" sz="1100">
-                <a:effectLst/>
+              <a:rPr lang="en-US" sz="1200" dirty="0">
                 <a:latin typeface="+mn-lt"/>
                 <a:ea typeface="Calibri" panose="020F0502020204030204" pitchFamily="34" charset="0"/>
                 <a:cs typeface="LMRoman10-Regular"/>
               </a:rPr>
-              <a:t>Although copying and pasting may help you to avoid typing errors, it can also interfere with your learning</a:t>
-            </a:r>
-            <a:r>
-              <a:rPr lang="en-US" sz="1100">
-                <a:effectLst/>
+              <a:t>Although copying and pasting may help you avoid typing errors, it can also interfere with your learning</a:t>
+            </a:r>
+            <a:r>
+              <a:rPr lang="en-US" sz="1200" dirty="0">
                 <a:latin typeface="+mn-lt"/>
                 <a:ea typeface="Calibri" panose="020F0502020204030204" pitchFamily="34" charset="0"/>
                 <a:cs typeface="Times New Roman" panose="02020603050405020304" pitchFamily="18" charset="0"/>
@@ -937,36 +956,22 @@
               <a:t> </a:t>
             </a:r>
             <a:r>
-              <a:rPr lang="en-US" sz="1100">
-                <a:effectLst/>
+              <a:rPr lang="en-US" sz="1200" dirty="0">
                 <a:latin typeface="+mn-lt"/>
                 <a:ea typeface="Calibri" panose="020F0502020204030204" pitchFamily="34" charset="0"/>
                 <a:cs typeface="LMRoman10-Regular"/>
               </a:rPr>
-              <a:t>process for two reasons:</a:t>
-            </a:r>
-          </a:p>
-          <a:p>
-            <a:pPr marL="1257300" marR="0" lvl="2" indent="-342900" algn="l" defTabSz="914400" rtl="0" eaLnBrk="1" fontAlgn="auto" latinLnBrk="0" hangingPunct="1">
-              <a:lnSpc>
-                <a:spcPct val="100000"/>
-              </a:lnSpc>
-              <a:spcBef>
-                <a:spcPts val="0"/>
-              </a:spcBef>
-              <a:spcAft>
-                <a:spcPts val="0"/>
-              </a:spcAft>
-              <a:buClrTx/>
-              <a:buSzTx/>
-              <a:buFont typeface="Courier New" panose="02070309020205020404" pitchFamily="49" charset="0"/>
-              <a:buChar char="o"/>
-              <a:tabLst/>
+              <a:t>process for the following two reasons:</a:t>
+            </a:r>
+          </a:p>
+          <a:p>
+            <a:pPr marL="1329092" lvl="2" indent="-362480" defTabSz="966612">
+              <a:buFont typeface="Arial" panose="020B0604020202020204" pitchFamily="34" charset="0"/>
+              <a:buChar char="•"/>
               <a:defRPr/>
             </a:pPr>
             <a:r>
-              <a:rPr lang="en-US" sz="1100">
-                <a:effectLst/>
+              <a:rPr lang="en-US" sz="1200" dirty="0">
                 <a:latin typeface="+mn-lt"/>
                 <a:ea typeface="Calibri" panose="020F0502020204030204" pitchFamily="34" charset="0"/>
                 <a:cs typeface="Times New Roman" panose="02020603050405020304" pitchFamily="18" charset="0"/>
@@ -974,17 +979,15 @@
               <a:t>Typing </a:t>
             </a:r>
             <a:r>
-              <a:rPr lang="en-US" sz="1100">
-                <a:effectLst/>
+              <a:rPr lang="en-US" sz="1200" dirty="0">
                 <a:latin typeface="+mn-lt"/>
                 <a:ea typeface="Calibri" panose="020F0502020204030204" pitchFamily="34" charset="0"/>
                 <a:cs typeface="LMRoman10-Regular"/>
               </a:rPr>
-              <a:t>errors can help you gain experience in writing code it provides informative feedback when you</a:t>
-            </a:r>
-            <a:r>
-              <a:rPr lang="en-US" sz="1100">
-                <a:effectLst/>
+              <a:t>errors can help you gain experience writing code as it provides informative feedback when you</a:t>
+            </a:r>
+            <a:r>
+              <a:rPr lang="en-US" sz="1200" dirty="0">
                 <a:latin typeface="+mn-lt"/>
                 <a:ea typeface="Calibri" panose="020F0502020204030204" pitchFamily="34" charset="0"/>
                 <a:cs typeface="Times New Roman" panose="02020603050405020304" pitchFamily="18" charset="0"/>
@@ -992,17 +995,15 @@
               <a:t> </a:t>
             </a:r>
             <a:r>
-              <a:rPr lang="en-US" sz="1100">
-                <a:effectLst/>
+              <a:rPr lang="en-US" sz="1200" dirty="0">
                 <a:latin typeface="+mn-lt"/>
                 <a:ea typeface="Calibri" panose="020F0502020204030204" pitchFamily="34" charset="0"/>
                 <a:cs typeface="LMRoman10-Regular"/>
               </a:rPr>
-              <a:t>make mistakes. Making and correcting typing errors is an important skill to develop, particularly</a:t>
-            </a:r>
-            <a:r>
-              <a:rPr lang="en-US" sz="1100">
-                <a:effectLst/>
+              <a:t>make mistakes. Making and correcting typing errors is an important skill, particularly</a:t>
+            </a:r>
+            <a:r>
+              <a:rPr lang="en-US" sz="1200" dirty="0">
                 <a:latin typeface="+mn-lt"/>
                 <a:ea typeface="Calibri" panose="020F0502020204030204" pitchFamily="34" charset="0"/>
                 <a:cs typeface="Times New Roman" panose="02020603050405020304" pitchFamily="18" charset="0"/>
@@ -1010,8 +1011,7 @@
               <a:t> </a:t>
             </a:r>
             <a:r>
-              <a:rPr lang="en-US" sz="1100">
-                <a:effectLst/>
+              <a:rPr lang="en-US" sz="1200" dirty="0">
                 <a:latin typeface="+mn-lt"/>
                 <a:ea typeface="Calibri" panose="020F0502020204030204" pitchFamily="34" charset="0"/>
                 <a:cs typeface="LMRoman10-Regular"/>
@@ -1020,26 +1020,13 @@
             </a:r>
           </a:p>
           <a:p>
-            <a:pPr marL="1257300" marR="0" lvl="2" indent="-342900" algn="l" defTabSz="914400" rtl="0" eaLnBrk="1" fontAlgn="auto" latinLnBrk="0" hangingPunct="1">
-              <a:lnSpc>
-                <a:spcPct val="100000"/>
-              </a:lnSpc>
-              <a:spcBef>
-                <a:spcPts val="0"/>
-              </a:spcBef>
-              <a:spcAft>
-                <a:spcPts val="0"/>
-              </a:spcAft>
-              <a:buClrTx/>
-              <a:buSzTx/>
-              <a:buFont typeface="Courier New" panose="02070309020205020404" pitchFamily="49" charset="0"/>
-              <a:buChar char="o"/>
-              <a:tabLst/>
+            <a:pPr marL="1329092" lvl="2" indent="-362480" defTabSz="966612">
+              <a:buFont typeface="Arial" panose="020B0604020202020204" pitchFamily="34" charset="0"/>
+              <a:buChar char="•"/>
               <a:defRPr/>
             </a:pPr>
             <a:r>
-              <a:rPr lang="en-US" sz="1100">
-                <a:effectLst/>
+              <a:rPr lang="en-US" sz="1200" dirty="0">
                 <a:latin typeface="+mn-lt"/>
                 <a:ea typeface="Calibri" panose="020F0502020204030204" pitchFamily="34" charset="0"/>
                 <a:cs typeface="Times New Roman" panose="02020603050405020304" pitchFamily="18" charset="0"/>
@@ -1047,35 +1034,31 @@
               <a:t>Copying </a:t>
             </a:r>
             <a:r>
-              <a:rPr lang="en-US" sz="1100">
-                <a:effectLst/>
+              <a:rPr lang="en-US" sz="1200" dirty="0">
                 <a:latin typeface="+mn-lt"/>
                 <a:ea typeface="Calibri" panose="020F0502020204030204" pitchFamily="34" charset="0"/>
                 <a:cs typeface="LMRoman10-Regular"/>
               </a:rPr>
-              <a:t>and pasting code may give you the impression that you know what you are doing when – in reality – you probably do not fully understand what the individual blocks of code are actually doing.</a:t>
-            </a:r>
-            <a:r>
-              <a:rPr lang="en-US" sz="1100">
-                <a:effectLst/>
+              <a:t>and pasting code may give you the impression that you know what you are doing when – in reality – you may not fully understand what the code is actually doing.</a:t>
+            </a:r>
+            <a:r>
+              <a:rPr lang="en-US" sz="1200" dirty="0">
                 <a:latin typeface="+mn-lt"/>
                 <a:ea typeface="Calibri" panose="020F0502020204030204" pitchFamily="34" charset="0"/>
                 <a:cs typeface="Times New Roman" panose="02020603050405020304" pitchFamily="18" charset="0"/>
               </a:rPr>
-              <a:t> </a:t>
-            </a:r>
-            <a:r>
-              <a:rPr lang="en-US" sz="1100">
-                <a:effectLst/>
+              <a:t> T</a:t>
+            </a:r>
+            <a:r>
+              <a:rPr lang="en-US" sz="1200" dirty="0">
                 <a:latin typeface="+mn-lt"/>
                 <a:ea typeface="Calibri" panose="020F0502020204030204" pitchFamily="34" charset="0"/>
                 <a:cs typeface="LMRoman10-Regular"/>
               </a:rPr>
-              <a:t>Furthermore, this problem will just get worse as you deal with increasingly longer and more complicated</a:t>
-            </a:r>
-            <a:r>
-              <a:rPr lang="en-US" sz="1100">
-                <a:effectLst/>
+              <a:t>his problem only gets worse as you work with longer and more complicated</a:t>
+            </a:r>
+            <a:r>
+              <a:rPr lang="en-US" sz="1200" dirty="0">
                 <a:latin typeface="+mn-lt"/>
                 <a:ea typeface="Calibri" panose="020F0502020204030204" pitchFamily="34" charset="0"/>
                 <a:cs typeface="Times New Roman" panose="02020603050405020304" pitchFamily="18" charset="0"/>
@@ -1083,8 +1066,7 @@
               <a:t> s</a:t>
             </a:r>
             <a:r>
-              <a:rPr lang="en-US" sz="1100">
-                <a:effectLst/>
+              <a:rPr lang="en-US" sz="1200" dirty="0">
                 <a:latin typeface="+mn-lt"/>
                 <a:ea typeface="Calibri" panose="020F0502020204030204" pitchFamily="34" charset="0"/>
                 <a:cs typeface="LMRoman10-Regular"/>
@@ -1093,26 +1075,13 @@
             </a:r>
           </a:p>
           <a:p>
-            <a:pPr marL="342900" marR="0" lvl="0" indent="-342900" algn="l" defTabSz="914400" rtl="0" eaLnBrk="1" fontAlgn="auto" latinLnBrk="0" hangingPunct="1">
-              <a:lnSpc>
-                <a:spcPct val="100000"/>
-              </a:lnSpc>
-              <a:spcBef>
-                <a:spcPts val="0"/>
-              </a:spcBef>
-              <a:spcAft>
-                <a:spcPts val="0"/>
-              </a:spcAft>
-              <a:buClrTx/>
-              <a:buSzTx/>
+            <a:pPr marL="362480" indent="-362480" defTabSz="966612">
               <a:buFont typeface="+mj-lt"/>
               <a:buAutoNum type="arabicPeriod"/>
-              <a:tabLst/>
               <a:defRPr/>
             </a:pPr>
             <a:r>
-              <a:rPr lang="en-US" sz="1100" b="1">
-                <a:effectLst/>
+              <a:rPr lang="en-US" sz="1200" b="1" dirty="0">
                 <a:latin typeface="+mn-lt"/>
                 <a:ea typeface="Calibri" panose="020F0502020204030204" pitchFamily="34" charset="0"/>
                 <a:cs typeface="LMRoman12-Bold"/>
@@ -1121,124 +1090,64 @@
             </a:r>
           </a:p>
           <a:p>
-            <a:pPr marL="800100" marR="0" lvl="1" indent="-342900" algn="l" defTabSz="914400" rtl="0" eaLnBrk="1" fontAlgn="auto" latinLnBrk="0" hangingPunct="1">
-              <a:lnSpc>
-                <a:spcPct val="100000"/>
-              </a:lnSpc>
-              <a:spcBef>
-                <a:spcPts val="0"/>
-              </a:spcBef>
-              <a:spcAft>
-                <a:spcPts val="0"/>
-              </a:spcAft>
-              <a:buClrTx/>
-              <a:buSzTx/>
+            <a:pPr marL="845786" lvl="1" indent="-362480" defTabSz="966612">
               <a:buFont typeface="Courier New" panose="02070309020205020404" pitchFamily="49" charset="0"/>
               <a:buChar char="o"/>
-              <a:tabLst/>
               <a:defRPr/>
             </a:pPr>
             <a:r>
-              <a:rPr lang="en-US" sz="1100">
-                <a:effectLst/>
+              <a:rPr lang="en-US" sz="1200" dirty="0">
                 <a:latin typeface="+mn-lt"/>
                 <a:ea typeface="Calibri" panose="020F0502020204030204" pitchFamily="34" charset="0"/>
                 <a:cs typeface="LMRoman10-Regular"/>
               </a:rPr>
-              <a:t>This means running one block of code at a time and making sure that you understand why the output is what</a:t>
-            </a:r>
-            <a:r>
-              <a:rPr lang="en-US" sz="1100">
-                <a:effectLst/>
+              <a:t>This means running one block of code at a time and making sure you understand the output. If things aren’t clear, spend more time with the code.  Here are some</a:t>
+            </a:r>
+            <a:r>
+              <a:rPr lang="en-US" sz="1200" dirty="0">
                 <a:latin typeface="+mn-lt"/>
                 <a:ea typeface="Calibri" panose="020F0502020204030204" pitchFamily="34" charset="0"/>
                 <a:cs typeface="Times New Roman" panose="02020603050405020304" pitchFamily="18" charset="0"/>
               </a:rPr>
-              <a:t> </a:t>
-            </a:r>
-            <a:r>
-              <a:rPr lang="en-US" sz="1100">
-                <a:effectLst/>
+              <a:t> helpful pointers</a:t>
+            </a:r>
+            <a:r>
+              <a:rPr lang="en-US" sz="1200" dirty="0">
                 <a:latin typeface="+mn-lt"/>
                 <a:ea typeface="Calibri" panose="020F0502020204030204" pitchFamily="34" charset="0"/>
                 <a:cs typeface="LMRoman10-Regular"/>
               </a:rPr>
-              <a:t>it is. If things are not clear, it is important to spend more time with that piece of the code. Here are some</a:t>
-            </a:r>
-            <a:r>
-              <a:rPr lang="en-US" sz="1100">
-                <a:effectLst/>
-                <a:latin typeface="+mn-lt"/>
-                <a:ea typeface="Calibri" panose="020F0502020204030204" pitchFamily="34" charset="0"/>
-                <a:cs typeface="Times New Roman" panose="02020603050405020304" pitchFamily="18" charset="0"/>
-              </a:rPr>
-              <a:t> </a:t>
-            </a:r>
-            <a:r>
-              <a:rPr lang="en-US" sz="1100">
-                <a:effectLst/>
-                <a:latin typeface="+mn-lt"/>
-                <a:ea typeface="Calibri" panose="020F0502020204030204" pitchFamily="34" charset="0"/>
-                <a:cs typeface="LMRoman10-Regular"/>
-              </a:rPr>
-              <a:t>tricks that are often helpful to understand a particular piece of code:</a:t>
-            </a:r>
-          </a:p>
-          <a:p>
-            <a:pPr marL="1257300" marR="0" lvl="2" indent="-342900" algn="l" defTabSz="914400" rtl="0" eaLnBrk="1" fontAlgn="auto" latinLnBrk="0" hangingPunct="1">
-              <a:lnSpc>
-                <a:spcPct val="100000"/>
-              </a:lnSpc>
-              <a:spcBef>
-                <a:spcPts val="0"/>
-              </a:spcBef>
-              <a:spcAft>
-                <a:spcPts val="0"/>
-              </a:spcAft>
-              <a:buClrTx/>
-              <a:buSzTx/>
+              <a:t>:</a:t>
+            </a:r>
+          </a:p>
+          <a:p>
+            <a:pPr marL="1329092" lvl="2" indent="-362480" defTabSz="966612">
               <a:buFont typeface="Courier New" panose="02070309020205020404" pitchFamily="49" charset="0"/>
               <a:buChar char="o"/>
-              <a:tabLst/>
               <a:defRPr/>
             </a:pPr>
             <a:r>
-              <a:rPr lang="en-US" sz="1100">
-                <a:effectLst/>
+              <a:rPr lang="en-US" sz="1200" dirty="0">
                 <a:latin typeface="+mn-lt"/>
                 <a:ea typeface="Calibri" panose="020F0502020204030204" pitchFamily="34" charset="0"/>
                 <a:cs typeface="LMRoman10-Regular"/>
               </a:rPr>
               <a:t>Break a line of code into its components and try to understand the individual pieces.  Sometimes functions are nested within functions.</a:t>
             </a:r>
-            <a:endParaRPr lang="en-US" sz="1100">
-              <a:effectLst/>
+            <a:endParaRPr lang="en-US" sz="1200" dirty="0">
               <a:latin typeface="+mn-lt"/>
               <a:ea typeface="Calibri" panose="020F0502020204030204" pitchFamily="34" charset="0"/>
               <a:cs typeface="Times New Roman" panose="02020603050405020304" pitchFamily="18" charset="0"/>
             </a:endParaRPr>
           </a:p>
           <a:p>
-            <a:pPr marL="1257300" marR="0" lvl="2" indent="-342900" algn="l" defTabSz="914400" rtl="0" eaLnBrk="1" fontAlgn="auto" latinLnBrk="0" hangingPunct="1">
-              <a:lnSpc>
-                <a:spcPct val="100000"/>
-              </a:lnSpc>
-              <a:spcBef>
-                <a:spcPts val="0"/>
-              </a:spcBef>
-              <a:spcAft>
-                <a:spcPts val="0"/>
-              </a:spcAft>
-              <a:buClrTx/>
-              <a:buSzTx/>
+            <a:pPr marL="1329092" lvl="2" indent="-362480" defTabSz="966612">
               <a:buFont typeface="Courier New" panose="02070309020205020404" pitchFamily="49" charset="0"/>
               <a:buChar char="o"/>
-              <a:tabLst/>
               <a:defRPr/>
             </a:pPr>
             <a:r>
-              <a:rPr lang="en-US" sz="1100">
-                <a:effectLst/>
+              <a:rPr lang="en-US" sz="1200" dirty="0">
                 <a:latin typeface="+mn-lt"/>
                 <a:ea typeface="Calibri" panose="020F0502020204030204" pitchFamily="34" charset="0"/>
                 <a:cs typeface="LMRoman10-Regular"/>
@@ -1246,14 +1155,13 @@
               <a:t>Document what each block is doing. Clear documentation is critical as you may not remember what you did when you come back to a piece of code at some point in the future. As a wise programmer once said, “Write code for the future you.” Documentation is also useful when you want to adapt or reuse code in some other way. In situations like this, you will immediately know what a specific chunk of code does because it has been clearly documented.  </a:t>
             </a:r>
             <a:r>
-              <a:rPr lang="en-US" sz="1100" b="1">
+              <a:rPr lang="en-US" sz="1200" b="1" dirty="0">
                 <a:solidFill>
                   <a:schemeClr val="tx1">
                     <a:lumMod val="75000"/>
                     <a:lumOff val="25000"/>
                   </a:schemeClr>
                 </a:solidFill>
-                <a:effectLst/>
                 <a:latin typeface="+mn-lt"/>
                 <a:ea typeface="Calibri" panose="020F0502020204030204" pitchFamily="34" charset="0"/>
                 <a:cs typeface="LMRoman10-Regular"/>
@@ -1261,76 +1169,47 @@
               <a:t>Donald Knuth </a:t>
             </a:r>
             <a:r>
-              <a:rPr lang="en-US" sz="1100">
-                <a:effectLst/>
+              <a:rPr lang="en-US" sz="1200" dirty="0">
                 <a:latin typeface="+mn-lt"/>
                 <a:ea typeface="Calibri" panose="020F0502020204030204" pitchFamily="34" charset="0"/>
                 <a:cs typeface="LMRoman10-Regular"/>
               </a:rPr>
               <a:t>– Literate Programming</a:t>
             </a:r>
-            <a:endParaRPr lang="en-US" sz="1100">
-              <a:effectLst/>
+            <a:endParaRPr lang="en-US" sz="1200" dirty="0">
               <a:latin typeface="+mn-lt"/>
               <a:ea typeface="Calibri" panose="020F0502020204030204" pitchFamily="34" charset="0"/>
               <a:cs typeface="Times New Roman" panose="02020603050405020304" pitchFamily="18" charset="0"/>
             </a:endParaRPr>
           </a:p>
           <a:p>
-            <a:pPr marL="1257300" marR="0" lvl="2" indent="-342900" algn="l" defTabSz="914400" rtl="0" eaLnBrk="1" fontAlgn="auto" latinLnBrk="0" hangingPunct="1">
-              <a:lnSpc>
-                <a:spcPct val="100000"/>
-              </a:lnSpc>
-              <a:spcBef>
-                <a:spcPts val="0"/>
-              </a:spcBef>
-              <a:spcAft>
-                <a:spcPts val="0"/>
-              </a:spcAft>
-              <a:buClrTx/>
-              <a:buSzTx/>
+            <a:pPr marL="1329092" lvl="2" indent="-362480" defTabSz="966612">
               <a:buFont typeface="Courier New" panose="02070309020205020404" pitchFamily="49" charset="0"/>
               <a:buChar char="o"/>
-              <a:tabLst/>
               <a:defRPr/>
             </a:pPr>
             <a:r>
-              <a:rPr lang="en-US" sz="1100">
-                <a:effectLst/>
+              <a:rPr lang="en-US" sz="1200" dirty="0">
                 <a:latin typeface="+mn-lt"/>
                 <a:ea typeface="Calibri" panose="020F0502020204030204" pitchFamily="34" charset="0"/>
                 <a:cs typeface="LMRoman10-Regular"/>
               </a:rPr>
-              <a:t>Perform mini experiments: create a simpler example in which you can tinker with the code and see what happens to the output.</a:t>
-            </a:r>
-            <a:endParaRPr lang="en-US" sz="1100">
-              <a:effectLst/>
+              <a:t>Perform mini experiments.  Simplify the code and then tinker with it to see what happens.</a:t>
+            </a:r>
+            <a:endParaRPr lang="en-US" sz="1200" dirty="0">
               <a:latin typeface="+mn-lt"/>
               <a:ea typeface="Calibri" panose="020F0502020204030204" pitchFamily="34" charset="0"/>
               <a:cs typeface="Times New Roman" panose="02020603050405020304" pitchFamily="18" charset="0"/>
             </a:endParaRPr>
           </a:p>
           <a:p>
-            <a:pPr marL="342900" marR="0" lvl="0" indent="-342900" algn="l" defTabSz="914400" rtl="0" eaLnBrk="1" fontAlgn="auto" latinLnBrk="0" hangingPunct="1">
-              <a:lnSpc>
-                <a:spcPct val="100000"/>
-              </a:lnSpc>
-              <a:spcBef>
-                <a:spcPts val="0"/>
-              </a:spcBef>
-              <a:spcAft>
-                <a:spcPts val="0"/>
-              </a:spcAft>
-              <a:buClrTx/>
-              <a:buSzTx/>
+            <a:pPr marL="362480" indent="-362480" defTabSz="966612">
               <a:buFont typeface="+mj-lt"/>
               <a:buAutoNum type="arabicPeriod"/>
-              <a:tabLst/>
               <a:defRPr/>
             </a:pPr>
             <a:r>
-              <a:rPr lang="en-US" sz="1100" b="1">
-                <a:effectLst/>
+              <a:rPr lang="en-US" sz="1200" b="1" dirty="0">
                 <a:latin typeface="+mn-lt"/>
                 <a:ea typeface="Calibri" panose="020F0502020204030204" pitchFamily="34" charset="0"/>
                 <a:cs typeface="LMRoman12-Bold"/>
@@ -1339,35 +1218,21 @@
             </a:r>
           </a:p>
           <a:p>
-            <a:pPr marL="800100" marR="0" lvl="1" indent="-342900" algn="l" defTabSz="914400" rtl="0" eaLnBrk="1" fontAlgn="auto" latinLnBrk="0" hangingPunct="1">
-              <a:lnSpc>
-                <a:spcPct val="100000"/>
-              </a:lnSpc>
-              <a:spcBef>
-                <a:spcPts val="0"/>
-              </a:spcBef>
-              <a:spcAft>
-                <a:spcPts val="0"/>
-              </a:spcAft>
-              <a:buClrTx/>
-              <a:buSzTx/>
+            <a:pPr marL="845786" lvl="1" indent="-362480" defTabSz="966612">
               <a:buFont typeface="Courier New" panose="02070309020205020404" pitchFamily="49" charset="0"/>
               <a:buChar char="o"/>
-              <a:tabLst/>
               <a:defRPr/>
             </a:pPr>
             <a:r>
-              <a:rPr lang="en-US" sz="1100">
-                <a:effectLst/>
+              <a:rPr lang="en-US" sz="1200" dirty="0">
                 <a:latin typeface="+mn-lt"/>
                 <a:ea typeface="Calibri" panose="020F0502020204030204" pitchFamily="34" charset="0"/>
                 <a:cs typeface="LMRoman10-Regular"/>
               </a:rPr>
-              <a:t>Everybody (from novice to more experienced users) relies on the internet when they don’t understand</a:t>
-            </a:r>
-            <a:r>
-              <a:rPr lang="en-US" sz="1100">
-                <a:effectLst/>
+              <a:t>Everybody (from novice to master) searches the internet when they don’t understand</a:t>
+            </a:r>
+            <a:r>
+              <a:rPr lang="en-US" sz="1200" dirty="0">
                 <a:latin typeface="+mn-lt"/>
                 <a:ea typeface="Calibri" panose="020F0502020204030204" pitchFamily="34" charset="0"/>
                 <a:cs typeface="Times New Roman" panose="02020603050405020304" pitchFamily="18" charset="0"/>
@@ -1375,17 +1240,15 @@
               <a:t> </a:t>
             </a:r>
             <a:r>
-              <a:rPr lang="en-US" sz="1100">
-                <a:effectLst/>
+              <a:rPr lang="en-US" sz="1200" dirty="0">
                 <a:latin typeface="+mn-lt"/>
                 <a:ea typeface="Calibri" panose="020F0502020204030204" pitchFamily="34" charset="0"/>
                 <a:cs typeface="LMRoman10-Regular"/>
               </a:rPr>
-              <a:t>something. It is likely that other people have already asked (and received useful answers) for the problem</a:t>
-            </a:r>
-            <a:r>
-              <a:rPr lang="en-US" sz="1100">
-                <a:effectLst/>
+              <a:t>something. It’s likely that other people have already asked (and received useful answers) for the problem</a:t>
+            </a:r>
+            <a:r>
+              <a:rPr lang="en-US" sz="1200" dirty="0">
                 <a:latin typeface="+mn-lt"/>
                 <a:ea typeface="Calibri" panose="020F0502020204030204" pitchFamily="34" charset="0"/>
                 <a:cs typeface="Times New Roman" panose="02020603050405020304" pitchFamily="18" charset="0"/>
@@ -1393,17 +1256,15 @@
               <a:t> </a:t>
             </a:r>
             <a:r>
-              <a:rPr lang="en-US" sz="1100">
-                <a:effectLst/>
+              <a:rPr lang="en-US" sz="1200" dirty="0">
                 <a:latin typeface="+mn-lt"/>
                 <a:ea typeface="Calibri" panose="020F0502020204030204" pitchFamily="34" charset="0"/>
                 <a:cs typeface="LMRoman10-Regular"/>
               </a:rPr>
-              <a:t>that you are facing. However, finding the exact piece of information that you need might be hard, especially</a:t>
-            </a:r>
-            <a:r>
-              <a:rPr lang="en-US" sz="1100">
-                <a:effectLst/>
+              <a:t>you’re facing. However, finding useful answers can be hard, especially</a:t>
+            </a:r>
+            <a:r>
+              <a:rPr lang="en-US" sz="1200" dirty="0">
                 <a:latin typeface="+mn-lt"/>
                 <a:ea typeface="Calibri" panose="020F0502020204030204" pitchFamily="34" charset="0"/>
                 <a:cs typeface="Times New Roman" panose="02020603050405020304" pitchFamily="18" charset="0"/>
@@ -1411,17 +1272,90 @@
               <a:t> </a:t>
             </a:r>
             <a:r>
-              <a:rPr lang="en-US" sz="1100">
-                <a:effectLst/>
+              <a:rPr lang="en-US" sz="1200" dirty="0">
                 <a:latin typeface="+mn-lt"/>
                 <a:ea typeface="Calibri" panose="020F0502020204030204" pitchFamily="34" charset="0"/>
                 <a:cs typeface="LMRoman10-Regular"/>
               </a:rPr>
-              <a:t>if you don’t use the correct terms/key words. Learning how to search for the information that you need is</a:t>
-            </a:r>
-            <a:r>
-              <a:rPr lang="en-US" sz="1100">
-                <a:effectLst/>
+              <a:t>if you don’t use the correct terms/key words.  All that to say, search is a skill that comes with practice.  </a:t>
+            </a:r>
+          </a:p>
+          <a:p>
+            <a:pPr marL="845786" lvl="1" indent="-362480" defTabSz="966612">
+              <a:buFont typeface="Courier New" panose="02070309020205020404" pitchFamily="49" charset="0"/>
+              <a:buChar char="o"/>
+              <a:defRPr/>
+            </a:pPr>
+            <a:r>
+              <a:rPr lang="en-US" sz="1200" dirty="0">
+                <a:latin typeface="+mn-lt"/>
+                <a:ea typeface="Calibri" panose="020F0502020204030204" pitchFamily="34" charset="0"/>
+                <a:cs typeface="LMRoman10-Regular"/>
+              </a:rPr>
+              <a:t>Use trusted internet resources like Stack Overflow.   I’ve also found that good cheat sheets from reputable sources can also be helpful.</a:t>
+            </a:r>
+          </a:p>
+          <a:p>
+            <a:pPr marL="362480" indent="-362480" defTabSz="966612">
+              <a:buFont typeface="+mj-lt"/>
+              <a:buAutoNum type="arabicPeriod"/>
+              <a:defRPr/>
+            </a:pPr>
+            <a:r>
+              <a:rPr lang="en-US" sz="1200" b="1" dirty="0">
+                <a:latin typeface="+mn-lt"/>
+                <a:ea typeface="Calibri" panose="020F0502020204030204" pitchFamily="34" charset="0"/>
+                <a:cs typeface="LMRoman10-Regular"/>
+              </a:rPr>
+              <a:t>Ask for Help</a:t>
+            </a:r>
+          </a:p>
+          <a:p>
+            <a:pPr marL="845786" lvl="1" indent="-362480" defTabSz="966612">
+              <a:buFont typeface="Courier New" panose="02070309020205020404" pitchFamily="49" charset="0"/>
+              <a:buChar char="o"/>
+              <a:defRPr/>
+            </a:pPr>
+            <a:r>
+              <a:rPr lang="en-US" sz="1200" dirty="0">
+                <a:latin typeface="+mn-lt"/>
+                <a:ea typeface="Calibri" panose="020F0502020204030204" pitchFamily="34" charset="0"/>
+                <a:cs typeface="LMRoman10-Regular"/>
+              </a:rPr>
+              <a:t>We’re all learning.  And some days, I feel like I’m the one who has the most to learn.  Alcoa story.</a:t>
+            </a:r>
+          </a:p>
+          <a:p>
+            <a:pPr marL="362480" indent="-362480" defTabSz="966612">
+              <a:buFont typeface="+mj-lt"/>
+              <a:buAutoNum type="arabicPeriod"/>
+              <a:defRPr/>
+            </a:pPr>
+            <a:r>
+              <a:rPr lang="en-US" sz="1200" b="1" dirty="0">
+                <a:latin typeface="+mn-lt"/>
+                <a:ea typeface="Calibri" panose="020F0502020204030204" pitchFamily="34" charset="0"/>
+                <a:cs typeface="LMRoman12-Bold"/>
+              </a:rPr>
+              <a:t>Take your time</a:t>
+            </a:r>
+          </a:p>
+          <a:p>
+            <a:pPr marL="845786" lvl="1" indent="-362480" defTabSz="966612">
+              <a:buFont typeface="Courier New" panose="02070309020205020404" pitchFamily="49" charset="0"/>
+              <a:buChar char="o"/>
+              <a:defRPr/>
+            </a:pPr>
+            <a:r>
+              <a:rPr lang="en-US" sz="1200" dirty="0">
+                <a:latin typeface="+mn-lt"/>
+                <a:ea typeface="Calibri" panose="020F0502020204030204" pitchFamily="34" charset="0"/>
+                <a:cs typeface="LMRoman10-Regular"/>
+              </a:rPr>
+              <a:t>Remember: it takes time to master any subject, including a programming language.  So, don’t rush to get things done.  Expect some level of</a:t>
+            </a:r>
+            <a:r>
+              <a:rPr lang="en-US" sz="1200" dirty="0">
                 <a:latin typeface="+mn-lt"/>
                 <a:ea typeface="Calibri" panose="020F0502020204030204" pitchFamily="34" charset="0"/>
                 <a:cs typeface="Times New Roman" panose="02020603050405020304" pitchFamily="18" charset="0"/>
@@ -1429,324 +1363,95 @@
               <a:t> </a:t>
             </a:r>
             <a:r>
-              <a:rPr lang="en-US" sz="1100">
-                <a:effectLst/>
+              <a:rPr lang="en-US" sz="1200" dirty="0">
                 <a:latin typeface="+mn-lt"/>
                 <a:ea typeface="Calibri" panose="020F0502020204030204" pitchFamily="34" charset="0"/>
                 <a:cs typeface="LMRoman10-Regular"/>
               </a:rPr>
-              <a:t>a skill that also takes practice. “</a:t>
-            </a:r>
-            <a:r>
-              <a:rPr lang="en-US" sz="1100" err="1">
-                <a:effectLst/>
+              <a:t>struggle and frustration.  However, as your skill grows, you’ll be amazed</a:t>
+            </a:r>
+            <a:r>
+              <a:rPr lang="en-US" sz="1200" dirty="0">
+                <a:latin typeface="+mn-lt"/>
+                <a:ea typeface="Calibri" panose="020F0502020204030204" pitchFamily="34" charset="0"/>
+                <a:cs typeface="Times New Roman" panose="02020603050405020304" pitchFamily="18" charset="0"/>
+              </a:rPr>
+              <a:t> at what you can do</a:t>
+            </a:r>
+            <a:r>
+              <a:rPr lang="en-US" sz="1200" dirty="0">
                 <a:latin typeface="+mn-lt"/>
                 <a:ea typeface="Calibri" panose="020F0502020204030204" pitchFamily="34" charset="0"/>
                 <a:cs typeface="LMRoman10-Regular"/>
               </a:rPr>
-              <a:t>Stackoverflow</a:t>
-            </a:r>
-            <a:r>
-              <a:rPr lang="en-US" sz="1100">
-                <a:effectLst/>
-                <a:latin typeface="+mn-lt"/>
-                <a:ea typeface="Calibri" panose="020F0502020204030204" pitchFamily="34" charset="0"/>
-                <a:cs typeface="LMRoman10-Regular"/>
-              </a:rPr>
-              <a:t>” and existing </a:t>
-            </a:r>
-            <a:r>
-              <a:rPr lang="en-US" sz="1100" err="1">
-                <a:effectLst/>
-                <a:latin typeface="+mn-lt"/>
-                <a:ea typeface="Calibri" panose="020F0502020204030204" pitchFamily="34" charset="0"/>
-                <a:cs typeface="LMRoman10-Regular"/>
-              </a:rPr>
-              <a:t>cheatsheets</a:t>
-            </a:r>
-            <a:r>
-              <a:rPr lang="en-US" sz="1100">
-                <a:effectLst/>
-                <a:latin typeface="+mn-lt"/>
-                <a:ea typeface="Calibri" panose="020F0502020204030204" pitchFamily="34" charset="0"/>
-                <a:cs typeface="LMRoman10-Regular"/>
-              </a:rPr>
-              <a:t> can be very helpful.</a:t>
-            </a:r>
-          </a:p>
-          <a:p>
-            <a:pPr marL="342900" marR="0" lvl="0" indent="-342900" algn="l" defTabSz="914400" rtl="0" eaLnBrk="1" fontAlgn="auto" latinLnBrk="0" hangingPunct="1">
-              <a:lnSpc>
-                <a:spcPct val="100000"/>
-              </a:lnSpc>
-              <a:spcBef>
-                <a:spcPts val="0"/>
-              </a:spcBef>
-              <a:spcAft>
-                <a:spcPts val="0"/>
-              </a:spcAft>
-              <a:buClrTx/>
-              <a:buSzTx/>
-              <a:buFont typeface="+mj-lt"/>
-              <a:buAutoNum type="arabicPeriod"/>
-              <a:tabLst/>
+              <a:t>.</a:t>
+            </a:r>
+            <a:endParaRPr lang="en-US" sz="1200" dirty="0">
+              <a:latin typeface="+mn-lt"/>
+              <a:ea typeface="Calibri" panose="020F0502020204030204" pitchFamily="34" charset="0"/>
+              <a:cs typeface="Times New Roman" panose="02020603050405020304" pitchFamily="18" charset="0"/>
+            </a:endParaRPr>
+          </a:p>
+          <a:p>
+            <a:pPr defTabSz="966612">
               <a:defRPr/>
             </a:pPr>
-            <a:r>
-              <a:rPr lang="en-US" sz="1100" b="1">
-                <a:effectLst/>
-                <a:latin typeface="+mn-lt"/>
-                <a:ea typeface="Calibri" panose="020F0502020204030204" pitchFamily="34" charset="0"/>
-                <a:cs typeface="LMRoman10-Regular"/>
-              </a:rPr>
-              <a:t>Ask for Help</a:t>
-            </a:r>
-          </a:p>
-          <a:p>
-            <a:pPr marL="800100" marR="0" lvl="1" indent="-342900" algn="l" defTabSz="914400" rtl="0" eaLnBrk="1" fontAlgn="auto" latinLnBrk="0" hangingPunct="1">
-              <a:lnSpc>
-                <a:spcPct val="100000"/>
-              </a:lnSpc>
-              <a:spcBef>
-                <a:spcPts val="0"/>
-              </a:spcBef>
-              <a:spcAft>
-                <a:spcPts val="0"/>
-              </a:spcAft>
-              <a:buClrTx/>
-              <a:buSzTx/>
-              <a:buFont typeface="Courier New" panose="02070309020205020404" pitchFamily="49" charset="0"/>
-              <a:buChar char="o"/>
-              <a:tabLst/>
+            <a:endParaRPr lang="en-US" sz="1200" dirty="0">
+              <a:latin typeface="+mn-lt"/>
+              <a:ea typeface="Calibri" panose="020F0502020204030204" pitchFamily="34" charset="0"/>
+              <a:cs typeface="Times New Roman" panose="02020603050405020304" pitchFamily="18" charset="0"/>
+            </a:endParaRPr>
+          </a:p>
+          <a:p>
+            <a:pPr defTabSz="966612">
               <a:defRPr/>
             </a:pPr>
             <a:r>
-              <a:rPr lang="en-US" sz="1100" b="0">
-                <a:effectLst/>
-                <a:latin typeface="+mn-lt"/>
-                <a:ea typeface="Calibri" panose="020F0502020204030204" pitchFamily="34" charset="0"/>
-                <a:cs typeface="LMRoman10-Regular"/>
-              </a:rPr>
-              <a:t>We’re all learning.  And some days, I feel like I’m the one who has the most to learn.  Alcoa story.</a:t>
-            </a:r>
-          </a:p>
-          <a:p>
-            <a:pPr marL="342900" marR="0" lvl="0" indent="-342900" algn="l" defTabSz="914400" rtl="0" eaLnBrk="1" fontAlgn="auto" latinLnBrk="0" hangingPunct="1">
-              <a:lnSpc>
-                <a:spcPct val="100000"/>
-              </a:lnSpc>
-              <a:spcBef>
-                <a:spcPts val="0"/>
-              </a:spcBef>
-              <a:spcAft>
-                <a:spcPts val="0"/>
-              </a:spcAft>
-              <a:buClrTx/>
-              <a:buSzTx/>
-              <a:buFont typeface="+mj-lt"/>
-              <a:buAutoNum type="arabicPeriod"/>
-              <a:tabLst/>
-              <a:defRPr/>
-            </a:pPr>
-            <a:r>
-              <a:rPr lang="en-US" sz="1100" b="1">
-                <a:effectLst/>
-                <a:latin typeface="+mn-lt"/>
-                <a:ea typeface="Calibri" panose="020F0502020204030204" pitchFamily="34" charset="0"/>
-                <a:cs typeface="LMRoman12-Bold"/>
-              </a:rPr>
-              <a:t>Take your time</a:t>
-            </a:r>
-          </a:p>
-          <a:p>
-            <a:pPr marL="800100" marR="0" lvl="1" indent="-342900" algn="l" defTabSz="914400" rtl="0" eaLnBrk="1" fontAlgn="auto" latinLnBrk="0" hangingPunct="1">
-              <a:lnSpc>
-                <a:spcPct val="100000"/>
-              </a:lnSpc>
-              <a:spcBef>
-                <a:spcPts val="0"/>
-              </a:spcBef>
-              <a:spcAft>
-                <a:spcPts val="0"/>
-              </a:spcAft>
-              <a:buClrTx/>
-              <a:buSzTx/>
-              <a:buFont typeface="Courier New" panose="02070309020205020404" pitchFamily="49" charset="0"/>
-              <a:buChar char="o"/>
-              <a:tabLst/>
-              <a:defRPr/>
-            </a:pPr>
-            <a:r>
-              <a:rPr lang="en-US" sz="1100">
-                <a:effectLst/>
-                <a:latin typeface="+mn-lt"/>
-                <a:ea typeface="Calibri" panose="020F0502020204030204" pitchFamily="34" charset="0"/>
-                <a:cs typeface="LMRoman10-Regular"/>
-              </a:rPr>
-              <a:t>It is important to realize that it takes time to learn AI. What this implies is that you should not</a:t>
-            </a:r>
-            <a:r>
-              <a:rPr lang="en-US" sz="1100">
-                <a:effectLst/>
+              <a:rPr lang="en-US" sz="1200" dirty="0">
                 <a:latin typeface="+mn-lt"/>
                 <a:ea typeface="Calibri" panose="020F0502020204030204" pitchFamily="34" charset="0"/>
                 <a:cs typeface="Times New Roman" panose="02020603050405020304" pitchFamily="18" charset="0"/>
               </a:rPr>
-              <a:t> </a:t>
-            </a:r>
-            <a:r>
-              <a:rPr lang="en-US" sz="1100">
-                <a:effectLst/>
-                <a:latin typeface="+mn-lt"/>
-                <a:ea typeface="Calibri" panose="020F0502020204030204" pitchFamily="34" charset="0"/>
-                <a:cs typeface="LMRoman10-Regular"/>
-              </a:rPr>
-              <a:t>rush to get things done if you want to master this skill. In particular, everybody goes through some level of</a:t>
-            </a:r>
-            <a:r>
-              <a:rPr lang="en-US" sz="1100">
-                <a:effectLst/>
-                <a:latin typeface="+mn-lt"/>
-                <a:ea typeface="Calibri" panose="020F0502020204030204" pitchFamily="34" charset="0"/>
-                <a:cs typeface="Times New Roman" panose="02020603050405020304" pitchFamily="18" charset="0"/>
-              </a:rPr>
-              <a:t> </a:t>
-            </a:r>
-            <a:r>
-              <a:rPr lang="en-US" sz="1100">
-                <a:effectLst/>
-                <a:latin typeface="+mn-lt"/>
-                <a:ea typeface="Calibri" panose="020F0502020204030204" pitchFamily="34" charset="0"/>
-                <a:cs typeface="LMRoman10-Regular"/>
-              </a:rPr>
-              <a:t>struggle and frustration when learning AI. However, once you have mastered it, you will be amazed</a:t>
-            </a:r>
-            <a:r>
-              <a:rPr lang="en-US" sz="1100">
-                <a:effectLst/>
-                <a:latin typeface="+mn-lt"/>
-                <a:ea typeface="Calibri" panose="020F0502020204030204" pitchFamily="34" charset="0"/>
-                <a:cs typeface="Times New Roman" panose="02020603050405020304" pitchFamily="18" charset="0"/>
-              </a:rPr>
-              <a:t> </a:t>
-            </a:r>
-            <a:r>
-              <a:rPr lang="en-US" sz="1100">
-                <a:effectLst/>
-                <a:latin typeface="+mn-lt"/>
-                <a:ea typeface="Calibri" panose="020F0502020204030204" pitchFamily="34" charset="0"/>
-                <a:cs typeface="LMRoman10-Regular"/>
-              </a:rPr>
-              <a:t>by what this skill can do for you.</a:t>
-            </a:r>
-            <a:endParaRPr lang="en-US" sz="1100">
-              <a:effectLst/>
-              <a:latin typeface="+mn-lt"/>
-              <a:ea typeface="Calibri" panose="020F0502020204030204" pitchFamily="34" charset="0"/>
-              <a:cs typeface="Times New Roman" panose="02020603050405020304" pitchFamily="18" charset="0"/>
-            </a:endParaRPr>
-          </a:p>
-          <a:p>
-            <a:pPr marL="342900" marR="0" lvl="0" indent="-342900" algn="l" defTabSz="914400" rtl="0" eaLnBrk="1" fontAlgn="auto" latinLnBrk="0" hangingPunct="1">
-              <a:lnSpc>
-                <a:spcPct val="100000"/>
-              </a:lnSpc>
-              <a:spcBef>
-                <a:spcPts val="0"/>
-              </a:spcBef>
-              <a:spcAft>
-                <a:spcPts val="0"/>
-              </a:spcAft>
-              <a:buClrTx/>
-              <a:buSzTx/>
-              <a:buFont typeface="+mj-lt"/>
-              <a:buAutoNum type="arabicPeriod"/>
-              <a:tabLst/>
+              <a:t>[NEXT SLIDE]</a:t>
+            </a:r>
+          </a:p>
+          <a:p>
+            <a:pPr marL="845786" lvl="1" indent="-362480" defTabSz="966612">
+              <a:buFont typeface="Courier New" panose="02070309020205020404" pitchFamily="49" charset="0"/>
+              <a:buChar char="o"/>
               <a:defRPr/>
             </a:pPr>
-            <a:endParaRPr lang="en-US" sz="1800">
-              <a:effectLst/>
+            <a:endParaRPr lang="en-US" sz="1900" dirty="0">
               <a:latin typeface="Calibri" panose="020F0502020204030204" pitchFamily="34" charset="0"/>
               <a:ea typeface="Calibri" panose="020F0502020204030204" pitchFamily="34" charset="0"/>
               <a:cs typeface="Times New Roman" panose="02020603050405020304" pitchFamily="18" charset="0"/>
             </a:endParaRPr>
           </a:p>
           <a:p>
-            <a:pPr marL="800100" marR="0" lvl="1" indent="-342900" algn="l" defTabSz="914400" rtl="0" eaLnBrk="1" fontAlgn="auto" latinLnBrk="0" hangingPunct="1">
-              <a:lnSpc>
-                <a:spcPct val="100000"/>
-              </a:lnSpc>
-              <a:spcBef>
-                <a:spcPts val="0"/>
-              </a:spcBef>
-              <a:spcAft>
-                <a:spcPts val="0"/>
-              </a:spcAft>
-              <a:buClrTx/>
-              <a:buSzTx/>
-              <a:buFont typeface="Courier New" panose="02070309020205020404" pitchFamily="49" charset="0"/>
-              <a:buChar char="o"/>
-              <a:tabLst/>
+            <a:pPr marL="845786" lvl="1" indent="-362480" defTabSz="966612">
+              <a:buFont typeface="+mj-lt"/>
+              <a:buAutoNum type="arabicPeriod"/>
               <a:defRPr/>
             </a:pPr>
-            <a:endParaRPr lang="en-US" sz="1800">
-              <a:effectLst/>
+            <a:endParaRPr lang="en-US" sz="1900" dirty="0">
               <a:latin typeface="Calibri" panose="020F0502020204030204" pitchFamily="34" charset="0"/>
               <a:ea typeface="Calibri" panose="020F0502020204030204" pitchFamily="34" charset="0"/>
               <a:cs typeface="Times New Roman" panose="02020603050405020304" pitchFamily="18" charset="0"/>
             </a:endParaRPr>
           </a:p>
           <a:p>
-            <a:pPr marL="800100" marR="0" lvl="1" indent="-342900" algn="l" defTabSz="914400" rtl="0" eaLnBrk="1" fontAlgn="auto" latinLnBrk="0" hangingPunct="1">
-              <a:lnSpc>
-                <a:spcPct val="100000"/>
-              </a:lnSpc>
-              <a:spcBef>
-                <a:spcPts val="0"/>
-              </a:spcBef>
-              <a:spcAft>
-                <a:spcPts val="0"/>
-              </a:spcAft>
-              <a:buClrTx/>
-              <a:buSzTx/>
-              <a:buFont typeface="+mj-lt"/>
-              <a:buAutoNum type="arabicPeriod"/>
-              <a:tabLst/>
+            <a:pPr marL="845786" lvl="1" indent="-362480" defTabSz="966612">
+              <a:buFont typeface="Courier New" panose="02070309020205020404" pitchFamily="49" charset="0"/>
+              <a:buChar char="o"/>
               <a:defRPr/>
             </a:pPr>
-            <a:endParaRPr lang="en-US" sz="1800">
-              <a:effectLst/>
-              <a:latin typeface="Calibri" panose="020F0502020204030204" pitchFamily="34" charset="0"/>
-              <a:ea typeface="Calibri" panose="020F0502020204030204" pitchFamily="34" charset="0"/>
-              <a:cs typeface="Times New Roman" panose="02020603050405020304" pitchFamily="18" charset="0"/>
-            </a:endParaRPr>
-          </a:p>
-          <a:p>
-            <a:pPr marL="800100" marR="0" lvl="1" indent="-342900" algn="l" defTabSz="914400" rtl="0" eaLnBrk="1" fontAlgn="auto" latinLnBrk="0" hangingPunct="1">
-              <a:lnSpc>
-                <a:spcPct val="100000"/>
-              </a:lnSpc>
-              <a:spcBef>
-                <a:spcPts val="0"/>
-              </a:spcBef>
-              <a:spcAft>
-                <a:spcPts val="0"/>
-              </a:spcAft>
-              <a:buClrTx/>
-              <a:buSzTx/>
-              <a:buFont typeface="Courier New" panose="02070309020205020404" pitchFamily="49" charset="0"/>
-              <a:buChar char="o"/>
-              <a:tabLst/>
-              <a:defRPr/>
-            </a:pPr>
-            <a:endParaRPr lang="en-US" sz="1800">
-              <a:effectLst/>
+            <a:endParaRPr lang="en-US" sz="1900" dirty="0">
               <a:latin typeface="Times New Roman" panose="02020603050405020304" pitchFamily="18" charset="0"/>
               <a:ea typeface="Times New Roman" panose="02020603050405020304" pitchFamily="18" charset="0"/>
             </a:endParaRPr>
           </a:p>
           <a:p>
-            <a:endParaRPr lang="en-US"/>
+            <a:endParaRPr lang="en-US" dirty="0"/>
           </a:p>
         </p:txBody>
       </p:sp>
@@ -1831,19 +1536,108 @@
           <a:lstStyle/>
           <a:p>
             <a:r>
-              <a:rPr lang="en-US"/>
+              <a:rPr lang="en-US" dirty="0">
+                <a:latin typeface="+mn-lt"/>
+              </a:rPr>
               <a:t>We often highlight additional resources in the Optional Content / Additional Resources sections of the README file of each workshop series.  Although this series focuses exclusively on the acquisition of a technical skill, it’s always good to see the bigger picture.  These three books will help you do that.</a:t>
             </a:r>
-            <a:endParaRPr lang="en-US" b="1" i="0">
+          </a:p>
+          <a:p>
+            <a:endParaRPr lang="en-US" b="1" i="0" dirty="0">
               <a:solidFill>
                 <a:srgbClr val="24292F"/>
               </a:solidFill>
               <a:effectLst/>
-              <a:latin typeface="-apple-system"/>
+              <a:latin typeface="+mn-lt"/>
             </a:endParaRPr>
           </a:p>
           <a:p>
-            <a:endParaRPr lang="en-US"/>
+            <a:pPr marL="241653" indent="-241653">
+              <a:buFont typeface="+mj-lt"/>
+              <a:buAutoNum type="arabicPeriod"/>
+            </a:pPr>
+            <a:r>
+              <a:rPr lang="en-US" b="0" i="1" dirty="0">
+                <a:solidFill>
+                  <a:srgbClr val="24292F"/>
+                </a:solidFill>
+                <a:effectLst/>
+                <a:latin typeface="+mn-lt"/>
+              </a:rPr>
+              <a:t>A Brief History of Artificial Intelligence </a:t>
+            </a:r>
+            <a:r>
+              <a:rPr lang="en-US" b="0" i="0" dirty="0">
+                <a:solidFill>
+                  <a:srgbClr val="24292F"/>
+                </a:solidFill>
+                <a:effectLst/>
+                <a:latin typeface="+mn-lt"/>
+              </a:rPr>
+              <a:t>by Michael Wooldridge is a wonderful introduction to the field.  I especially like Michael’s NO hype approach.</a:t>
+            </a:r>
+          </a:p>
+          <a:p>
+            <a:pPr marL="241653" indent="-241653">
+              <a:buFont typeface="+mj-lt"/>
+              <a:buAutoNum type="arabicPeriod"/>
+            </a:pPr>
+            <a:r>
+              <a:rPr lang="en-US" b="0" i="1" dirty="0">
+                <a:solidFill>
+                  <a:srgbClr val="24292F"/>
+                </a:solidFill>
+                <a:effectLst/>
+                <a:latin typeface="+mn-lt"/>
+              </a:rPr>
+              <a:t>The Alignment Problem </a:t>
+            </a:r>
+            <a:r>
+              <a:rPr lang="en-US" b="0" i="0" dirty="0">
+                <a:solidFill>
+                  <a:srgbClr val="24292F"/>
+                </a:solidFill>
+                <a:effectLst/>
+                <a:latin typeface="+mn-lt"/>
+              </a:rPr>
+              <a:t>by Brian Christian is probably the best book I’ve ever read on AI ethics.</a:t>
+            </a:r>
+          </a:p>
+          <a:p>
+            <a:pPr marL="241653" indent="-241653">
+              <a:buFont typeface="+mj-lt"/>
+              <a:buAutoNum type="arabicPeriod"/>
+            </a:pPr>
+            <a:r>
+              <a:rPr lang="en-US" b="0" i="1" dirty="0">
+                <a:solidFill>
+                  <a:srgbClr val="24292F"/>
+                </a:solidFill>
+                <a:effectLst/>
+                <a:latin typeface="+mn-lt"/>
+              </a:rPr>
+              <a:t>They Myth of Artificial Intelligence </a:t>
+            </a:r>
+            <a:r>
+              <a:rPr lang="en-US" b="0" i="0" dirty="0">
+                <a:solidFill>
+                  <a:srgbClr val="24292F"/>
+                </a:solidFill>
+                <a:effectLst/>
+                <a:latin typeface="+mn-lt"/>
+              </a:rPr>
+              <a:t>by my friend Erik Larson discusses the challenges of achieving artificial General Intelligence (AGI).</a:t>
+            </a:r>
+            <a:endParaRPr lang="en-US" b="0" i="1" dirty="0">
+              <a:solidFill>
+                <a:srgbClr val="24292F"/>
+              </a:solidFill>
+              <a:effectLst/>
+              <a:latin typeface="+mn-lt"/>
+            </a:endParaRPr>
+          </a:p>
+          <a:p>
+            <a:endParaRPr lang="en-US" dirty="0"/>
           </a:p>
         </p:txBody>
       </p:sp>
@@ -1927,25 +1721,97 @@
           <a:bodyPr/>
           <a:lstStyle/>
           <a:p>
-            <a:pPr marL="0" marR="0" lvl="0" indent="0" algn="l" defTabSz="914400" rtl="0" eaLnBrk="1" fontAlgn="auto" latinLnBrk="0" hangingPunct="1">
-              <a:lnSpc>
-                <a:spcPct val="100000"/>
-              </a:lnSpc>
-              <a:spcBef>
-                <a:spcPts val="0"/>
-              </a:spcBef>
-              <a:spcAft>
-                <a:spcPts val="0"/>
-              </a:spcAft>
-              <a:buClrTx/>
-              <a:buSzTx/>
-              <a:buFontTx/>
-              <a:buNone/>
-              <a:tabLst/>
+            <a:endParaRPr lang="en-US"/>
+          </a:p>
+        </p:txBody>
+      </p:sp>
+      <p:sp>
+        <p:nvSpPr>
+          <p:cNvPr id="4" name="Slide Number Placeholder 3"/>
+          <p:cNvSpPr>
+            <a:spLocks noGrp="1"/>
+          </p:cNvSpPr>
+          <p:nvPr>
+            <p:ph type="sldNum" sz="quarter" idx="5"/>
+          </p:nvPr>
+        </p:nvSpPr>
+        <p:spPr/>
+        <p:txBody>
+          <a:bodyPr/>
+          <a:lstStyle/>
+          <a:p>
+            <a:fld id="{3148858F-F1DB-4027-9C85-CCA6849540DD}" type="slidenum">
+              <a:rPr lang="en-US" smtClean="0"/>
+              <a:t>5</a:t>
+            </a:fld>
+            <a:endParaRPr lang="en-US"/>
+          </a:p>
+        </p:txBody>
+      </p:sp>
+    </p:spTree>
+    <p:extLst>
+      <p:ext uri="{BB962C8B-B14F-4D97-AF65-F5344CB8AC3E}">
+        <p14:creationId xmlns:p14="http://schemas.microsoft.com/office/powerpoint/2010/main" val="350693480"/>
+      </p:ext>
+    </p:extLst>
+  </p:cSld>
+  <p:clrMapOvr>
+    <a:masterClrMapping/>
+  </p:clrMapOvr>
+</p:notes>
+</file>
+
+<file path=ppt/notesSlides/notesSlide6.xml><?xml version="1.0" encoding="utf-8"?>
+<p:notes xmlns:a="http://schemas.openxmlformats.org/drawingml/2006/main" xmlns:r="http://schemas.openxmlformats.org/officeDocument/2006/relationships" xmlns:p="http://schemas.openxmlformats.org/presentationml/2006/main">
+  <p:cSld>
+    <p:spTree>
+      <p:nvGrpSpPr>
+        <p:cNvPr id="1" name=""/>
+        <p:cNvGrpSpPr/>
+        <p:nvPr/>
+      </p:nvGrpSpPr>
+      <p:grpSpPr>
+        <a:xfrm>
+          <a:off x="0" y="0"/>
+          <a:ext cx="0" cy="0"/>
+          <a:chOff x="0" y="0"/>
+          <a:chExt cx="0" cy="0"/>
+        </a:xfrm>
+      </p:grpSpPr>
+      <p:sp>
+        <p:nvSpPr>
+          <p:cNvPr id="2" name="Slide Image Placeholder 1"/>
+          <p:cNvSpPr>
+            <a:spLocks noGrp="1" noRot="1" noChangeAspect="1"/>
+          </p:cNvSpPr>
+          <p:nvPr>
+            <p:ph type="sldImg"/>
+          </p:nvPr>
+        </p:nvSpPr>
+        <p:spPr/>
+      </p:sp>
+      <p:sp>
+        <p:nvSpPr>
+          <p:cNvPr id="3" name="Notes Placeholder 2"/>
+          <p:cNvSpPr>
+            <a:spLocks noGrp="1"/>
+          </p:cNvSpPr>
+          <p:nvPr>
+            <p:ph type="body" idx="1"/>
+          </p:nvPr>
+        </p:nvSpPr>
+        <p:spPr/>
+        <p:txBody>
+          <a:bodyPr/>
+          <a:lstStyle/>
+          <a:p>
+            <a:pPr defTabSz="966612">
               <a:defRPr/>
             </a:pPr>
             <a:r>
-              <a:rPr lang="en-US" dirty="0"/>
+              <a:rPr lang="en-US" dirty="0">
+                <a:latin typeface="+mn-lt"/>
+              </a:rPr>
               <a:t>Follow JupyterLab presentation outline in 01_jupyterlab_presentation.md.</a:t>
             </a:r>
           </a:p>
@@ -2134,7 +2000,7 @@
           <a:p>
             <a:fld id="{C3F78080-8D0A-4BE8-A5B4-CB115102D524}" type="datetimeFigureOut">
               <a:rPr lang="en-US" smtClean="0"/>
-              <a:t>1/13/2023</a:t>
+              <a:t>1/20/2023</a:t>
             </a:fld>
             <a:endParaRPr lang="en-US"/>
           </a:p>
@@ -2332,7 +2198,7 @@
           <a:p>
             <a:fld id="{C3F78080-8D0A-4BE8-A5B4-CB115102D524}" type="datetimeFigureOut">
               <a:rPr lang="en-US" smtClean="0"/>
-              <a:t>1/13/2023</a:t>
+              <a:t>1/20/2023</a:t>
             </a:fld>
             <a:endParaRPr lang="en-US"/>
           </a:p>
@@ -2540,7 +2406,7 @@
           <a:p>
             <a:fld id="{C3F78080-8D0A-4BE8-A5B4-CB115102D524}" type="datetimeFigureOut">
               <a:rPr lang="en-US" smtClean="0"/>
-              <a:t>1/13/2023</a:t>
+              <a:t>1/20/2023</a:t>
             </a:fld>
             <a:endParaRPr lang="en-US"/>
           </a:p>
@@ -2738,7 +2604,7 @@
           <a:p>
             <a:fld id="{C3F78080-8D0A-4BE8-A5B4-CB115102D524}" type="datetimeFigureOut">
               <a:rPr lang="en-US" smtClean="0"/>
-              <a:t>1/13/2023</a:t>
+              <a:t>1/20/2023</a:t>
             </a:fld>
             <a:endParaRPr lang="en-US"/>
           </a:p>
@@ -3013,7 +2879,7 @@
           <a:p>
             <a:fld id="{C3F78080-8D0A-4BE8-A5B4-CB115102D524}" type="datetimeFigureOut">
               <a:rPr lang="en-US" smtClean="0"/>
-              <a:t>1/13/2023</a:t>
+              <a:t>1/20/2023</a:t>
             </a:fld>
             <a:endParaRPr lang="en-US"/>
           </a:p>
@@ -3278,7 +3144,7 @@
           <a:p>
             <a:fld id="{C3F78080-8D0A-4BE8-A5B4-CB115102D524}" type="datetimeFigureOut">
               <a:rPr lang="en-US" smtClean="0"/>
-              <a:t>1/13/2023</a:t>
+              <a:t>1/20/2023</a:t>
             </a:fld>
             <a:endParaRPr lang="en-US"/>
           </a:p>
@@ -3690,7 +3556,7 @@
           <a:p>
             <a:fld id="{C3F78080-8D0A-4BE8-A5B4-CB115102D524}" type="datetimeFigureOut">
               <a:rPr lang="en-US" smtClean="0"/>
-              <a:t>1/13/2023</a:t>
+              <a:t>1/20/2023</a:t>
             </a:fld>
             <a:endParaRPr lang="en-US"/>
           </a:p>
@@ -3831,7 +3697,7 @@
           <a:p>
             <a:fld id="{C3F78080-8D0A-4BE8-A5B4-CB115102D524}" type="datetimeFigureOut">
               <a:rPr lang="en-US" smtClean="0"/>
-              <a:t>1/13/2023</a:t>
+              <a:t>1/20/2023</a:t>
             </a:fld>
             <a:endParaRPr lang="en-US"/>
           </a:p>
@@ -3944,7 +3810,7 @@
           <a:p>
             <a:fld id="{C3F78080-8D0A-4BE8-A5B4-CB115102D524}" type="datetimeFigureOut">
               <a:rPr lang="en-US" smtClean="0"/>
-              <a:t>1/13/2023</a:t>
+              <a:t>1/20/2023</a:t>
             </a:fld>
             <a:endParaRPr lang="en-US"/>
           </a:p>
@@ -4255,7 +4121,7 @@
           <a:p>
             <a:fld id="{C3F78080-8D0A-4BE8-A5B4-CB115102D524}" type="datetimeFigureOut">
               <a:rPr lang="en-US" smtClean="0"/>
-              <a:t>1/13/2023</a:t>
+              <a:t>1/20/2023</a:t>
             </a:fld>
             <a:endParaRPr lang="en-US"/>
           </a:p>
@@ -4543,7 +4409,7 @@
           <a:p>
             <a:fld id="{C3F78080-8D0A-4BE8-A5B4-CB115102D524}" type="datetimeFigureOut">
               <a:rPr lang="en-US" smtClean="0"/>
-              <a:t>1/13/2023</a:t>
+              <a:t>1/20/2023</a:t>
             </a:fld>
             <a:endParaRPr lang="en-US"/>
           </a:p>
@@ -4784,7 +4650,7 @@
           <a:p>
             <a:fld id="{C3F78080-8D0A-4BE8-A5B4-CB115102D524}" type="datetimeFigureOut">
               <a:rPr lang="en-US" smtClean="0"/>
-              <a:t>1/13/2023</a:t>
+              <a:t>1/20/2023</a:t>
             </a:fld>
             <a:endParaRPr lang="en-US"/>
           </a:p>
@@ -7383,15 +7249,6 @@
 </file>
 
 <file path=customXml/item1.xml><?xml version="1.0" encoding="utf-8"?>
-<?mso-contentType ?>
-<FormTemplates xmlns="http://schemas.microsoft.com/sharepoint/v3/contenttype/forms">
-  <Display>DocumentLibraryForm</Display>
-  <Edit>DocumentLibraryForm</Edit>
-  <New>DocumentLibraryForm</New>
-</FormTemplates>
-</file>
-
-<file path=customXml/item2.xml><?xml version="1.0" encoding="utf-8"?>
 <ct:contentTypeSchema xmlns:ct="http://schemas.microsoft.com/office/2006/metadata/contentType" xmlns:ma="http://schemas.microsoft.com/office/2006/metadata/properties/metaAttributes" ct:_="" ma:_="" ma:contentTypeName="Document" ma:contentTypeID="0x0101002673533D22965147974C76FEA4E99B6D" ma:contentTypeVersion="7" ma:contentTypeDescription="Create a new document." ma:contentTypeScope="" ma:versionID="33386593c5eb6e225e5f36b1db4227d2">
   <xsd:schema xmlns:xsd="http://www.w3.org/2001/XMLSchema" xmlns:xs="http://www.w3.org/2001/XMLSchema" xmlns:p="http://schemas.microsoft.com/office/2006/metadata/properties" xmlns:ns2="457672a9-2aae-4e32-9c0c-21a1a727485c" targetNamespace="http://schemas.microsoft.com/office/2006/metadata/properties" ma:root="true" ma:fieldsID="f963ad55d75e1805834ffff233bf5b0c" ns2:_="">
     <xsd:import namespace="457672a9-2aae-4e32-9c0c-21a1a727485c"/>
@@ -7551,6 +7408,15 @@
 </ct:contentTypeSchema>
 </file>
 
+<file path=customXml/item2.xml><?xml version="1.0" encoding="utf-8"?>
+<?mso-contentType ?>
+<FormTemplates xmlns="http://schemas.microsoft.com/sharepoint/v3/contenttype/forms">
+  <Display>DocumentLibraryForm</Display>
+  <Edit>DocumentLibraryForm</Edit>
+  <New>DocumentLibraryForm</New>
+</FormTemplates>
+</file>
+
 <file path=customXml/item3.xml><?xml version="1.0" encoding="utf-8"?>
 <p:properties xmlns:p="http://schemas.microsoft.com/office/2006/metadata/properties" xmlns:xsi="http://www.w3.org/2001/XMLSchema-instance" xmlns:pc="http://schemas.microsoft.com/office/infopath/2007/PartnerControls">
   <documentManagement>
@@ -7562,14 +7428,6 @@
 </file>
 
 <file path=customXml/itemProps1.xml><?xml version="1.0" encoding="utf-8"?>
-<ds:datastoreItem xmlns:ds="http://schemas.openxmlformats.org/officeDocument/2006/customXml" ds:itemID="{D2D8D8CC-BC4B-471B-B2CF-42172936AC34}">
-  <ds:schemaRefs>
-    <ds:schemaRef ds:uri="http://schemas.microsoft.com/sharepoint/v3/contenttype/forms"/>
-  </ds:schemaRefs>
-</ds:datastoreItem>
-</file>
-
-<file path=customXml/itemProps2.xml><?xml version="1.0" encoding="utf-8"?>
 <ds:datastoreItem xmlns:ds="http://schemas.openxmlformats.org/officeDocument/2006/customXml" ds:itemID="{1A69DF91-52FC-4A8A-A88E-6D0CC222FA29}">
   <ds:schemaRefs>
     <ds:schemaRef ds:uri="457672a9-2aae-4e32-9c0c-21a1a727485c"/>
@@ -7587,11 +7445,25 @@
 </ds:datastoreItem>
 </file>
 
+<file path=customXml/itemProps2.xml><?xml version="1.0" encoding="utf-8"?>
+<ds:datastoreItem xmlns:ds="http://schemas.openxmlformats.org/officeDocument/2006/customXml" ds:itemID="{D2D8D8CC-BC4B-471B-B2CF-42172936AC34}">
+  <ds:schemaRefs>
+    <ds:schemaRef ds:uri="http://schemas.microsoft.com/sharepoint/v3/contenttype/forms"/>
+  </ds:schemaRefs>
+</ds:datastoreItem>
+</file>
+
 <file path=customXml/itemProps3.xml><?xml version="1.0" encoding="utf-8"?>
 <ds:datastoreItem xmlns:ds="http://schemas.openxmlformats.org/officeDocument/2006/customXml" ds:itemID="{0B26EFB6-63B6-4D71-9C88-C5CC6E45A9D0}">
   <ds:schemaRefs>
+    <ds:schemaRef ds:uri="http://schemas.openxmlformats.org/package/2006/metadata/core-properties"/>
+    <ds:schemaRef ds:uri="http://schemas.microsoft.com/office/2006/documentManagement/types"/>
+    <ds:schemaRef ds:uri="http://purl.org/dc/elements/1.1/"/>
+    <ds:schemaRef ds:uri="http://schemas.microsoft.com/office/2006/metadata/properties"/>
+    <ds:schemaRef ds:uri="http://purl.org/dc/dcmitype/"/>
+    <ds:schemaRef ds:uri="http://purl.org/dc/terms/"/>
+    <ds:schemaRef ds:uri="http://www.w3.org/XML/1998/namespace"/>
     <ds:schemaRef ds:uri="457672a9-2aae-4e32-9c0c-21a1a727485c"/>
-    <ds:schemaRef ds:uri="http://schemas.microsoft.com/office/2006/metadata/properties"/>
     <ds:schemaRef ds:uri="http://schemas.microsoft.com/office/infopath/2007/PartnerControls"/>
   </ds:schemaRefs>
 </ds:datastoreItem>

</xml_diff>

<commit_message>
A. Haskell edits for 01.25.23 studio session.
</commit_message>
<xml_diff>
--- a/presentations/01_intro_to_python.pptx
+++ b/presentations/01_intro_to_python.pptx
@@ -134,8 +134,7 @@
 <file path=ppt/revisionInfo.xml><?xml version="1.0" encoding="utf-8"?>
 <p1510:revInfo xmlns:a="http://schemas.openxmlformats.org/drawingml/2006/main" xmlns:r="http://schemas.openxmlformats.org/officeDocument/2006/relationships" xmlns:p1510="http://schemas.microsoft.com/office/powerpoint/2015/10/main">
   <p1510:revLst>
-    <p1510:client id="{B6029849-E13E-4E77-9048-647E44108D4D}" v="10" dt="2023-01-11T16:37:17.717"/>
-    <p1510:client id="{FB0DEF81-DD13-43EE-8453-01668F32B88A}" v="75" dt="2023-01-11T16:23:32.142"/>
+    <p1510:client id="{21E60B1A-A99F-4C7D-AC1F-8C261FD9A5AD}" v="330" dt="2023-01-23T19:59:12.395"/>
   </p1510:revLst>
 </p1510:revInfo>
 </file>
@@ -161,6 +160,169 @@
             <pc:docMk/>
             <pc:sldMk cId="3933901158" sldId="266"/>
             <ac:spMk id="4" creationId="{659531AF-92C6-4F92-AA59-2FD12D624E53}"/>
+          </ac:spMkLst>
+        </pc:spChg>
+      </pc:sldChg>
+    </pc:docChg>
+  </pc:docChgLst>
+  <pc:docChgLst>
+    <pc:chgData name="Haskell,Allyson A" userId="f01f6c31-ef41-49db-8aa6-74fdc01fc293" providerId="ADAL" clId="{21E60B1A-A99F-4C7D-AC1F-8C261FD9A5AD}"/>
+    <pc:docChg chg="modSld">
+      <pc:chgData name="Haskell,Allyson A" userId="f01f6c31-ef41-49db-8aa6-74fdc01fc293" providerId="ADAL" clId="{21E60B1A-A99F-4C7D-AC1F-8C261FD9A5AD}" dt="2023-01-23T19:59:12.395" v="330" actId="962"/>
+      <pc:docMkLst>
+        <pc:docMk/>
+      </pc:docMkLst>
+      <pc:sldChg chg="modSp">
+        <pc:chgData name="Haskell,Allyson A" userId="f01f6c31-ef41-49db-8aa6-74fdc01fc293" providerId="ADAL" clId="{21E60B1A-A99F-4C7D-AC1F-8C261FD9A5AD}" dt="2023-01-23T19:59:04.243" v="329" actId="962"/>
+        <pc:sldMkLst>
+          <pc:docMk/>
+          <pc:sldMk cId="3933901158" sldId="266"/>
+        </pc:sldMkLst>
+        <pc:picChg chg="mod">
+          <ac:chgData name="Haskell,Allyson A" userId="f01f6c31-ef41-49db-8aa6-74fdc01fc293" providerId="ADAL" clId="{21E60B1A-A99F-4C7D-AC1F-8C261FD9A5AD}" dt="2023-01-23T19:59:04.243" v="329" actId="962"/>
+          <ac:picMkLst>
+            <pc:docMk/>
+            <pc:sldMk cId="3933901158" sldId="266"/>
+            <ac:picMk id="5" creationId="{D8E6060C-1B45-5B40-59EC-374B080840B8}"/>
+          </ac:picMkLst>
+        </pc:picChg>
+      </pc:sldChg>
+      <pc:sldChg chg="modSp">
+        <pc:chgData name="Haskell,Allyson A" userId="f01f6c31-ef41-49db-8aa6-74fdc01fc293" providerId="ADAL" clId="{21E60B1A-A99F-4C7D-AC1F-8C261FD9A5AD}" dt="2023-01-23T19:59:12.395" v="330" actId="962"/>
+        <pc:sldMkLst>
+          <pc:docMk/>
+          <pc:sldMk cId="2027155574" sldId="304"/>
+        </pc:sldMkLst>
+        <pc:picChg chg="mod">
+          <ac:chgData name="Haskell,Allyson A" userId="f01f6c31-ef41-49db-8aa6-74fdc01fc293" providerId="ADAL" clId="{21E60B1A-A99F-4C7D-AC1F-8C261FD9A5AD}" dt="2023-01-23T19:59:12.395" v="330" actId="962"/>
+          <ac:picMkLst>
+            <pc:docMk/>
+            <pc:sldMk cId="2027155574" sldId="304"/>
+            <ac:picMk id="13" creationId="{5167A017-3AA1-BFB9-5E6C-8D7A4DB8ED66}"/>
+          </ac:picMkLst>
+        </pc:picChg>
+      </pc:sldChg>
+      <pc:sldChg chg="addSp modSp">
+        <pc:chgData name="Haskell,Allyson A" userId="f01f6c31-ef41-49db-8aa6-74fdc01fc293" providerId="ADAL" clId="{21E60B1A-A99F-4C7D-AC1F-8C261FD9A5AD}" dt="2023-01-23T19:58:54.633" v="328" actId="962"/>
+        <pc:sldMkLst>
+          <pc:docMk/>
+          <pc:sldMk cId="2383651979" sldId="323"/>
+        </pc:sldMkLst>
+        <pc:spChg chg="add mod">
+          <ac:chgData name="Haskell,Allyson A" userId="f01f6c31-ef41-49db-8aa6-74fdc01fc293" providerId="ADAL" clId="{21E60B1A-A99F-4C7D-AC1F-8C261FD9A5AD}" dt="2023-01-23T19:58:23.515" v="324" actId="13244"/>
+          <ac:spMkLst>
+            <pc:docMk/>
+            <pc:sldMk cId="2383651979" sldId="323"/>
+            <ac:spMk id="2" creationId="{BC93EE85-2B2A-41CB-841E-13221C6EFFF9}"/>
+          </ac:spMkLst>
+        </pc:spChg>
+        <pc:picChg chg="mod">
+          <ac:chgData name="Haskell,Allyson A" userId="f01f6c31-ef41-49db-8aa6-74fdc01fc293" providerId="ADAL" clId="{21E60B1A-A99F-4C7D-AC1F-8C261FD9A5AD}" dt="2023-01-23T19:58:54.633" v="328" actId="962"/>
+          <ac:picMkLst>
+            <pc:docMk/>
+            <pc:sldMk cId="2383651979" sldId="323"/>
+            <ac:picMk id="3" creationId="{72A9A38D-4A89-28B3-5130-307F350F651B}"/>
+          </ac:picMkLst>
+        </pc:picChg>
+        <pc:picChg chg="mod">
+          <ac:chgData name="Haskell,Allyson A" userId="f01f6c31-ef41-49db-8aa6-74fdc01fc293" providerId="ADAL" clId="{21E60B1A-A99F-4C7D-AC1F-8C261FD9A5AD}" dt="2023-01-23T19:58:31.498" v="325" actId="962"/>
+          <ac:picMkLst>
+            <pc:docMk/>
+            <pc:sldMk cId="2383651979" sldId="323"/>
+            <ac:picMk id="1026" creationId="{2E199D10-634D-4257-BA3C-C6BFAF6D0A76}"/>
+          </ac:picMkLst>
+        </pc:picChg>
+      </pc:sldChg>
+      <pc:sldChg chg="addSp modSp mod">
+        <pc:chgData name="Haskell,Allyson A" userId="f01f6c31-ef41-49db-8aa6-74fdc01fc293" providerId="ADAL" clId="{21E60B1A-A99F-4C7D-AC1F-8C261FD9A5AD}" dt="2023-01-23T19:53:12.683" v="134" actId="962"/>
+        <pc:sldMkLst>
+          <pc:docMk/>
+          <pc:sldMk cId="4229412751" sldId="324"/>
+        </pc:sldMkLst>
+        <pc:spChg chg="mod">
+          <ac:chgData name="Haskell,Allyson A" userId="f01f6c31-ef41-49db-8aa6-74fdc01fc293" providerId="ADAL" clId="{21E60B1A-A99F-4C7D-AC1F-8C261FD9A5AD}" dt="2023-01-23T19:53:00.060" v="133" actId="962"/>
+          <ac:spMkLst>
+            <pc:docMk/>
+            <pc:sldMk cId="4229412751" sldId="324"/>
+            <ac:spMk id="3" creationId="{098BC2D2-CCF7-4C63-8489-B46BF394FCA2}"/>
+          </ac:spMkLst>
+        </pc:spChg>
+        <pc:spChg chg="add mod">
+          <ac:chgData name="Haskell,Allyson A" userId="f01f6c31-ef41-49db-8aa6-74fdc01fc293" providerId="ADAL" clId="{21E60B1A-A99F-4C7D-AC1F-8C261FD9A5AD}" dt="2023-01-23T19:52:56.737" v="130" actId="13244"/>
+          <ac:spMkLst>
+            <pc:docMk/>
+            <pc:sldMk cId="4229412751" sldId="324"/>
+            <ac:spMk id="4" creationId="{0324F03B-D820-4DF5-90A3-53682AC9E13C}"/>
+          </ac:spMkLst>
+        </pc:spChg>
+        <pc:picChg chg="mod">
+          <ac:chgData name="Haskell,Allyson A" userId="f01f6c31-ef41-49db-8aa6-74fdc01fc293" providerId="ADAL" clId="{21E60B1A-A99F-4C7D-AC1F-8C261FD9A5AD}" dt="2023-01-23T19:53:12.683" v="134" actId="962"/>
+          <ac:picMkLst>
+            <pc:docMk/>
+            <pc:sldMk cId="4229412751" sldId="324"/>
+            <ac:picMk id="2" creationId="{892659E9-3D8B-3B83-8D4A-7A89613C0D45}"/>
+          </ac:picMkLst>
+        </pc:picChg>
+        <pc:picChg chg="mod">
+          <ac:chgData name="Haskell,Allyson A" userId="f01f6c31-ef41-49db-8aa6-74fdc01fc293" providerId="ADAL" clId="{21E60B1A-A99F-4C7D-AC1F-8C261FD9A5AD}" dt="2023-01-23T19:45:27.422" v="0" actId="962"/>
+          <ac:picMkLst>
+            <pc:docMk/>
+            <pc:sldMk cId="4229412751" sldId="324"/>
+            <ac:picMk id="5" creationId="{DF27BAC9-5A6D-3E11-357C-BAB7C3DD4FB8}"/>
+          </ac:picMkLst>
+        </pc:picChg>
+      </pc:sldChg>
+      <pc:sldChg chg="addSp modSp">
+        <pc:chgData name="Haskell,Allyson A" userId="f01f6c31-ef41-49db-8aa6-74fdc01fc293" providerId="ADAL" clId="{21E60B1A-A99F-4C7D-AC1F-8C261FD9A5AD}" dt="2023-01-23T19:55:54.591" v="322" actId="962"/>
+        <pc:sldMkLst>
+          <pc:docMk/>
+          <pc:sldMk cId="3550115435" sldId="327"/>
+        </pc:sldMkLst>
+        <pc:spChg chg="add mod">
+          <ac:chgData name="Haskell,Allyson A" userId="f01f6c31-ef41-49db-8aa6-74fdc01fc293" providerId="ADAL" clId="{21E60B1A-A99F-4C7D-AC1F-8C261FD9A5AD}" dt="2023-01-23T19:53:23.045" v="135" actId="13244"/>
+          <ac:spMkLst>
+            <pc:docMk/>
+            <pc:sldMk cId="3550115435" sldId="327"/>
+            <ac:spMk id="2" creationId="{E6BB0473-FC8D-4BAF-A8F1-9C301A2784FA}"/>
+          </ac:spMkLst>
+        </pc:spChg>
+        <pc:picChg chg="mod">
+          <ac:chgData name="Haskell,Allyson A" userId="f01f6c31-ef41-49db-8aa6-74fdc01fc293" providerId="ADAL" clId="{21E60B1A-A99F-4C7D-AC1F-8C261FD9A5AD}" dt="2023-01-23T19:53:35.564" v="137" actId="962"/>
+          <ac:picMkLst>
+            <pc:docMk/>
+            <pc:sldMk cId="3550115435" sldId="327"/>
+            <ac:picMk id="5" creationId="{3C93E1AE-B47F-6FB3-D05A-3B4FA7B5732A}"/>
+          </ac:picMkLst>
+        </pc:picChg>
+        <pc:picChg chg="mod">
+          <ac:chgData name="Haskell,Allyson A" userId="f01f6c31-ef41-49db-8aa6-74fdc01fc293" providerId="ADAL" clId="{21E60B1A-A99F-4C7D-AC1F-8C261FD9A5AD}" dt="2023-01-23T19:55:54.591" v="322" actId="962"/>
+          <ac:picMkLst>
+            <pc:docMk/>
+            <pc:sldMk cId="3550115435" sldId="327"/>
+            <ac:picMk id="6" creationId="{6706020F-E618-4544-8D79-F68CC7189235}"/>
+          </ac:picMkLst>
+        </pc:picChg>
+        <pc:picChg chg="mod">
+          <ac:chgData name="Haskell,Allyson A" userId="f01f6c31-ef41-49db-8aa6-74fdc01fc293" providerId="ADAL" clId="{21E60B1A-A99F-4C7D-AC1F-8C261FD9A5AD}" dt="2023-01-23T19:53:29.016" v="136" actId="13244"/>
+          <ac:picMkLst>
+            <pc:docMk/>
+            <pc:sldMk cId="3550115435" sldId="327"/>
+            <ac:picMk id="1026" creationId="{4C852AB5-B5EE-F094-02DA-3EF5C6A37A2C}"/>
+          </ac:picMkLst>
+        </pc:picChg>
+      </pc:sldChg>
+      <pc:sldChg chg="modSp">
+        <pc:chgData name="Haskell,Allyson A" userId="f01f6c31-ef41-49db-8aa6-74fdc01fc293" providerId="ADAL" clId="{21E60B1A-A99F-4C7D-AC1F-8C261FD9A5AD}" dt="2023-01-23T19:52:37.853" v="129" actId="1076"/>
+        <pc:sldMkLst>
+          <pc:docMk/>
+          <pc:sldMk cId="2552202046" sldId="328"/>
+        </pc:sldMkLst>
+        <pc:spChg chg="mod">
+          <ac:chgData name="Haskell,Allyson A" userId="f01f6c31-ef41-49db-8aa6-74fdc01fc293" providerId="ADAL" clId="{21E60B1A-A99F-4C7D-AC1F-8C261FD9A5AD}" dt="2023-01-23T19:52:37.853" v="129" actId="1076"/>
+          <ac:spMkLst>
+            <pc:docMk/>
+            <pc:sldMk cId="2552202046" sldId="328"/>
+            <ac:spMk id="2" creationId="{E572A712-B415-4A2E-7599-A6167150739A}"/>
           </ac:spMkLst>
         </pc:spChg>
       </pc:sldChg>
@@ -275,7 +437,7 @@
           <a:p>
             <a:fld id="{FD93C9B2-20F6-4DB1-B471-224337D0AC79}" type="datetimeFigureOut">
               <a:rPr lang="en-US" smtClean="0"/>
-              <a:t>1/20/2023</a:t>
+              <a:t>1/24/2023</a:t>
             </a:fld>
             <a:endParaRPr lang="en-US"/>
           </a:p>
@@ -1536,10 +1698,24 @@
           <a:lstStyle/>
           <a:p>
             <a:r>
+              <a:rPr lang="en-US" sz="1800" kern="1200">
+                <a:effectLst/>
+                <a:latin typeface="Calibri" panose="020F0502020204030204" pitchFamily="34" charset="0"/>
+                <a:ea typeface="Calibri" panose="020F0502020204030204" pitchFamily="34" charset="0"/>
+              </a:rPr>
+              <a:t>We often highlight additional resources in the Optional Content / Additional Resources sections of each course.   </a:t>
+            </a:r>
+            <a:r>
+              <a:rPr lang="en-US">
+                <a:latin typeface="+mn-lt"/>
+              </a:rPr>
+              <a:t>Although </a:t>
+            </a:r>
+            <a:r>
               <a:rPr lang="en-US" dirty="0">
                 <a:latin typeface="+mn-lt"/>
               </a:rPr>
-              <a:t>We often highlight additional resources in the Optional Content / Additional Resources sections of the README file of each workshop series.  Although this series focuses exclusively on the acquisition of a technical skill, it’s always good to see the bigger picture.  These three books will help you do that.</a:t>
+              <a:t>this series focuses exclusively on the acquisition of a technical skill, it’s always good to see the bigger picture.  These three books will help you do that.</a:t>
             </a:r>
           </a:p>
           <a:p>
@@ -2000,7 +2176,7 @@
           <a:p>
             <a:fld id="{C3F78080-8D0A-4BE8-A5B4-CB115102D524}" type="datetimeFigureOut">
               <a:rPr lang="en-US" smtClean="0"/>
-              <a:t>1/20/2023</a:t>
+              <a:t>1/24/2023</a:t>
             </a:fld>
             <a:endParaRPr lang="en-US"/>
           </a:p>
@@ -2198,7 +2374,7 @@
           <a:p>
             <a:fld id="{C3F78080-8D0A-4BE8-A5B4-CB115102D524}" type="datetimeFigureOut">
               <a:rPr lang="en-US" smtClean="0"/>
-              <a:t>1/20/2023</a:t>
+              <a:t>1/24/2023</a:t>
             </a:fld>
             <a:endParaRPr lang="en-US"/>
           </a:p>
@@ -2406,7 +2582,7 @@
           <a:p>
             <a:fld id="{C3F78080-8D0A-4BE8-A5B4-CB115102D524}" type="datetimeFigureOut">
               <a:rPr lang="en-US" smtClean="0"/>
-              <a:t>1/20/2023</a:t>
+              <a:t>1/24/2023</a:t>
             </a:fld>
             <a:endParaRPr lang="en-US"/>
           </a:p>
@@ -2604,7 +2780,7 @@
           <a:p>
             <a:fld id="{C3F78080-8D0A-4BE8-A5B4-CB115102D524}" type="datetimeFigureOut">
               <a:rPr lang="en-US" smtClean="0"/>
-              <a:t>1/20/2023</a:t>
+              <a:t>1/24/2023</a:t>
             </a:fld>
             <a:endParaRPr lang="en-US"/>
           </a:p>
@@ -2879,7 +3055,7 @@
           <a:p>
             <a:fld id="{C3F78080-8D0A-4BE8-A5B4-CB115102D524}" type="datetimeFigureOut">
               <a:rPr lang="en-US" smtClean="0"/>
-              <a:t>1/20/2023</a:t>
+              <a:t>1/24/2023</a:t>
             </a:fld>
             <a:endParaRPr lang="en-US"/>
           </a:p>
@@ -3144,7 +3320,7 @@
           <a:p>
             <a:fld id="{C3F78080-8D0A-4BE8-A5B4-CB115102D524}" type="datetimeFigureOut">
               <a:rPr lang="en-US" smtClean="0"/>
-              <a:t>1/20/2023</a:t>
+              <a:t>1/24/2023</a:t>
             </a:fld>
             <a:endParaRPr lang="en-US"/>
           </a:p>
@@ -3556,7 +3732,7 @@
           <a:p>
             <a:fld id="{C3F78080-8D0A-4BE8-A5B4-CB115102D524}" type="datetimeFigureOut">
               <a:rPr lang="en-US" smtClean="0"/>
-              <a:t>1/20/2023</a:t>
+              <a:t>1/24/2023</a:t>
             </a:fld>
             <a:endParaRPr lang="en-US"/>
           </a:p>
@@ -3697,7 +3873,7 @@
           <a:p>
             <a:fld id="{C3F78080-8D0A-4BE8-A5B4-CB115102D524}" type="datetimeFigureOut">
               <a:rPr lang="en-US" smtClean="0"/>
-              <a:t>1/20/2023</a:t>
+              <a:t>1/24/2023</a:t>
             </a:fld>
             <a:endParaRPr lang="en-US"/>
           </a:p>
@@ -3810,7 +3986,7 @@
           <a:p>
             <a:fld id="{C3F78080-8D0A-4BE8-A5B4-CB115102D524}" type="datetimeFigureOut">
               <a:rPr lang="en-US" smtClean="0"/>
-              <a:t>1/20/2023</a:t>
+              <a:t>1/24/2023</a:t>
             </a:fld>
             <a:endParaRPr lang="en-US"/>
           </a:p>
@@ -4121,7 +4297,7 @@
           <a:p>
             <a:fld id="{C3F78080-8D0A-4BE8-A5B4-CB115102D524}" type="datetimeFigureOut">
               <a:rPr lang="en-US" smtClean="0"/>
-              <a:t>1/20/2023</a:t>
+              <a:t>1/24/2023</a:t>
             </a:fld>
             <a:endParaRPr lang="en-US"/>
           </a:p>
@@ -4409,7 +4585,7 @@
           <a:p>
             <a:fld id="{C3F78080-8D0A-4BE8-A5B4-CB115102D524}" type="datetimeFigureOut">
               <a:rPr lang="en-US" smtClean="0"/>
-              <a:t>1/20/2023</a:t>
+              <a:t>1/24/2023</a:t>
             </a:fld>
             <a:endParaRPr lang="en-US"/>
           </a:p>
@@ -4650,7 +4826,7 @@
           <a:p>
             <a:fld id="{C3F78080-8D0A-4BE8-A5B4-CB115102D524}" type="datetimeFigureOut">
               <a:rPr lang="en-US" smtClean="0"/>
-              <a:t>1/20/2023</a:t>
+              <a:t>1/24/2023</a:t>
             </a:fld>
             <a:endParaRPr lang="en-US"/>
           </a:p>
@@ -5069,10 +5245,53 @@
       </p:grpSpPr>
       <p:sp>
         <p:nvSpPr>
+          <p:cNvPr id="4" name="Title 3">
+            <a:extLst>
+              <a:ext uri="{FF2B5EF4-FFF2-40B4-BE49-F238E27FC236}">
+                <a16:creationId xmlns:a16="http://schemas.microsoft.com/office/drawing/2014/main" id="{0324F03B-D820-4DF5-90A3-53682AC9E13C}"/>
+              </a:ext>
+            </a:extLst>
+          </p:cNvPr>
+          <p:cNvSpPr>
+            <a:spLocks noGrp="1"/>
+          </p:cNvSpPr>
+          <p:nvPr>
+            <p:ph type="title"/>
+          </p:nvPr>
+        </p:nvSpPr>
+        <p:spPr>
+          <a:xfrm>
+            <a:off x="685105" y="-908877"/>
+            <a:ext cx="10515600" cy="820862"/>
+          </a:xfrm>
+        </p:spPr>
+        <p:txBody>
+          <a:bodyPr>
+            <a:normAutofit fontScale="90000"/>
+          </a:bodyPr>
+          <a:lstStyle/>
+          <a:p>
+            <a:r>
+              <a:rPr lang="en-US" dirty="0"/>
+              <a:t>Practicum</a:t>
+            </a:r>
+            <a:r>
+              <a:rPr lang="en-US" baseline="0" dirty="0"/>
+              <a:t> – Building AI knowledge</a:t>
+            </a:r>
+            <a:endParaRPr lang="en-US" dirty="0"/>
+          </a:p>
+        </p:txBody>
+      </p:sp>
+      <p:sp>
+        <p:nvSpPr>
           <p:cNvPr id="3" name="Text Placeholder 2">
             <a:extLst>
               <a:ext uri="{FF2B5EF4-FFF2-40B4-BE49-F238E27FC236}">
                 <a16:creationId xmlns:a16="http://schemas.microsoft.com/office/drawing/2014/main" id="{098BC2D2-CCF7-4C63-8489-B46BF394FCA2}"/>
+              </a:ext>
+              <a:ext uri="{C183D7F6-B498-43B3-948B-1728B52AA6E4}">
+                <adec:decorative xmlns:adec="http://schemas.microsoft.com/office/drawing/2017/decorative" val="0"/>
               </a:ext>
             </a:extLst>
           </p:cNvPr>
@@ -5111,6 +5330,9 @@
             <a:extLst>
               <a:ext uri="{FF2B5EF4-FFF2-40B4-BE49-F238E27FC236}">
                 <a16:creationId xmlns:a16="http://schemas.microsoft.com/office/drawing/2014/main" id="{DF27BAC9-5A6D-3E11-357C-BAB7C3DD4FB8}"/>
+              </a:ext>
+              <a:ext uri="{C183D7F6-B498-43B3-948B-1728B52AA6E4}">
+                <adec:decorative xmlns:adec="http://schemas.microsoft.com/office/drawing/2017/decorative" val="1"/>
               </a:ext>
             </a:extLst>
           </p:cNvPr>
@@ -5146,10 +5368,13 @@
       </p:pic>
       <p:pic>
         <p:nvPicPr>
-          <p:cNvPr id="2" name="Picture 1" descr="Logo&#10;&#10;Description automatically generated">
+          <p:cNvPr id="2" name="Picture 1">
             <a:extLst>
               <a:ext uri="{FF2B5EF4-FFF2-40B4-BE49-F238E27FC236}">
                 <a16:creationId xmlns:a16="http://schemas.microsoft.com/office/drawing/2014/main" id="{892659E9-3D8B-3B83-8D4A-7A89613C0D45}"/>
+              </a:ext>
+              <a:ext uri="{C183D7F6-B498-43B3-948B-1728B52AA6E4}">
+                <adec:decorative xmlns:adec="http://schemas.microsoft.com/office/drawing/2017/decorative" val="1"/>
               </a:ext>
             </a:extLst>
           </p:cNvPr>
@@ -5252,7 +5477,7 @@
           <a:p>
             <a:pPr algn="ctr"/>
             <a:r>
-              <a:rPr lang="en-US" sz="3600" b="1">
+              <a:rPr lang="en-US" sz="3600" b="1" dirty="0">
                 <a:solidFill>
                   <a:schemeClr val="tx1">
                     <a:lumMod val="75000"/>
@@ -5391,10 +5616,13 @@
       </p:sp>
       <p:pic>
         <p:nvPicPr>
-          <p:cNvPr id="5" name="Picture 4" descr="A picture containing dark, gauge&#10;&#10;Description automatically generated">
+          <p:cNvPr id="5" name="Picture 4">
             <a:extLst>
               <a:ext uri="{FF2B5EF4-FFF2-40B4-BE49-F238E27FC236}">
                 <a16:creationId xmlns:a16="http://schemas.microsoft.com/office/drawing/2014/main" id="{D8E6060C-1B45-5B40-59EC-374B080840B8}"/>
+              </a:ext>
+              <a:ext uri="{C183D7F6-B498-43B3-948B-1728B52AA6E4}">
+                <adec:decorative xmlns:adec="http://schemas.microsoft.com/office/drawing/2017/decorative" val="1"/>
               </a:ext>
             </a:extLst>
           </p:cNvPr>
@@ -5497,7 +5725,7 @@
           <a:p>
             <a:pPr algn="ctr"/>
             <a:r>
-              <a:rPr lang="en-US" sz="3600" b="1">
+              <a:rPr lang="en-US" sz="3600" b="1" dirty="0">
                 <a:solidFill>
                   <a:schemeClr val="tx1">
                     <a:lumMod val="75000"/>
@@ -5863,10 +6091,13 @@
       </p:sp>
       <p:pic>
         <p:nvPicPr>
-          <p:cNvPr id="13" name="Picture 12" descr="A picture containing dark, gauge&#10;&#10;Description automatically generated">
+          <p:cNvPr id="13" name="Picture 12">
             <a:extLst>
               <a:ext uri="{FF2B5EF4-FFF2-40B4-BE49-F238E27FC236}">
                 <a16:creationId xmlns:a16="http://schemas.microsoft.com/office/drawing/2014/main" id="{5167A017-3AA1-BFB9-5E6C-8D7A4DB8ED66}"/>
+              </a:ext>
+              <a:ext uri="{C183D7F6-B498-43B3-948B-1728B52AA6E4}">
+                <adec:decorative xmlns:adec="http://schemas.microsoft.com/office/drawing/2017/decorative" val="1"/>
               </a:ext>
             </a:extLst>
           </p:cNvPr>
@@ -6241,6 +6472,39 @@
           <a:chExt cx="0" cy="0"/>
         </a:xfrm>
       </p:grpSpPr>
+      <p:sp>
+        <p:nvSpPr>
+          <p:cNvPr id="2" name="Title 1">
+            <a:extLst>
+              <a:ext uri="{FF2B5EF4-FFF2-40B4-BE49-F238E27FC236}">
+                <a16:creationId xmlns:a16="http://schemas.microsoft.com/office/drawing/2014/main" id="{E6BB0473-FC8D-4BAF-A8F1-9C301A2784FA}"/>
+              </a:ext>
+            </a:extLst>
+          </p:cNvPr>
+          <p:cNvSpPr>
+            <a:spLocks noGrp="1"/>
+          </p:cNvSpPr>
+          <p:nvPr>
+            <p:ph type="title"/>
+          </p:nvPr>
+        </p:nvSpPr>
+        <p:spPr>
+          <a:xfrm>
+            <a:off x="838200" y="-815603"/>
+            <a:ext cx="10515600" cy="700194"/>
+          </a:xfrm>
+        </p:spPr>
+        <p:txBody>
+          <a:bodyPr/>
+          <a:lstStyle/>
+          <a:p>
+            <a:r>
+              <a:rPr lang="en-US" dirty="0"/>
+              <a:t>Additional Resources</a:t>
+            </a:r>
+          </a:p>
+        </p:txBody>
+      </p:sp>
       <p:pic>
         <p:nvPicPr>
           <p:cNvPr id="3" name="Picture 2" descr="A Brief History of Artificial Intelligence: What It Is, Where We Are, and Where We Are Going by [Michael Wooldridge]">
@@ -6297,7 +6561,7 @@
       </p:pic>
       <p:pic>
         <p:nvPicPr>
-          <p:cNvPr id="6" name="Picture 5" descr="Diagram, text&#10;&#10;Description automatically generated">
+          <p:cNvPr id="6" name="Picture 5" descr="The Alignment Problem: Machine Learning and Human Values by Brian Christian.">
             <a:extLst>
               <a:ext uri="{FF2B5EF4-FFF2-40B4-BE49-F238E27FC236}">
                 <a16:creationId xmlns:a16="http://schemas.microsoft.com/office/drawing/2014/main" id="{6706020F-E618-4544-8D79-F68CC7189235}"/>
@@ -6394,10 +6658,13 @@
       </p:pic>
       <p:pic>
         <p:nvPicPr>
-          <p:cNvPr id="5" name="Picture 4" descr="A picture containing dark, gauge&#10;&#10;Description automatically generated">
+          <p:cNvPr id="5" name="Picture 4">
             <a:extLst>
               <a:ext uri="{FF2B5EF4-FFF2-40B4-BE49-F238E27FC236}">
                 <a16:creationId xmlns:a16="http://schemas.microsoft.com/office/drawing/2014/main" id="{3C93E1AE-B47F-6FB3-D05A-3B4FA7B5732A}"/>
+              </a:ext>
+              <a:ext uri="{C183D7F6-B498-43B3-948B-1728B52AA6E4}">
+                <adec:decorative xmlns:adec="http://schemas.microsoft.com/office/drawing/2017/decorative" val="1"/>
               </a:ext>
             </a:extLst>
           </p:cNvPr>
@@ -6486,12 +6753,27 @@
             <p:ph type="title"/>
           </p:nvPr>
         </p:nvSpPr>
-        <p:spPr/>
-        <p:txBody>
-          <a:bodyPr/>
+        <p:spPr>
+          <a:xfrm>
+            <a:off x="838200" y="-664684"/>
+            <a:ext cx="10515600" cy="460497"/>
+          </a:xfrm>
+        </p:spPr>
+        <p:txBody>
+          <a:bodyPr>
+            <a:normAutofit fontScale="90000"/>
+          </a:bodyPr>
           <a:lstStyle/>
           <a:p>
-            <a:endParaRPr lang="en-US"/>
+            <a:r>
+              <a:rPr lang="en-US" dirty="0"/>
+              <a:t>Slide intentionally</a:t>
+            </a:r>
+            <a:r>
+              <a:rPr lang="en-US" baseline="0" dirty="0"/>
+              <a:t> left blank</a:t>
+            </a:r>
+            <a:endParaRPr lang="en-US" dirty="0"/>
           </a:p>
         </p:txBody>
       </p:sp>
@@ -6550,12 +6832,51 @@
           <a:chExt cx="0" cy="0"/>
         </a:xfrm>
       </p:grpSpPr>
+      <p:sp>
+        <p:nvSpPr>
+          <p:cNvPr id="2" name="Title 1">
+            <a:extLst>
+              <a:ext uri="{FF2B5EF4-FFF2-40B4-BE49-F238E27FC236}">
+                <a16:creationId xmlns:a16="http://schemas.microsoft.com/office/drawing/2014/main" id="{BC93EE85-2B2A-41CB-841E-13221C6EFFF9}"/>
+              </a:ext>
+            </a:extLst>
+          </p:cNvPr>
+          <p:cNvSpPr>
+            <a:spLocks noGrp="1"/>
+          </p:cNvSpPr>
+          <p:nvPr>
+            <p:ph type="title"/>
+          </p:nvPr>
+        </p:nvSpPr>
+        <p:spPr>
+          <a:xfrm>
+            <a:off x="862437" y="-611417"/>
+            <a:ext cx="10515600" cy="327332"/>
+          </a:xfrm>
+        </p:spPr>
+        <p:txBody>
+          <a:bodyPr>
+            <a:normAutofit fontScale="90000"/>
+          </a:bodyPr>
+          <a:lstStyle/>
+          <a:p>
+            <a:r>
+              <a:rPr lang="en-US" dirty="0" err="1"/>
+              <a:t>Jupyter</a:t>
+            </a:r>
+            <a:endParaRPr lang="en-US" dirty="0"/>
+          </a:p>
+        </p:txBody>
+      </p:sp>
       <p:pic>
         <p:nvPicPr>
-          <p:cNvPr id="1026" name="Picture 2" descr="Project Jupyter - Wikipedia">
+          <p:cNvPr id="1026" name="Picture 2">
             <a:extLst>
               <a:ext uri="{FF2B5EF4-FFF2-40B4-BE49-F238E27FC236}">
                 <a16:creationId xmlns:a16="http://schemas.microsoft.com/office/drawing/2014/main" id="{2E199D10-634D-4257-BA3C-C6BFAF6D0A76}"/>
+              </a:ext>
+              <a:ext uri="{C183D7F6-B498-43B3-948B-1728B52AA6E4}">
+                <adec:decorative xmlns:adec="http://schemas.microsoft.com/office/drawing/2017/decorative" val="1"/>
               </a:ext>
             </a:extLst>
           </p:cNvPr>
@@ -6599,10 +6920,13 @@
       </p:pic>
       <p:pic>
         <p:nvPicPr>
-          <p:cNvPr id="3" name="Picture 2" descr="A picture containing dark, gauge&#10;&#10;Description automatically generated">
+          <p:cNvPr id="3" name="Picture 2">
             <a:extLst>
               <a:ext uri="{FF2B5EF4-FFF2-40B4-BE49-F238E27FC236}">
                 <a16:creationId xmlns:a16="http://schemas.microsoft.com/office/drawing/2014/main" id="{72A9A38D-4A89-28B3-5130-307F350F651B}"/>
+              </a:ext>
+              <a:ext uri="{C183D7F6-B498-43B3-948B-1728B52AA6E4}">
+                <adec:decorative xmlns:adec="http://schemas.microsoft.com/office/drawing/2017/decorative" val="1"/>
               </a:ext>
             </a:extLst>
           </p:cNvPr>
@@ -7249,6 +7573,25 @@
 </file>
 
 <file path=customXml/item1.xml><?xml version="1.0" encoding="utf-8"?>
+<p:properties xmlns:p="http://schemas.microsoft.com/office/2006/metadata/properties" xmlns:xsi="http://www.w3.org/2001/XMLSchema-instance" xmlns:pc="http://schemas.microsoft.com/office/infopath/2007/PartnerControls">
+  <documentManagement>
+    <lcf76f155ced4ddcb4097134ff3c332f xmlns="457672a9-2aae-4e32-9c0c-21a1a727485c">
+      <Terms xmlns="http://schemas.microsoft.com/office/infopath/2007/PartnerControls"/>
+    </lcf76f155ced4ddcb4097134ff3c332f>
+  </documentManagement>
+</p:properties>
+</file>
+
+<file path=customXml/item2.xml><?xml version="1.0" encoding="utf-8"?>
+<?mso-contentType ?>
+<FormTemplates xmlns="http://schemas.microsoft.com/sharepoint/v3/contenttype/forms">
+  <Display>DocumentLibraryForm</Display>
+  <Edit>DocumentLibraryForm</Edit>
+  <New>DocumentLibraryForm</New>
+</FormTemplates>
+</file>
+
+<file path=customXml/item3.xml><?xml version="1.0" encoding="utf-8"?>
 <ct:contentTypeSchema xmlns:ct="http://schemas.microsoft.com/office/2006/metadata/contentType" xmlns:ma="http://schemas.microsoft.com/office/2006/metadata/properties/metaAttributes" ct:_="" ma:_="" ma:contentTypeName="Document" ma:contentTypeID="0x0101002673533D22965147974C76FEA4E99B6D" ma:contentTypeVersion="7" ma:contentTypeDescription="Create a new document." ma:contentTypeScope="" ma:versionID="33386593c5eb6e225e5f36b1db4227d2">
   <xsd:schema xmlns:xsd="http://www.w3.org/2001/XMLSchema" xmlns:xs="http://www.w3.org/2001/XMLSchema" xmlns:p="http://schemas.microsoft.com/office/2006/metadata/properties" xmlns:ns2="457672a9-2aae-4e32-9c0c-21a1a727485c" targetNamespace="http://schemas.microsoft.com/office/2006/metadata/properties" ma:root="true" ma:fieldsID="f963ad55d75e1805834ffff233bf5b0c" ns2:_="">
     <xsd:import namespace="457672a9-2aae-4e32-9c0c-21a1a727485c"/>
@@ -7408,26 +7751,31 @@
 </ct:contentTypeSchema>
 </file>
 
-<file path=customXml/item2.xml><?xml version="1.0" encoding="utf-8"?>
-<?mso-contentType ?>
-<FormTemplates xmlns="http://schemas.microsoft.com/sharepoint/v3/contenttype/forms">
-  <Display>DocumentLibraryForm</Display>
-  <Edit>DocumentLibraryForm</Edit>
-  <New>DocumentLibraryForm</New>
-</FormTemplates>
+<file path=customXml/itemProps1.xml><?xml version="1.0" encoding="utf-8"?>
+<ds:datastoreItem xmlns:ds="http://schemas.openxmlformats.org/officeDocument/2006/customXml" ds:itemID="{0B26EFB6-63B6-4D71-9C88-C5CC6E45A9D0}">
+  <ds:schemaRefs>
+    <ds:schemaRef ds:uri="http://schemas.openxmlformats.org/package/2006/metadata/core-properties"/>
+    <ds:schemaRef ds:uri="http://schemas.microsoft.com/office/2006/documentManagement/types"/>
+    <ds:schemaRef ds:uri="http://purl.org/dc/elements/1.1/"/>
+    <ds:schemaRef ds:uri="http://schemas.microsoft.com/office/2006/metadata/properties"/>
+    <ds:schemaRef ds:uri="http://purl.org/dc/dcmitype/"/>
+    <ds:schemaRef ds:uri="http://purl.org/dc/terms/"/>
+    <ds:schemaRef ds:uri="http://www.w3.org/XML/1998/namespace"/>
+    <ds:schemaRef ds:uri="457672a9-2aae-4e32-9c0c-21a1a727485c"/>
+    <ds:schemaRef ds:uri="http://schemas.microsoft.com/office/infopath/2007/PartnerControls"/>
+  </ds:schemaRefs>
+</ds:datastoreItem>
 </file>
 
-<file path=customXml/item3.xml><?xml version="1.0" encoding="utf-8"?>
-<p:properties xmlns:p="http://schemas.microsoft.com/office/2006/metadata/properties" xmlns:xsi="http://www.w3.org/2001/XMLSchema-instance" xmlns:pc="http://schemas.microsoft.com/office/infopath/2007/PartnerControls">
-  <documentManagement>
-    <lcf76f155ced4ddcb4097134ff3c332f xmlns="457672a9-2aae-4e32-9c0c-21a1a727485c">
-      <Terms xmlns="http://schemas.microsoft.com/office/infopath/2007/PartnerControls"/>
-    </lcf76f155ced4ddcb4097134ff3c332f>
-  </documentManagement>
-</p:properties>
+<file path=customXml/itemProps2.xml><?xml version="1.0" encoding="utf-8"?>
+<ds:datastoreItem xmlns:ds="http://schemas.openxmlformats.org/officeDocument/2006/customXml" ds:itemID="{D2D8D8CC-BC4B-471B-B2CF-42172936AC34}">
+  <ds:schemaRefs>
+    <ds:schemaRef ds:uri="http://schemas.microsoft.com/sharepoint/v3/contenttype/forms"/>
+  </ds:schemaRefs>
+</ds:datastoreItem>
 </file>
 
-<file path=customXml/itemProps1.xml><?xml version="1.0" encoding="utf-8"?>
+<file path=customXml/itemProps3.xml><?xml version="1.0" encoding="utf-8"?>
 <ds:datastoreItem xmlns:ds="http://schemas.openxmlformats.org/officeDocument/2006/customXml" ds:itemID="{1A69DF91-52FC-4A8A-A88E-6D0CC222FA29}">
   <ds:schemaRefs>
     <ds:schemaRef ds:uri="457672a9-2aae-4e32-9c0c-21a1a727485c"/>
@@ -7443,28 +7791,4 @@
     <ds:schemaRef ds:uri="http://www.w3.org/2001/XMLSchema"/>
   </ds:schemaRefs>
 </ds:datastoreItem>
-</file>
-
-<file path=customXml/itemProps2.xml><?xml version="1.0" encoding="utf-8"?>
-<ds:datastoreItem xmlns:ds="http://schemas.openxmlformats.org/officeDocument/2006/customXml" ds:itemID="{D2D8D8CC-BC4B-471B-B2CF-42172936AC34}">
-  <ds:schemaRefs>
-    <ds:schemaRef ds:uri="http://schemas.microsoft.com/sharepoint/v3/contenttype/forms"/>
-  </ds:schemaRefs>
-</ds:datastoreItem>
-</file>
-
-<file path=customXml/itemProps3.xml><?xml version="1.0" encoding="utf-8"?>
-<ds:datastoreItem xmlns:ds="http://schemas.openxmlformats.org/officeDocument/2006/customXml" ds:itemID="{0B26EFB6-63B6-4D71-9C88-C5CC6E45A9D0}">
-  <ds:schemaRefs>
-    <ds:schemaRef ds:uri="http://schemas.openxmlformats.org/package/2006/metadata/core-properties"/>
-    <ds:schemaRef ds:uri="http://schemas.microsoft.com/office/2006/documentManagement/types"/>
-    <ds:schemaRef ds:uri="http://purl.org/dc/elements/1.1/"/>
-    <ds:schemaRef ds:uri="http://schemas.microsoft.com/office/2006/metadata/properties"/>
-    <ds:schemaRef ds:uri="http://purl.org/dc/dcmitype/"/>
-    <ds:schemaRef ds:uri="http://purl.org/dc/terms/"/>
-    <ds:schemaRef ds:uri="http://www.w3.org/XML/1998/namespace"/>
-    <ds:schemaRef ds:uri="457672a9-2aae-4e32-9c0c-21a1a727485c"/>
-    <ds:schemaRef ds:uri="http://schemas.microsoft.com/office/infopath/2007/PartnerControls"/>
-  </ds:schemaRefs>
-</ds:datastoreItem>
 </file>
</xml_diff>